<commit_message>
Add Get Key slide to ppt
</commit_message>
<xml_diff>
--- a/docs/figures/figures.pptx
+++ b/docs/figures/figures.pptx
@@ -7,6 +7,7 @@
   <p:sldIdLst>
     <p:sldId id="256" r:id="rId2"/>
     <p:sldId id="257" r:id="rId3"/>
+    <p:sldId id="258" r:id="rId4"/>
   </p:sldIdLst>
   <p:sldSz cx="12192000" cy="6858000"/>
   <p:notesSz cx="6858000" cy="9144000"/>
@@ -5657,22 +5658,13 @@
           <a:p>
             <a:pPr algn="ctr"/>
             <a:r>
-              <a:rPr lang="en-US" sz="1000">
-                <a:solidFill>
-                  <a:schemeClr val="tx1"/>
-                </a:solidFill>
-                <a:latin typeface="Avenir Book" panose="02000503020000020003" pitchFamily="2" charset="0"/>
-              </a:rPr>
-              <a:t>Encrypted </a:t>
-            </a:r>
-            <a:r>
               <a:rPr lang="en-US" sz="1000" dirty="0">
                 <a:solidFill>
                   <a:schemeClr val="tx1"/>
                 </a:solidFill>
                 <a:latin typeface="Avenir Book" panose="02000503020000020003" pitchFamily="2" charset="0"/>
               </a:rPr>
-              <a:t>tunnel</a:t>
+              <a:t>Encrypted tunnel</a:t>
             </a:r>
           </a:p>
         </p:txBody>
@@ -5851,7 +5843,7 @@
         </p:nvGrpSpPr>
         <p:grpSpPr>
           <a:xfrm>
-            <a:off x="9745811" y="1434512"/>
+            <a:off x="9649561" y="1434512"/>
             <a:ext cx="600778" cy="3537023"/>
             <a:chOff x="3608757" y="1282112"/>
             <a:chExt cx="600778" cy="3537023"/>
@@ -6458,10 +6450,3218 @@
           </a:p>
         </p:txBody>
       </p:sp>
+      <p:grpSp>
+        <p:nvGrpSpPr>
+          <p:cNvPr id="35" name="Group 34">
+            <a:extLst>
+              <a:ext uri="{FF2B5EF4-FFF2-40B4-BE49-F238E27FC236}">
+                <a16:creationId xmlns:a16="http://schemas.microsoft.com/office/drawing/2014/main" id="{F945E0F3-5B89-C3E6-C48C-891A71320874}"/>
+              </a:ext>
+            </a:extLst>
+          </p:cNvPr>
+          <p:cNvGrpSpPr/>
+          <p:nvPr/>
+        </p:nvGrpSpPr>
+        <p:grpSpPr>
+          <a:xfrm>
+            <a:off x="2145799" y="2077799"/>
+            <a:ext cx="3195826" cy="612038"/>
+            <a:chOff x="2145799" y="2684192"/>
+            <a:chExt cx="3195826" cy="612038"/>
+          </a:xfrm>
+        </p:grpSpPr>
+        <p:grpSp>
+          <p:nvGrpSpPr>
+            <p:cNvPr id="31" name="Group 30">
+              <a:extLst>
+                <a:ext uri="{FF2B5EF4-FFF2-40B4-BE49-F238E27FC236}">
+                  <a16:creationId xmlns:a16="http://schemas.microsoft.com/office/drawing/2014/main" id="{C7252AA2-859F-3FA4-8A67-65BCCAB56F56}"/>
+                </a:ext>
+              </a:extLst>
+            </p:cNvPr>
+            <p:cNvGrpSpPr/>
+            <p:nvPr/>
+          </p:nvGrpSpPr>
+          <p:grpSpPr>
+            <a:xfrm>
+              <a:off x="2145799" y="2684192"/>
+              <a:ext cx="3195826" cy="298861"/>
+              <a:chOff x="2145799" y="2684192"/>
+              <a:chExt cx="3195826" cy="298861"/>
+            </a:xfrm>
+          </p:grpSpPr>
+          <p:cxnSp>
+            <p:nvCxnSpPr>
+              <p:cNvPr id="27" name="Straight Connector 26">
+                <a:extLst>
+                  <a:ext uri="{FF2B5EF4-FFF2-40B4-BE49-F238E27FC236}">
+                    <a16:creationId xmlns:a16="http://schemas.microsoft.com/office/drawing/2014/main" id="{E7E85747-01A3-5EC6-D841-BF173DAB9362}"/>
+                  </a:ext>
+                </a:extLst>
+              </p:cNvPr>
+              <p:cNvCxnSpPr>
+                <a:cxnSpLocks/>
+              </p:cNvCxnSpPr>
+              <p:nvPr/>
+            </p:nvCxnSpPr>
+            <p:spPr>
+              <a:xfrm flipH="1">
+                <a:off x="2145799" y="2934929"/>
+                <a:ext cx="3195826" cy="0"/>
+              </a:xfrm>
+              <a:prstGeom prst="line">
+                <a:avLst/>
+              </a:prstGeom>
+              <a:ln w="9525">
+                <a:solidFill>
+                  <a:srgbClr val="FF0000"/>
+                </a:solidFill>
+                <a:headEnd type="triangle"/>
+              </a:ln>
+            </p:spPr>
+            <p:style>
+              <a:lnRef idx="2">
+                <a:schemeClr val="accent1"/>
+              </a:lnRef>
+              <a:fillRef idx="0">
+                <a:schemeClr val="accent1"/>
+              </a:fillRef>
+              <a:effectRef idx="1">
+                <a:schemeClr val="accent1"/>
+              </a:effectRef>
+              <a:fontRef idx="minor">
+                <a:schemeClr val="tx1"/>
+              </a:fontRef>
+            </p:style>
+          </p:cxnSp>
+          <p:sp>
+            <p:nvSpPr>
+              <p:cNvPr id="30" name="Rectangle 29">
+                <a:extLst>
+                  <a:ext uri="{FF2B5EF4-FFF2-40B4-BE49-F238E27FC236}">
+                    <a16:creationId xmlns:a16="http://schemas.microsoft.com/office/drawing/2014/main" id="{8F5122EC-8E1F-DE8B-5685-836CD4D299F6}"/>
+                  </a:ext>
+                </a:extLst>
+              </p:cNvPr>
+              <p:cNvSpPr/>
+              <p:nvPr/>
+            </p:nvSpPr>
+            <p:spPr>
+              <a:xfrm>
+                <a:off x="2145799" y="2684192"/>
+                <a:ext cx="2784678" cy="298861"/>
+              </a:xfrm>
+              <a:prstGeom prst="rect">
+                <a:avLst/>
+              </a:prstGeom>
+              <a:noFill/>
+              <a:ln w="9525">
+                <a:noFill/>
+              </a:ln>
+            </p:spPr>
+            <p:style>
+              <a:lnRef idx="2">
+                <a:schemeClr val="accent1">
+                  <a:shade val="15000"/>
+                </a:schemeClr>
+              </a:lnRef>
+              <a:fillRef idx="1">
+                <a:schemeClr val="accent1"/>
+              </a:fillRef>
+              <a:effectRef idx="0">
+                <a:schemeClr val="accent1"/>
+              </a:effectRef>
+              <a:fontRef idx="minor">
+                <a:schemeClr val="lt1"/>
+              </a:fontRef>
+            </p:style>
+            <p:txBody>
+              <a:bodyPr rtlCol="0" anchor="ctr"/>
+              <a:lstStyle/>
+              <a:p>
+                <a:r>
+                  <a:rPr lang="en-US" sz="1000" dirty="0">
+                    <a:solidFill>
+                      <a:srgbClr val="FF0000"/>
+                    </a:solidFill>
+                    <a:latin typeface="Avenir Book" panose="02000503020000020003" pitchFamily="2" charset="0"/>
+                  </a:rPr>
+                  <a:t>PUT client-registration</a:t>
+                </a:r>
+              </a:p>
+            </p:txBody>
+          </p:sp>
+        </p:grpSp>
+        <p:grpSp>
+          <p:nvGrpSpPr>
+            <p:cNvPr id="32" name="Group 31">
+              <a:extLst>
+                <a:ext uri="{FF2B5EF4-FFF2-40B4-BE49-F238E27FC236}">
+                  <a16:creationId xmlns:a16="http://schemas.microsoft.com/office/drawing/2014/main" id="{BBA2A2DD-8DF3-80E0-FF55-77291C7B0B60}"/>
+                </a:ext>
+              </a:extLst>
+            </p:cNvPr>
+            <p:cNvGrpSpPr/>
+            <p:nvPr/>
+          </p:nvGrpSpPr>
+          <p:grpSpPr>
+            <a:xfrm>
+              <a:off x="2145799" y="2997369"/>
+              <a:ext cx="3195826" cy="298861"/>
+              <a:chOff x="2145799" y="2684192"/>
+              <a:chExt cx="3195826" cy="298861"/>
+            </a:xfrm>
+          </p:grpSpPr>
+          <p:cxnSp>
+            <p:nvCxnSpPr>
+              <p:cNvPr id="33" name="Straight Connector 32">
+                <a:extLst>
+                  <a:ext uri="{FF2B5EF4-FFF2-40B4-BE49-F238E27FC236}">
+                    <a16:creationId xmlns:a16="http://schemas.microsoft.com/office/drawing/2014/main" id="{65CA86CA-BDC4-A983-82B9-B8D39E73DCCD}"/>
+                  </a:ext>
+                </a:extLst>
+              </p:cNvPr>
+              <p:cNvCxnSpPr>
+                <a:cxnSpLocks/>
+              </p:cNvCxnSpPr>
+              <p:nvPr/>
+            </p:nvCxnSpPr>
+            <p:spPr>
+              <a:xfrm flipH="1">
+                <a:off x="2145799" y="2934929"/>
+                <a:ext cx="3195826" cy="0"/>
+              </a:xfrm>
+              <a:prstGeom prst="line">
+                <a:avLst/>
+              </a:prstGeom>
+              <a:ln w="9525">
+                <a:solidFill>
+                  <a:srgbClr val="FF0000"/>
+                </a:solidFill>
+                <a:headEnd type="triangle"/>
+              </a:ln>
+            </p:spPr>
+            <p:style>
+              <a:lnRef idx="2">
+                <a:schemeClr val="accent1"/>
+              </a:lnRef>
+              <a:fillRef idx="0">
+                <a:schemeClr val="accent1"/>
+              </a:fillRef>
+              <a:effectRef idx="1">
+                <a:schemeClr val="accent1"/>
+              </a:effectRef>
+              <a:fontRef idx="minor">
+                <a:schemeClr val="tx1"/>
+              </a:fontRef>
+            </p:style>
+          </p:cxnSp>
+          <p:sp>
+            <p:nvSpPr>
+              <p:cNvPr id="34" name="Rectangle 33">
+                <a:extLst>
+                  <a:ext uri="{FF2B5EF4-FFF2-40B4-BE49-F238E27FC236}">
+                    <a16:creationId xmlns:a16="http://schemas.microsoft.com/office/drawing/2014/main" id="{E4485CA7-40CF-0BC4-B8F1-912E0746168B}"/>
+                  </a:ext>
+                </a:extLst>
+              </p:cNvPr>
+              <p:cNvSpPr/>
+              <p:nvPr/>
+            </p:nvSpPr>
+            <p:spPr>
+              <a:xfrm>
+                <a:off x="2145799" y="2684192"/>
+                <a:ext cx="2784678" cy="298861"/>
+              </a:xfrm>
+              <a:prstGeom prst="rect">
+                <a:avLst/>
+              </a:prstGeom>
+              <a:noFill/>
+              <a:ln w="9525">
+                <a:noFill/>
+              </a:ln>
+            </p:spPr>
+            <p:style>
+              <a:lnRef idx="2">
+                <a:schemeClr val="accent1">
+                  <a:shade val="15000"/>
+                </a:schemeClr>
+              </a:lnRef>
+              <a:fillRef idx="1">
+                <a:schemeClr val="accent1"/>
+              </a:fillRef>
+              <a:effectRef idx="0">
+                <a:schemeClr val="accent1"/>
+              </a:effectRef>
+              <a:fontRef idx="minor">
+                <a:schemeClr val="lt1"/>
+              </a:fontRef>
+            </p:style>
+            <p:txBody>
+              <a:bodyPr rtlCol="0" anchor="ctr"/>
+              <a:lstStyle/>
+              <a:p>
+                <a:r>
+                  <a:rPr lang="en-US" sz="1000" dirty="0">
+                    <a:solidFill>
+                      <a:srgbClr val="FF0000"/>
+                    </a:solidFill>
+                    <a:latin typeface="Avenir Book" panose="02000503020000020003" pitchFamily="2" charset="0"/>
+                  </a:rPr>
+                  <a:t>GET pre-shared-random-data</a:t>
+                </a:r>
+              </a:p>
+            </p:txBody>
+          </p:sp>
+        </p:grpSp>
+      </p:grpSp>
+      <p:grpSp>
+        <p:nvGrpSpPr>
+          <p:cNvPr id="36" name="Group 35">
+            <a:extLst>
+              <a:ext uri="{FF2B5EF4-FFF2-40B4-BE49-F238E27FC236}">
+                <a16:creationId xmlns:a16="http://schemas.microsoft.com/office/drawing/2014/main" id="{0DDCE860-A8CB-3B9A-A77F-A74DAB0D0295}"/>
+              </a:ext>
+            </a:extLst>
+          </p:cNvPr>
+          <p:cNvGrpSpPr/>
+          <p:nvPr/>
+        </p:nvGrpSpPr>
+        <p:grpSpPr>
+          <a:xfrm>
+            <a:off x="2145799" y="2794782"/>
+            <a:ext cx="4607274" cy="612038"/>
+            <a:chOff x="2145799" y="2684192"/>
+            <a:chExt cx="4607274" cy="612038"/>
+          </a:xfrm>
+        </p:grpSpPr>
+        <p:grpSp>
+          <p:nvGrpSpPr>
+            <p:cNvPr id="37" name="Group 36">
+              <a:extLst>
+                <a:ext uri="{FF2B5EF4-FFF2-40B4-BE49-F238E27FC236}">
+                  <a16:creationId xmlns:a16="http://schemas.microsoft.com/office/drawing/2014/main" id="{89B52564-CB00-C57B-FA65-FB393B5C5E57}"/>
+                </a:ext>
+              </a:extLst>
+            </p:cNvPr>
+            <p:cNvGrpSpPr/>
+            <p:nvPr/>
+          </p:nvGrpSpPr>
+          <p:grpSpPr>
+            <a:xfrm>
+              <a:off x="2145799" y="2684192"/>
+              <a:ext cx="4607274" cy="298861"/>
+              <a:chOff x="2145799" y="2684192"/>
+              <a:chExt cx="4607274" cy="298861"/>
+            </a:xfrm>
+          </p:grpSpPr>
+          <p:cxnSp>
+            <p:nvCxnSpPr>
+              <p:cNvPr id="41" name="Straight Connector 40">
+                <a:extLst>
+                  <a:ext uri="{FF2B5EF4-FFF2-40B4-BE49-F238E27FC236}">
+                    <a16:creationId xmlns:a16="http://schemas.microsoft.com/office/drawing/2014/main" id="{3ACBE410-1217-C1F0-0962-DA9E39547C2A}"/>
+                  </a:ext>
+                </a:extLst>
+              </p:cNvPr>
+              <p:cNvCxnSpPr>
+                <a:cxnSpLocks/>
+              </p:cNvCxnSpPr>
+              <p:nvPr/>
+            </p:nvCxnSpPr>
+            <p:spPr>
+              <a:xfrm flipH="1">
+                <a:off x="2145799" y="2934929"/>
+                <a:ext cx="4607274" cy="0"/>
+              </a:xfrm>
+              <a:prstGeom prst="line">
+                <a:avLst/>
+              </a:prstGeom>
+              <a:ln w="9525">
+                <a:solidFill>
+                  <a:srgbClr val="FF0000"/>
+                </a:solidFill>
+                <a:headEnd type="triangle"/>
+              </a:ln>
+            </p:spPr>
+            <p:style>
+              <a:lnRef idx="2">
+                <a:schemeClr val="accent1"/>
+              </a:lnRef>
+              <a:fillRef idx="0">
+                <a:schemeClr val="accent1"/>
+              </a:fillRef>
+              <a:effectRef idx="1">
+                <a:schemeClr val="accent1"/>
+              </a:effectRef>
+              <a:fontRef idx="minor">
+                <a:schemeClr val="tx1"/>
+              </a:fontRef>
+            </p:style>
+          </p:cxnSp>
+          <p:sp>
+            <p:nvSpPr>
+              <p:cNvPr id="42" name="Rectangle 41">
+                <a:extLst>
+                  <a:ext uri="{FF2B5EF4-FFF2-40B4-BE49-F238E27FC236}">
+                    <a16:creationId xmlns:a16="http://schemas.microsoft.com/office/drawing/2014/main" id="{E1884416-8714-C367-508F-11ECFA456D2B}"/>
+                  </a:ext>
+                </a:extLst>
+              </p:cNvPr>
+              <p:cNvSpPr/>
+              <p:nvPr/>
+            </p:nvSpPr>
+            <p:spPr>
+              <a:xfrm>
+                <a:off x="2145799" y="2684192"/>
+                <a:ext cx="2784678" cy="298861"/>
+              </a:xfrm>
+              <a:prstGeom prst="rect">
+                <a:avLst/>
+              </a:prstGeom>
+              <a:noFill/>
+              <a:ln w="9525">
+                <a:noFill/>
+              </a:ln>
+            </p:spPr>
+            <p:style>
+              <a:lnRef idx="2">
+                <a:schemeClr val="accent1">
+                  <a:shade val="15000"/>
+                </a:schemeClr>
+              </a:lnRef>
+              <a:fillRef idx="1">
+                <a:schemeClr val="accent1"/>
+              </a:fillRef>
+              <a:effectRef idx="0">
+                <a:schemeClr val="accent1"/>
+              </a:effectRef>
+              <a:fontRef idx="minor">
+                <a:schemeClr val="lt1"/>
+              </a:fontRef>
+            </p:style>
+            <p:txBody>
+              <a:bodyPr rtlCol="0" anchor="ctr"/>
+              <a:lstStyle/>
+              <a:p>
+                <a:r>
+                  <a:rPr lang="en-US" sz="1000" dirty="0">
+                    <a:solidFill>
+                      <a:srgbClr val="FF0000"/>
+                    </a:solidFill>
+                    <a:latin typeface="Avenir Book" panose="02000503020000020003" pitchFamily="2" charset="0"/>
+                  </a:rPr>
+                  <a:t>PUT client-registration</a:t>
+                </a:r>
+              </a:p>
+            </p:txBody>
+          </p:sp>
+        </p:grpSp>
+        <p:grpSp>
+          <p:nvGrpSpPr>
+            <p:cNvPr id="38" name="Group 37">
+              <a:extLst>
+                <a:ext uri="{FF2B5EF4-FFF2-40B4-BE49-F238E27FC236}">
+                  <a16:creationId xmlns:a16="http://schemas.microsoft.com/office/drawing/2014/main" id="{4D63BEAA-B914-5169-CBF2-E839586B288F}"/>
+                </a:ext>
+              </a:extLst>
+            </p:cNvPr>
+            <p:cNvGrpSpPr/>
+            <p:nvPr/>
+          </p:nvGrpSpPr>
+          <p:grpSpPr>
+            <a:xfrm>
+              <a:off x="2145799" y="2997369"/>
+              <a:ext cx="4607274" cy="298861"/>
+              <a:chOff x="2145799" y="2684192"/>
+              <a:chExt cx="4607274" cy="298861"/>
+            </a:xfrm>
+          </p:grpSpPr>
+          <p:cxnSp>
+            <p:nvCxnSpPr>
+              <p:cNvPr id="39" name="Straight Connector 38">
+                <a:extLst>
+                  <a:ext uri="{FF2B5EF4-FFF2-40B4-BE49-F238E27FC236}">
+                    <a16:creationId xmlns:a16="http://schemas.microsoft.com/office/drawing/2014/main" id="{CDBA45C2-048D-7835-06A7-C403393483B0}"/>
+                  </a:ext>
+                </a:extLst>
+              </p:cNvPr>
+              <p:cNvCxnSpPr>
+                <a:cxnSpLocks/>
+              </p:cNvCxnSpPr>
+              <p:nvPr/>
+            </p:nvCxnSpPr>
+            <p:spPr>
+              <a:xfrm flipH="1">
+                <a:off x="2145799" y="2934929"/>
+                <a:ext cx="4607274" cy="0"/>
+              </a:xfrm>
+              <a:prstGeom prst="line">
+                <a:avLst/>
+              </a:prstGeom>
+              <a:ln w="9525">
+                <a:solidFill>
+                  <a:srgbClr val="FF0000"/>
+                </a:solidFill>
+                <a:headEnd type="triangle"/>
+              </a:ln>
+            </p:spPr>
+            <p:style>
+              <a:lnRef idx="2">
+                <a:schemeClr val="accent1"/>
+              </a:lnRef>
+              <a:fillRef idx="0">
+                <a:schemeClr val="accent1"/>
+              </a:fillRef>
+              <a:effectRef idx="1">
+                <a:schemeClr val="accent1"/>
+              </a:effectRef>
+              <a:fontRef idx="minor">
+                <a:schemeClr val="tx1"/>
+              </a:fontRef>
+            </p:style>
+          </p:cxnSp>
+          <p:sp>
+            <p:nvSpPr>
+              <p:cNvPr id="40" name="Rectangle 39">
+                <a:extLst>
+                  <a:ext uri="{FF2B5EF4-FFF2-40B4-BE49-F238E27FC236}">
+                    <a16:creationId xmlns:a16="http://schemas.microsoft.com/office/drawing/2014/main" id="{723966DC-C1A4-88DF-7B9B-601C78B06C0F}"/>
+                  </a:ext>
+                </a:extLst>
+              </p:cNvPr>
+              <p:cNvSpPr/>
+              <p:nvPr/>
+            </p:nvSpPr>
+            <p:spPr>
+              <a:xfrm>
+                <a:off x="2145799" y="2684192"/>
+                <a:ext cx="2784678" cy="298861"/>
+              </a:xfrm>
+              <a:prstGeom prst="rect">
+                <a:avLst/>
+              </a:prstGeom>
+              <a:noFill/>
+              <a:ln w="9525">
+                <a:noFill/>
+              </a:ln>
+            </p:spPr>
+            <p:style>
+              <a:lnRef idx="2">
+                <a:schemeClr val="accent1">
+                  <a:shade val="15000"/>
+                </a:schemeClr>
+              </a:lnRef>
+              <a:fillRef idx="1">
+                <a:schemeClr val="accent1"/>
+              </a:fillRef>
+              <a:effectRef idx="0">
+                <a:schemeClr val="accent1"/>
+              </a:effectRef>
+              <a:fontRef idx="minor">
+                <a:schemeClr val="lt1"/>
+              </a:fontRef>
+            </p:style>
+            <p:txBody>
+              <a:bodyPr rtlCol="0" anchor="ctr"/>
+              <a:lstStyle/>
+              <a:p>
+                <a:r>
+                  <a:rPr lang="en-US" sz="1000" dirty="0">
+                    <a:solidFill>
+                      <a:srgbClr val="FF0000"/>
+                    </a:solidFill>
+                    <a:latin typeface="Avenir Book" panose="02000503020000020003" pitchFamily="2" charset="0"/>
+                  </a:rPr>
+                  <a:t>GET pre-shared-random-data</a:t>
+                </a:r>
+              </a:p>
+            </p:txBody>
+          </p:sp>
+        </p:grpSp>
+      </p:grpSp>
+      <p:grpSp>
+        <p:nvGrpSpPr>
+          <p:cNvPr id="45" name="Group 44">
+            <a:extLst>
+              <a:ext uri="{FF2B5EF4-FFF2-40B4-BE49-F238E27FC236}">
+                <a16:creationId xmlns:a16="http://schemas.microsoft.com/office/drawing/2014/main" id="{CF4C12BA-A173-B622-AB35-8A4667510D1A}"/>
+              </a:ext>
+            </a:extLst>
+          </p:cNvPr>
+          <p:cNvGrpSpPr/>
+          <p:nvPr/>
+        </p:nvGrpSpPr>
+        <p:grpSpPr>
+          <a:xfrm flipH="1">
+            <a:off x="6753073" y="3526779"/>
+            <a:ext cx="3195826" cy="612038"/>
+            <a:chOff x="2145799" y="2684192"/>
+            <a:chExt cx="3195826" cy="612038"/>
+          </a:xfrm>
+        </p:grpSpPr>
+        <p:grpSp>
+          <p:nvGrpSpPr>
+            <p:cNvPr id="46" name="Group 45">
+              <a:extLst>
+                <a:ext uri="{FF2B5EF4-FFF2-40B4-BE49-F238E27FC236}">
+                  <a16:creationId xmlns:a16="http://schemas.microsoft.com/office/drawing/2014/main" id="{45E8EA47-294A-E762-99AC-26233B315772}"/>
+                </a:ext>
+              </a:extLst>
+            </p:cNvPr>
+            <p:cNvGrpSpPr/>
+            <p:nvPr/>
+          </p:nvGrpSpPr>
+          <p:grpSpPr>
+            <a:xfrm>
+              <a:off x="2145799" y="2684192"/>
+              <a:ext cx="3195826" cy="298861"/>
+              <a:chOff x="2145799" y="2684192"/>
+              <a:chExt cx="3195826" cy="298861"/>
+            </a:xfrm>
+          </p:grpSpPr>
+          <p:cxnSp>
+            <p:nvCxnSpPr>
+              <p:cNvPr id="50" name="Straight Connector 49">
+                <a:extLst>
+                  <a:ext uri="{FF2B5EF4-FFF2-40B4-BE49-F238E27FC236}">
+                    <a16:creationId xmlns:a16="http://schemas.microsoft.com/office/drawing/2014/main" id="{C3B6AFCA-5CE0-C31C-CF5C-925A5B71FF90}"/>
+                  </a:ext>
+                </a:extLst>
+              </p:cNvPr>
+              <p:cNvCxnSpPr>
+                <a:cxnSpLocks/>
+              </p:cNvCxnSpPr>
+              <p:nvPr/>
+            </p:nvCxnSpPr>
+            <p:spPr>
+              <a:xfrm flipH="1">
+                <a:off x="2145799" y="2934929"/>
+                <a:ext cx="3195826" cy="0"/>
+              </a:xfrm>
+              <a:prstGeom prst="line">
+                <a:avLst/>
+              </a:prstGeom>
+              <a:ln w="9525">
+                <a:solidFill>
+                  <a:srgbClr val="FF0000"/>
+                </a:solidFill>
+                <a:headEnd type="triangle"/>
+              </a:ln>
+            </p:spPr>
+            <p:style>
+              <a:lnRef idx="2">
+                <a:schemeClr val="accent1"/>
+              </a:lnRef>
+              <a:fillRef idx="0">
+                <a:schemeClr val="accent1"/>
+              </a:fillRef>
+              <a:effectRef idx="1">
+                <a:schemeClr val="accent1"/>
+              </a:effectRef>
+              <a:fontRef idx="minor">
+                <a:schemeClr val="tx1"/>
+              </a:fontRef>
+            </p:style>
+          </p:cxnSp>
+          <p:sp>
+            <p:nvSpPr>
+              <p:cNvPr id="51" name="Rectangle 50">
+                <a:extLst>
+                  <a:ext uri="{FF2B5EF4-FFF2-40B4-BE49-F238E27FC236}">
+                    <a16:creationId xmlns:a16="http://schemas.microsoft.com/office/drawing/2014/main" id="{6551DE2D-B0FD-7650-348F-790BF15D06A7}"/>
+                  </a:ext>
+                </a:extLst>
+              </p:cNvPr>
+              <p:cNvSpPr/>
+              <p:nvPr/>
+            </p:nvSpPr>
+            <p:spPr>
+              <a:xfrm>
+                <a:off x="2145799" y="2684192"/>
+                <a:ext cx="2784678" cy="298861"/>
+              </a:xfrm>
+              <a:prstGeom prst="rect">
+                <a:avLst/>
+              </a:prstGeom>
+              <a:noFill/>
+              <a:ln w="9525">
+                <a:noFill/>
+              </a:ln>
+            </p:spPr>
+            <p:style>
+              <a:lnRef idx="2">
+                <a:schemeClr val="accent1">
+                  <a:shade val="15000"/>
+                </a:schemeClr>
+              </a:lnRef>
+              <a:fillRef idx="1">
+                <a:schemeClr val="accent1"/>
+              </a:fillRef>
+              <a:effectRef idx="0">
+                <a:schemeClr val="accent1"/>
+              </a:effectRef>
+              <a:fontRef idx="minor">
+                <a:schemeClr val="lt1"/>
+              </a:fontRef>
+            </p:style>
+            <p:txBody>
+              <a:bodyPr rtlCol="0" anchor="ctr"/>
+              <a:lstStyle/>
+              <a:p>
+                <a:r>
+                  <a:rPr lang="en-US" sz="1000" dirty="0">
+                    <a:solidFill>
+                      <a:srgbClr val="FF0000"/>
+                    </a:solidFill>
+                    <a:latin typeface="Avenir Book" panose="02000503020000020003" pitchFamily="2" charset="0"/>
+                  </a:rPr>
+                  <a:t>PUT client-registration</a:t>
+                </a:r>
+              </a:p>
+            </p:txBody>
+          </p:sp>
+        </p:grpSp>
+        <p:grpSp>
+          <p:nvGrpSpPr>
+            <p:cNvPr id="47" name="Group 46">
+              <a:extLst>
+                <a:ext uri="{FF2B5EF4-FFF2-40B4-BE49-F238E27FC236}">
+                  <a16:creationId xmlns:a16="http://schemas.microsoft.com/office/drawing/2014/main" id="{91C9EEE2-FD1B-09E1-3D71-B150D7C89084}"/>
+                </a:ext>
+              </a:extLst>
+            </p:cNvPr>
+            <p:cNvGrpSpPr/>
+            <p:nvPr/>
+          </p:nvGrpSpPr>
+          <p:grpSpPr>
+            <a:xfrm>
+              <a:off x="2145799" y="2997369"/>
+              <a:ext cx="3195826" cy="298861"/>
+              <a:chOff x="2145799" y="2684192"/>
+              <a:chExt cx="3195826" cy="298861"/>
+            </a:xfrm>
+          </p:grpSpPr>
+          <p:cxnSp>
+            <p:nvCxnSpPr>
+              <p:cNvPr id="48" name="Straight Connector 47">
+                <a:extLst>
+                  <a:ext uri="{FF2B5EF4-FFF2-40B4-BE49-F238E27FC236}">
+                    <a16:creationId xmlns:a16="http://schemas.microsoft.com/office/drawing/2014/main" id="{42E1CF90-8451-2888-A8D1-72959D1BF1C9}"/>
+                  </a:ext>
+                </a:extLst>
+              </p:cNvPr>
+              <p:cNvCxnSpPr>
+                <a:cxnSpLocks/>
+              </p:cNvCxnSpPr>
+              <p:nvPr/>
+            </p:nvCxnSpPr>
+            <p:spPr>
+              <a:xfrm flipH="1">
+                <a:off x="2145799" y="2934929"/>
+                <a:ext cx="3195826" cy="0"/>
+              </a:xfrm>
+              <a:prstGeom prst="line">
+                <a:avLst/>
+              </a:prstGeom>
+              <a:ln w="9525">
+                <a:solidFill>
+                  <a:srgbClr val="FF0000"/>
+                </a:solidFill>
+                <a:headEnd type="triangle"/>
+              </a:ln>
+            </p:spPr>
+            <p:style>
+              <a:lnRef idx="2">
+                <a:schemeClr val="accent1"/>
+              </a:lnRef>
+              <a:fillRef idx="0">
+                <a:schemeClr val="accent1"/>
+              </a:fillRef>
+              <a:effectRef idx="1">
+                <a:schemeClr val="accent1"/>
+              </a:effectRef>
+              <a:fontRef idx="minor">
+                <a:schemeClr val="tx1"/>
+              </a:fontRef>
+            </p:style>
+          </p:cxnSp>
+          <p:sp>
+            <p:nvSpPr>
+              <p:cNvPr id="49" name="Rectangle 48">
+                <a:extLst>
+                  <a:ext uri="{FF2B5EF4-FFF2-40B4-BE49-F238E27FC236}">
+                    <a16:creationId xmlns:a16="http://schemas.microsoft.com/office/drawing/2014/main" id="{60BF63FD-3A8E-CAC4-755E-1C25CE465046}"/>
+                  </a:ext>
+                </a:extLst>
+              </p:cNvPr>
+              <p:cNvSpPr/>
+              <p:nvPr/>
+            </p:nvSpPr>
+            <p:spPr>
+              <a:xfrm>
+                <a:off x="2145799" y="2684192"/>
+                <a:ext cx="2784678" cy="298861"/>
+              </a:xfrm>
+              <a:prstGeom prst="rect">
+                <a:avLst/>
+              </a:prstGeom>
+              <a:noFill/>
+              <a:ln w="9525">
+                <a:noFill/>
+              </a:ln>
+            </p:spPr>
+            <p:style>
+              <a:lnRef idx="2">
+                <a:schemeClr val="accent1">
+                  <a:shade val="15000"/>
+                </a:schemeClr>
+              </a:lnRef>
+              <a:fillRef idx="1">
+                <a:schemeClr val="accent1"/>
+              </a:fillRef>
+              <a:effectRef idx="0">
+                <a:schemeClr val="accent1"/>
+              </a:effectRef>
+              <a:fontRef idx="minor">
+                <a:schemeClr val="lt1"/>
+              </a:fontRef>
+            </p:style>
+            <p:txBody>
+              <a:bodyPr rtlCol="0" anchor="ctr"/>
+              <a:lstStyle/>
+              <a:p>
+                <a:r>
+                  <a:rPr lang="en-US" sz="1000" dirty="0">
+                    <a:solidFill>
+                      <a:srgbClr val="FF0000"/>
+                    </a:solidFill>
+                    <a:latin typeface="Avenir Book" panose="02000503020000020003" pitchFamily="2" charset="0"/>
+                  </a:rPr>
+                  <a:t>GET pre-shared-random-data</a:t>
+                </a:r>
+              </a:p>
+            </p:txBody>
+          </p:sp>
+        </p:grpSp>
+      </p:grpSp>
+      <p:grpSp>
+        <p:nvGrpSpPr>
+          <p:cNvPr id="52" name="Group 51">
+            <a:extLst>
+              <a:ext uri="{FF2B5EF4-FFF2-40B4-BE49-F238E27FC236}">
+                <a16:creationId xmlns:a16="http://schemas.microsoft.com/office/drawing/2014/main" id="{274C9872-2A0F-3D2E-7ABC-D2A623D5F965}"/>
+              </a:ext>
+            </a:extLst>
+          </p:cNvPr>
+          <p:cNvGrpSpPr/>
+          <p:nvPr/>
+        </p:nvGrpSpPr>
+        <p:grpSpPr>
+          <a:xfrm flipH="1">
+            <a:off x="5341625" y="4243762"/>
+            <a:ext cx="4607274" cy="612038"/>
+            <a:chOff x="2145799" y="2684192"/>
+            <a:chExt cx="4607274" cy="612038"/>
+          </a:xfrm>
+        </p:grpSpPr>
+        <p:grpSp>
+          <p:nvGrpSpPr>
+            <p:cNvPr id="53" name="Group 52">
+              <a:extLst>
+                <a:ext uri="{FF2B5EF4-FFF2-40B4-BE49-F238E27FC236}">
+                  <a16:creationId xmlns:a16="http://schemas.microsoft.com/office/drawing/2014/main" id="{511382C1-4879-95D2-F2C2-F1AD324FF722}"/>
+                </a:ext>
+              </a:extLst>
+            </p:cNvPr>
+            <p:cNvGrpSpPr/>
+            <p:nvPr/>
+          </p:nvGrpSpPr>
+          <p:grpSpPr>
+            <a:xfrm>
+              <a:off x="2145799" y="2684192"/>
+              <a:ext cx="4607274" cy="298861"/>
+              <a:chOff x="2145799" y="2684192"/>
+              <a:chExt cx="4607274" cy="298861"/>
+            </a:xfrm>
+          </p:grpSpPr>
+          <p:cxnSp>
+            <p:nvCxnSpPr>
+              <p:cNvPr id="57" name="Straight Connector 56">
+                <a:extLst>
+                  <a:ext uri="{FF2B5EF4-FFF2-40B4-BE49-F238E27FC236}">
+                    <a16:creationId xmlns:a16="http://schemas.microsoft.com/office/drawing/2014/main" id="{7EB06316-808F-603D-1386-89EA49CB6B14}"/>
+                  </a:ext>
+                </a:extLst>
+              </p:cNvPr>
+              <p:cNvCxnSpPr>
+                <a:cxnSpLocks/>
+              </p:cNvCxnSpPr>
+              <p:nvPr/>
+            </p:nvCxnSpPr>
+            <p:spPr>
+              <a:xfrm flipH="1">
+                <a:off x="2145799" y="2934929"/>
+                <a:ext cx="4607274" cy="0"/>
+              </a:xfrm>
+              <a:prstGeom prst="line">
+                <a:avLst/>
+              </a:prstGeom>
+              <a:ln w="9525">
+                <a:solidFill>
+                  <a:srgbClr val="FF0000"/>
+                </a:solidFill>
+                <a:headEnd type="triangle"/>
+              </a:ln>
+            </p:spPr>
+            <p:style>
+              <a:lnRef idx="2">
+                <a:schemeClr val="accent1"/>
+              </a:lnRef>
+              <a:fillRef idx="0">
+                <a:schemeClr val="accent1"/>
+              </a:fillRef>
+              <a:effectRef idx="1">
+                <a:schemeClr val="accent1"/>
+              </a:effectRef>
+              <a:fontRef idx="minor">
+                <a:schemeClr val="tx1"/>
+              </a:fontRef>
+            </p:style>
+          </p:cxnSp>
+          <p:sp>
+            <p:nvSpPr>
+              <p:cNvPr id="58" name="Rectangle 57">
+                <a:extLst>
+                  <a:ext uri="{FF2B5EF4-FFF2-40B4-BE49-F238E27FC236}">
+                    <a16:creationId xmlns:a16="http://schemas.microsoft.com/office/drawing/2014/main" id="{2D396F21-9B29-2E42-1089-F4B634C22103}"/>
+                  </a:ext>
+                </a:extLst>
+              </p:cNvPr>
+              <p:cNvSpPr/>
+              <p:nvPr/>
+            </p:nvSpPr>
+            <p:spPr>
+              <a:xfrm>
+                <a:off x="2145799" y="2684192"/>
+                <a:ext cx="2784678" cy="298861"/>
+              </a:xfrm>
+              <a:prstGeom prst="rect">
+                <a:avLst/>
+              </a:prstGeom>
+              <a:noFill/>
+              <a:ln w="9525">
+                <a:noFill/>
+              </a:ln>
+            </p:spPr>
+            <p:style>
+              <a:lnRef idx="2">
+                <a:schemeClr val="accent1">
+                  <a:shade val="15000"/>
+                </a:schemeClr>
+              </a:lnRef>
+              <a:fillRef idx="1">
+                <a:schemeClr val="accent1"/>
+              </a:fillRef>
+              <a:effectRef idx="0">
+                <a:schemeClr val="accent1"/>
+              </a:effectRef>
+              <a:fontRef idx="minor">
+                <a:schemeClr val="lt1"/>
+              </a:fontRef>
+            </p:style>
+            <p:txBody>
+              <a:bodyPr rtlCol="0" anchor="ctr"/>
+              <a:lstStyle/>
+              <a:p>
+                <a:r>
+                  <a:rPr lang="en-US" sz="1000" dirty="0">
+                    <a:solidFill>
+                      <a:srgbClr val="FF0000"/>
+                    </a:solidFill>
+                    <a:latin typeface="Avenir Book" panose="02000503020000020003" pitchFamily="2" charset="0"/>
+                  </a:rPr>
+                  <a:t>PUT client-registration</a:t>
+                </a:r>
+              </a:p>
+            </p:txBody>
+          </p:sp>
+        </p:grpSp>
+        <p:grpSp>
+          <p:nvGrpSpPr>
+            <p:cNvPr id="54" name="Group 53">
+              <a:extLst>
+                <a:ext uri="{FF2B5EF4-FFF2-40B4-BE49-F238E27FC236}">
+                  <a16:creationId xmlns:a16="http://schemas.microsoft.com/office/drawing/2014/main" id="{41A69A98-1D44-171B-BF83-373AADFBD424}"/>
+                </a:ext>
+              </a:extLst>
+            </p:cNvPr>
+            <p:cNvGrpSpPr/>
+            <p:nvPr/>
+          </p:nvGrpSpPr>
+          <p:grpSpPr>
+            <a:xfrm>
+              <a:off x="2145799" y="2997369"/>
+              <a:ext cx="4607274" cy="298861"/>
+              <a:chOff x="2145799" y="2684192"/>
+              <a:chExt cx="4607274" cy="298861"/>
+            </a:xfrm>
+          </p:grpSpPr>
+          <p:cxnSp>
+            <p:nvCxnSpPr>
+              <p:cNvPr id="55" name="Straight Connector 54">
+                <a:extLst>
+                  <a:ext uri="{FF2B5EF4-FFF2-40B4-BE49-F238E27FC236}">
+                    <a16:creationId xmlns:a16="http://schemas.microsoft.com/office/drawing/2014/main" id="{127435E4-4637-76A9-0C5F-D6C9CF13C3DA}"/>
+                  </a:ext>
+                </a:extLst>
+              </p:cNvPr>
+              <p:cNvCxnSpPr>
+                <a:cxnSpLocks/>
+              </p:cNvCxnSpPr>
+              <p:nvPr/>
+            </p:nvCxnSpPr>
+            <p:spPr>
+              <a:xfrm flipH="1">
+                <a:off x="2145799" y="2934929"/>
+                <a:ext cx="4607274" cy="0"/>
+              </a:xfrm>
+              <a:prstGeom prst="line">
+                <a:avLst/>
+              </a:prstGeom>
+              <a:ln w="9525">
+                <a:solidFill>
+                  <a:srgbClr val="FF0000"/>
+                </a:solidFill>
+                <a:headEnd type="triangle"/>
+              </a:ln>
+            </p:spPr>
+            <p:style>
+              <a:lnRef idx="2">
+                <a:schemeClr val="accent1"/>
+              </a:lnRef>
+              <a:fillRef idx="0">
+                <a:schemeClr val="accent1"/>
+              </a:fillRef>
+              <a:effectRef idx="1">
+                <a:schemeClr val="accent1"/>
+              </a:effectRef>
+              <a:fontRef idx="minor">
+                <a:schemeClr val="tx1"/>
+              </a:fontRef>
+            </p:style>
+          </p:cxnSp>
+          <p:sp>
+            <p:nvSpPr>
+              <p:cNvPr id="56" name="Rectangle 55">
+                <a:extLst>
+                  <a:ext uri="{FF2B5EF4-FFF2-40B4-BE49-F238E27FC236}">
+                    <a16:creationId xmlns:a16="http://schemas.microsoft.com/office/drawing/2014/main" id="{3928276B-7CC2-C69B-F819-F4EEF1C57120}"/>
+                  </a:ext>
+                </a:extLst>
+              </p:cNvPr>
+              <p:cNvSpPr/>
+              <p:nvPr/>
+            </p:nvSpPr>
+            <p:spPr>
+              <a:xfrm>
+                <a:off x="2145799" y="2684192"/>
+                <a:ext cx="2784678" cy="298861"/>
+              </a:xfrm>
+              <a:prstGeom prst="rect">
+                <a:avLst/>
+              </a:prstGeom>
+              <a:noFill/>
+              <a:ln w="9525">
+                <a:noFill/>
+              </a:ln>
+            </p:spPr>
+            <p:style>
+              <a:lnRef idx="2">
+                <a:schemeClr val="accent1">
+                  <a:shade val="15000"/>
+                </a:schemeClr>
+              </a:lnRef>
+              <a:fillRef idx="1">
+                <a:schemeClr val="accent1"/>
+              </a:fillRef>
+              <a:effectRef idx="0">
+                <a:schemeClr val="accent1"/>
+              </a:effectRef>
+              <a:fontRef idx="minor">
+                <a:schemeClr val="lt1"/>
+              </a:fontRef>
+            </p:style>
+            <p:txBody>
+              <a:bodyPr rtlCol="0" anchor="ctr"/>
+              <a:lstStyle/>
+              <a:p>
+                <a:r>
+                  <a:rPr lang="en-US" sz="1000" dirty="0">
+                    <a:solidFill>
+                      <a:srgbClr val="FF0000"/>
+                    </a:solidFill>
+                    <a:latin typeface="Avenir Book" panose="02000503020000020003" pitchFamily="2" charset="0"/>
+                  </a:rPr>
+                  <a:t>GET pre-shared-random-data</a:t>
+                </a:r>
+              </a:p>
+            </p:txBody>
+          </p:sp>
+        </p:grpSp>
+      </p:grpSp>
     </p:spTree>
     <p:extLst>
       <p:ext uri="{BB962C8B-B14F-4D97-AF65-F5344CB8AC3E}">
         <p14:creationId xmlns:p14="http://schemas.microsoft.com/office/powerpoint/2010/main" val="2243908987"/>
+      </p:ext>
+    </p:extLst>
+  </p:cSld>
+  <p:clrMapOvr>
+    <a:masterClrMapping/>
+  </p:clrMapOvr>
+</p:sld>
+</file>
+
+<file path=ppt/slides/slide3.xml><?xml version="1.0" encoding="utf-8"?>
+<p:sld xmlns:a="http://schemas.openxmlformats.org/drawingml/2006/main" xmlns:r="http://schemas.openxmlformats.org/officeDocument/2006/relationships" xmlns:p="http://schemas.openxmlformats.org/presentationml/2006/main">
+  <p:cSld>
+    <p:spTree>
+      <p:nvGrpSpPr>
+        <p:cNvPr id="1" name="">
+          <a:extLst>
+            <a:ext uri="{FF2B5EF4-FFF2-40B4-BE49-F238E27FC236}">
+              <a16:creationId xmlns:a16="http://schemas.microsoft.com/office/drawing/2014/main" id="{F4612488-BD3A-0934-3FB7-CAD432D8B117}"/>
+            </a:ext>
+          </a:extLst>
+        </p:cNvPr>
+        <p:cNvGrpSpPr/>
+        <p:nvPr/>
+      </p:nvGrpSpPr>
+      <p:grpSpPr>
+        <a:xfrm>
+          <a:off x="0" y="0"/>
+          <a:ext cx="0" cy="0"/>
+          <a:chOff x="0" y="0"/>
+          <a:chExt cx="0" cy="0"/>
+        </a:xfrm>
+      </p:grpSpPr>
+      <p:grpSp>
+        <p:nvGrpSpPr>
+          <p:cNvPr id="13" name="Group 12">
+            <a:extLst>
+              <a:ext uri="{FF2B5EF4-FFF2-40B4-BE49-F238E27FC236}">
+                <a16:creationId xmlns:a16="http://schemas.microsoft.com/office/drawing/2014/main" id="{E7EF711E-0297-4F9E-48A7-18E4148C4D96}"/>
+              </a:ext>
+            </a:extLst>
+          </p:cNvPr>
+          <p:cNvGrpSpPr/>
+          <p:nvPr/>
+        </p:nvGrpSpPr>
+        <p:grpSpPr>
+          <a:xfrm>
+            <a:off x="8510158" y="1434512"/>
+            <a:ext cx="600778" cy="3537023"/>
+            <a:chOff x="3608757" y="1282112"/>
+            <a:chExt cx="600778" cy="3537023"/>
+          </a:xfrm>
+        </p:grpSpPr>
+        <p:sp>
+          <p:nvSpPr>
+            <p:cNvPr id="2" name="Rectangle 1">
+              <a:extLst>
+                <a:ext uri="{FF2B5EF4-FFF2-40B4-BE49-F238E27FC236}">
+                  <a16:creationId xmlns:a16="http://schemas.microsoft.com/office/drawing/2014/main" id="{429A68AC-2BE3-8165-5DF8-91BF7AC7DB92}"/>
+                </a:ext>
+              </a:extLst>
+            </p:cNvPr>
+            <p:cNvSpPr/>
+            <p:nvPr/>
+          </p:nvSpPr>
+          <p:spPr>
+            <a:xfrm>
+              <a:off x="3608757" y="1282112"/>
+              <a:ext cx="600778" cy="600778"/>
+            </a:xfrm>
+            <a:prstGeom prst="rect">
+              <a:avLst/>
+            </a:prstGeom>
+            <a:solidFill>
+              <a:schemeClr val="tx2">
+                <a:lumMod val="10000"/>
+                <a:lumOff val="90000"/>
+              </a:schemeClr>
+            </a:solidFill>
+            <a:ln w="9525"/>
+          </p:spPr>
+          <p:style>
+            <a:lnRef idx="2">
+              <a:schemeClr val="accent1">
+                <a:shade val="15000"/>
+              </a:schemeClr>
+            </a:lnRef>
+            <a:fillRef idx="1">
+              <a:schemeClr val="accent1"/>
+            </a:fillRef>
+            <a:effectRef idx="0">
+              <a:schemeClr val="accent1"/>
+            </a:effectRef>
+            <a:fontRef idx="minor">
+              <a:schemeClr val="lt1"/>
+            </a:fontRef>
+          </p:style>
+          <p:txBody>
+            <a:bodyPr rtlCol="0" anchor="ctr"/>
+            <a:lstStyle/>
+            <a:p>
+              <a:pPr algn="ctr"/>
+              <a:r>
+                <a:rPr lang="en-US" sz="1000" dirty="0">
+                  <a:solidFill>
+                    <a:schemeClr val="tx1"/>
+                  </a:solidFill>
+                  <a:latin typeface="Avenir Book" panose="02000503020000020003" pitchFamily="2" charset="0"/>
+                </a:rPr>
+                <a:t>Conny</a:t>
+              </a:r>
+            </a:p>
+          </p:txBody>
+        </p:sp>
+        <p:cxnSp>
+          <p:nvCxnSpPr>
+            <p:cNvPr id="3" name="Straight Connector 2">
+              <a:extLst>
+                <a:ext uri="{FF2B5EF4-FFF2-40B4-BE49-F238E27FC236}">
+                  <a16:creationId xmlns:a16="http://schemas.microsoft.com/office/drawing/2014/main" id="{9F686646-6167-4992-1D29-77D8607269FE}"/>
+                </a:ext>
+              </a:extLst>
+            </p:cNvPr>
+            <p:cNvCxnSpPr>
+              <a:cxnSpLocks/>
+              <a:stCxn id="2" idx="2"/>
+            </p:cNvCxnSpPr>
+            <p:nvPr/>
+          </p:nvCxnSpPr>
+          <p:spPr>
+            <a:xfrm>
+              <a:off x="3909146" y="1882890"/>
+              <a:ext cx="0" cy="2936245"/>
+            </a:xfrm>
+            <a:prstGeom prst="line">
+              <a:avLst/>
+            </a:prstGeom>
+            <a:ln w="9525">
+              <a:solidFill>
+                <a:schemeClr val="tx1"/>
+              </a:solidFill>
+            </a:ln>
+          </p:spPr>
+          <p:style>
+            <a:lnRef idx="2">
+              <a:schemeClr val="accent1"/>
+            </a:lnRef>
+            <a:fillRef idx="0">
+              <a:schemeClr val="accent1"/>
+            </a:fillRef>
+            <a:effectRef idx="1">
+              <a:schemeClr val="accent1"/>
+            </a:effectRef>
+            <a:fontRef idx="minor">
+              <a:schemeClr val="tx1"/>
+            </a:fontRef>
+          </p:style>
+        </p:cxnSp>
+      </p:grpSp>
+      <p:grpSp>
+        <p:nvGrpSpPr>
+          <p:cNvPr id="14" name="Group 13">
+            <a:extLst>
+              <a:ext uri="{FF2B5EF4-FFF2-40B4-BE49-F238E27FC236}">
+                <a16:creationId xmlns:a16="http://schemas.microsoft.com/office/drawing/2014/main" id="{35DD520D-BC11-13C9-083E-D310BA03708B}"/>
+              </a:ext>
+            </a:extLst>
+          </p:cNvPr>
+          <p:cNvGrpSpPr/>
+          <p:nvPr/>
+        </p:nvGrpSpPr>
+        <p:grpSpPr>
+          <a:xfrm>
+            <a:off x="2992741" y="1434512"/>
+            <a:ext cx="600778" cy="3537023"/>
+            <a:chOff x="3608757" y="1282112"/>
+            <a:chExt cx="600778" cy="3537023"/>
+          </a:xfrm>
+        </p:grpSpPr>
+        <p:sp>
+          <p:nvSpPr>
+            <p:cNvPr id="15" name="Rectangle 14">
+              <a:extLst>
+                <a:ext uri="{FF2B5EF4-FFF2-40B4-BE49-F238E27FC236}">
+                  <a16:creationId xmlns:a16="http://schemas.microsoft.com/office/drawing/2014/main" id="{B92C6239-B889-9882-3728-BA3AA1D26B43}"/>
+                </a:ext>
+              </a:extLst>
+            </p:cNvPr>
+            <p:cNvSpPr/>
+            <p:nvPr/>
+          </p:nvSpPr>
+          <p:spPr>
+            <a:xfrm>
+              <a:off x="3608757" y="1282112"/>
+              <a:ext cx="600778" cy="600778"/>
+            </a:xfrm>
+            <a:prstGeom prst="rect">
+              <a:avLst/>
+            </a:prstGeom>
+            <a:solidFill>
+              <a:schemeClr val="tx2">
+                <a:lumMod val="10000"/>
+                <a:lumOff val="90000"/>
+              </a:schemeClr>
+            </a:solidFill>
+            <a:ln w="9525"/>
+          </p:spPr>
+          <p:style>
+            <a:lnRef idx="2">
+              <a:schemeClr val="accent1">
+                <a:shade val="15000"/>
+              </a:schemeClr>
+            </a:lnRef>
+            <a:fillRef idx="1">
+              <a:schemeClr val="accent1"/>
+            </a:fillRef>
+            <a:effectRef idx="0">
+              <a:schemeClr val="accent1"/>
+            </a:effectRef>
+            <a:fontRef idx="minor">
+              <a:schemeClr val="lt1"/>
+            </a:fontRef>
+          </p:style>
+          <p:txBody>
+            <a:bodyPr rtlCol="0" anchor="ctr"/>
+            <a:lstStyle/>
+            <a:p>
+              <a:pPr algn="ctr"/>
+              <a:r>
+                <a:rPr lang="en-US" sz="1000" dirty="0">
+                  <a:solidFill>
+                    <a:schemeClr val="tx1"/>
+                  </a:solidFill>
+                  <a:latin typeface="Avenir Book" panose="02000503020000020003" pitchFamily="2" charset="0"/>
+                </a:rPr>
+                <a:t>Carol</a:t>
+              </a:r>
+            </a:p>
+          </p:txBody>
+        </p:sp>
+        <p:cxnSp>
+          <p:nvCxnSpPr>
+            <p:cNvPr id="16" name="Straight Connector 15">
+              <a:extLst>
+                <a:ext uri="{FF2B5EF4-FFF2-40B4-BE49-F238E27FC236}">
+                  <a16:creationId xmlns:a16="http://schemas.microsoft.com/office/drawing/2014/main" id="{723F08AE-809E-C032-D548-E3CA535D39A5}"/>
+                </a:ext>
+              </a:extLst>
+            </p:cNvPr>
+            <p:cNvCxnSpPr>
+              <a:cxnSpLocks/>
+              <a:stCxn id="15" idx="2"/>
+            </p:cNvCxnSpPr>
+            <p:nvPr/>
+          </p:nvCxnSpPr>
+          <p:spPr>
+            <a:xfrm>
+              <a:off x="3909146" y="1882890"/>
+              <a:ext cx="0" cy="2936245"/>
+            </a:xfrm>
+            <a:prstGeom prst="line">
+              <a:avLst/>
+            </a:prstGeom>
+            <a:ln w="9525">
+              <a:solidFill>
+                <a:schemeClr val="tx1"/>
+              </a:solidFill>
+            </a:ln>
+          </p:spPr>
+          <p:style>
+            <a:lnRef idx="2">
+              <a:schemeClr val="accent1"/>
+            </a:lnRef>
+            <a:fillRef idx="0">
+              <a:schemeClr val="accent1"/>
+            </a:fillRef>
+            <a:effectRef idx="1">
+              <a:schemeClr val="accent1"/>
+            </a:effectRef>
+            <a:fontRef idx="minor">
+              <a:schemeClr val="tx1"/>
+            </a:fontRef>
+          </p:style>
+        </p:cxnSp>
+      </p:grpSp>
+      <p:grpSp>
+        <p:nvGrpSpPr>
+          <p:cNvPr id="20" name="Group 19">
+            <a:extLst>
+              <a:ext uri="{FF2B5EF4-FFF2-40B4-BE49-F238E27FC236}">
+                <a16:creationId xmlns:a16="http://schemas.microsoft.com/office/drawing/2014/main" id="{048FE7B4-3B4B-0BFB-672A-04364DE09667}"/>
+              </a:ext>
+            </a:extLst>
+          </p:cNvPr>
+          <p:cNvGrpSpPr/>
+          <p:nvPr/>
+        </p:nvGrpSpPr>
+        <p:grpSpPr>
+          <a:xfrm>
+            <a:off x="5041237" y="1434512"/>
+            <a:ext cx="600777" cy="3537023"/>
+            <a:chOff x="4840314" y="1500414"/>
+            <a:chExt cx="600777" cy="3537023"/>
+          </a:xfrm>
+        </p:grpSpPr>
+        <p:sp>
+          <p:nvSpPr>
+            <p:cNvPr id="17" name="Oval 16">
+              <a:extLst>
+                <a:ext uri="{FF2B5EF4-FFF2-40B4-BE49-F238E27FC236}">
+                  <a16:creationId xmlns:a16="http://schemas.microsoft.com/office/drawing/2014/main" id="{6153BA0C-1699-9304-C16C-71BE54A7C4D9}"/>
+                </a:ext>
+              </a:extLst>
+            </p:cNvPr>
+            <p:cNvSpPr/>
+            <p:nvPr/>
+          </p:nvSpPr>
+          <p:spPr>
+            <a:xfrm>
+              <a:off x="4840314" y="1500414"/>
+              <a:ext cx="600777" cy="600778"/>
+            </a:xfrm>
+            <a:prstGeom prst="ellipse">
+              <a:avLst/>
+            </a:prstGeom>
+            <a:solidFill>
+              <a:schemeClr val="tx2">
+                <a:lumMod val="10000"/>
+                <a:lumOff val="90000"/>
+              </a:schemeClr>
+            </a:solidFill>
+            <a:ln w="6350"/>
+          </p:spPr>
+          <p:style>
+            <a:lnRef idx="2">
+              <a:schemeClr val="accent1">
+                <a:shade val="15000"/>
+              </a:schemeClr>
+            </a:lnRef>
+            <a:fillRef idx="1">
+              <a:schemeClr val="accent1"/>
+            </a:fillRef>
+            <a:effectRef idx="0">
+              <a:schemeClr val="accent1"/>
+            </a:effectRef>
+            <a:fontRef idx="minor">
+              <a:schemeClr val="lt1"/>
+            </a:fontRef>
+          </p:style>
+          <p:txBody>
+            <a:bodyPr lIns="0" tIns="0" rIns="0" bIns="0" rtlCol="0" anchor="ctr"/>
+            <a:lstStyle/>
+            <a:p>
+              <a:pPr algn="ctr"/>
+              <a:r>
+                <a:rPr lang="en-US" sz="1000" dirty="0">
+                  <a:solidFill>
+                    <a:schemeClr val="tx1"/>
+                  </a:solidFill>
+                  <a:latin typeface="AVENIR LIGHT OBLIQUE" panose="020B0402020203090204" pitchFamily="34" charset="77"/>
+                </a:rPr>
+                <a:t>Hank</a:t>
+              </a:r>
+            </a:p>
+          </p:txBody>
+        </p:sp>
+        <p:cxnSp>
+          <p:nvCxnSpPr>
+            <p:cNvPr id="18" name="Straight Connector 17">
+              <a:extLst>
+                <a:ext uri="{FF2B5EF4-FFF2-40B4-BE49-F238E27FC236}">
+                  <a16:creationId xmlns:a16="http://schemas.microsoft.com/office/drawing/2014/main" id="{0CC99823-5A86-F169-19FA-970A7C80AC95}"/>
+                </a:ext>
+              </a:extLst>
+            </p:cNvPr>
+            <p:cNvCxnSpPr>
+              <a:cxnSpLocks/>
+              <a:stCxn id="17" idx="4"/>
+            </p:cNvCxnSpPr>
+            <p:nvPr/>
+          </p:nvCxnSpPr>
+          <p:spPr>
+            <a:xfrm>
+              <a:off x="5140703" y="2101192"/>
+              <a:ext cx="4410" cy="2936245"/>
+            </a:xfrm>
+            <a:prstGeom prst="line">
+              <a:avLst/>
+            </a:prstGeom>
+            <a:ln w="9525">
+              <a:solidFill>
+                <a:schemeClr val="tx1"/>
+              </a:solidFill>
+            </a:ln>
+          </p:spPr>
+          <p:style>
+            <a:lnRef idx="2">
+              <a:schemeClr val="accent1"/>
+            </a:lnRef>
+            <a:fillRef idx="0">
+              <a:schemeClr val="accent1"/>
+            </a:fillRef>
+            <a:effectRef idx="1">
+              <a:schemeClr val="accent1"/>
+            </a:effectRef>
+            <a:fontRef idx="minor">
+              <a:schemeClr val="tx1"/>
+            </a:fontRef>
+          </p:style>
+        </p:cxnSp>
+      </p:grpSp>
+      <p:grpSp>
+        <p:nvGrpSpPr>
+          <p:cNvPr id="21" name="Group 20">
+            <a:extLst>
+              <a:ext uri="{FF2B5EF4-FFF2-40B4-BE49-F238E27FC236}">
+                <a16:creationId xmlns:a16="http://schemas.microsoft.com/office/drawing/2014/main" id="{9A27BF8A-DA36-7628-B1D4-A4F9DA31A7C2}"/>
+              </a:ext>
+            </a:extLst>
+          </p:cNvPr>
+          <p:cNvGrpSpPr/>
+          <p:nvPr/>
+        </p:nvGrpSpPr>
+        <p:grpSpPr>
+          <a:xfrm>
+            <a:off x="6452685" y="1434512"/>
+            <a:ext cx="600777" cy="3537023"/>
+            <a:chOff x="4840314" y="1500414"/>
+            <a:chExt cx="600777" cy="3537023"/>
+          </a:xfrm>
+        </p:grpSpPr>
+        <p:sp>
+          <p:nvSpPr>
+            <p:cNvPr id="22" name="Oval 21">
+              <a:extLst>
+                <a:ext uri="{FF2B5EF4-FFF2-40B4-BE49-F238E27FC236}">
+                  <a16:creationId xmlns:a16="http://schemas.microsoft.com/office/drawing/2014/main" id="{5EC12F80-7B6F-4C76-1071-421B8522C1C1}"/>
+                </a:ext>
+              </a:extLst>
+            </p:cNvPr>
+            <p:cNvSpPr/>
+            <p:nvPr/>
+          </p:nvSpPr>
+          <p:spPr>
+            <a:xfrm>
+              <a:off x="4840314" y="1500414"/>
+              <a:ext cx="600777" cy="600778"/>
+            </a:xfrm>
+            <a:prstGeom prst="ellipse">
+              <a:avLst/>
+            </a:prstGeom>
+            <a:solidFill>
+              <a:schemeClr val="tx2">
+                <a:lumMod val="10000"/>
+                <a:lumOff val="90000"/>
+              </a:schemeClr>
+            </a:solidFill>
+            <a:ln w="6350"/>
+          </p:spPr>
+          <p:style>
+            <a:lnRef idx="2">
+              <a:schemeClr val="accent1">
+                <a:shade val="15000"/>
+              </a:schemeClr>
+            </a:lnRef>
+            <a:fillRef idx="1">
+              <a:schemeClr val="accent1"/>
+            </a:fillRef>
+            <a:effectRef idx="0">
+              <a:schemeClr val="accent1"/>
+            </a:effectRef>
+            <a:fontRef idx="minor">
+              <a:schemeClr val="lt1"/>
+            </a:fontRef>
+          </p:style>
+          <p:txBody>
+            <a:bodyPr lIns="0" tIns="0" rIns="0" bIns="0" rtlCol="0" anchor="ctr"/>
+            <a:lstStyle/>
+            <a:p>
+              <a:pPr algn="ctr"/>
+              <a:r>
+                <a:rPr lang="en-US" sz="1000" dirty="0">
+                  <a:solidFill>
+                    <a:schemeClr val="tx1"/>
+                  </a:solidFill>
+                  <a:latin typeface="AVENIR LIGHT OBLIQUE" panose="020B0402020203090204" pitchFamily="34" charset="77"/>
+                </a:rPr>
+                <a:t>Holly</a:t>
+              </a:r>
+            </a:p>
+          </p:txBody>
+        </p:sp>
+        <p:cxnSp>
+          <p:nvCxnSpPr>
+            <p:cNvPr id="23" name="Straight Connector 22">
+              <a:extLst>
+                <a:ext uri="{FF2B5EF4-FFF2-40B4-BE49-F238E27FC236}">
+                  <a16:creationId xmlns:a16="http://schemas.microsoft.com/office/drawing/2014/main" id="{CA9C7910-E0AB-4993-516B-B8E1D3D4A3CF}"/>
+                </a:ext>
+              </a:extLst>
+            </p:cNvPr>
+            <p:cNvCxnSpPr>
+              <a:cxnSpLocks/>
+              <a:stCxn id="22" idx="4"/>
+            </p:cNvCxnSpPr>
+            <p:nvPr/>
+          </p:nvCxnSpPr>
+          <p:spPr>
+            <a:xfrm>
+              <a:off x="5140703" y="2101192"/>
+              <a:ext cx="4410" cy="2936245"/>
+            </a:xfrm>
+            <a:prstGeom prst="line">
+              <a:avLst/>
+            </a:prstGeom>
+            <a:ln w="9525">
+              <a:solidFill>
+                <a:schemeClr val="tx1"/>
+              </a:solidFill>
+            </a:ln>
+          </p:spPr>
+          <p:style>
+            <a:lnRef idx="2">
+              <a:schemeClr val="accent1"/>
+            </a:lnRef>
+            <a:fillRef idx="0">
+              <a:schemeClr val="accent1"/>
+            </a:fillRef>
+            <a:effectRef idx="1">
+              <a:schemeClr val="accent1"/>
+            </a:effectRef>
+            <a:fontRef idx="minor">
+              <a:schemeClr val="tx1"/>
+            </a:fontRef>
+          </p:style>
+        </p:cxnSp>
+      </p:grpSp>
+      <p:sp>
+        <p:nvSpPr>
+          <p:cNvPr id="24" name="Rectangle 23">
+            <a:extLst>
+              <a:ext uri="{FF2B5EF4-FFF2-40B4-BE49-F238E27FC236}">
+                <a16:creationId xmlns:a16="http://schemas.microsoft.com/office/drawing/2014/main" id="{46921A29-58B5-7398-6A3E-78FCA4CE9A42}"/>
+              </a:ext>
+            </a:extLst>
+          </p:cNvPr>
+          <p:cNvSpPr/>
+          <p:nvPr/>
+        </p:nvSpPr>
+        <p:spPr>
+          <a:xfrm>
+            <a:off x="575426" y="1027238"/>
+            <a:ext cx="11045074" cy="4396250"/>
+          </a:xfrm>
+          <a:prstGeom prst="rect">
+            <a:avLst/>
+          </a:prstGeom>
+          <a:noFill/>
+          <a:ln w="9525">
+            <a:solidFill>
+              <a:schemeClr val="bg1">
+                <a:lumMod val="65000"/>
+              </a:schemeClr>
+            </a:solidFill>
+          </a:ln>
+        </p:spPr>
+        <p:style>
+          <a:lnRef idx="2">
+            <a:schemeClr val="accent1">
+              <a:shade val="15000"/>
+            </a:schemeClr>
+          </a:lnRef>
+          <a:fillRef idx="1">
+            <a:schemeClr val="accent1"/>
+          </a:fillRef>
+          <a:effectRef idx="0">
+            <a:schemeClr val="accent1"/>
+          </a:effectRef>
+          <a:fontRef idx="minor">
+            <a:schemeClr val="lt1"/>
+          </a:fontRef>
+        </p:style>
+        <p:txBody>
+          <a:bodyPr rtlCol="0" anchor="ctr"/>
+          <a:lstStyle/>
+          <a:p>
+            <a:pPr algn="ctr"/>
+            <a:endParaRPr lang="en-US" sz="1000" dirty="0">
+              <a:solidFill>
+                <a:schemeClr val="tx1"/>
+              </a:solidFill>
+              <a:latin typeface="Avenir Book" panose="02000503020000020003" pitchFamily="2" charset="0"/>
+            </a:endParaRPr>
+          </a:p>
+        </p:txBody>
+      </p:sp>
+      <p:sp>
+        <p:nvSpPr>
+          <p:cNvPr id="25" name="Rectangle 24">
+            <a:extLst>
+              <a:ext uri="{FF2B5EF4-FFF2-40B4-BE49-F238E27FC236}">
+                <a16:creationId xmlns:a16="http://schemas.microsoft.com/office/drawing/2014/main" id="{61FA4103-79E9-0B1D-8B6B-F0F0C8B01950}"/>
+              </a:ext>
+            </a:extLst>
+          </p:cNvPr>
+          <p:cNvSpPr/>
+          <p:nvPr/>
+        </p:nvSpPr>
+        <p:spPr>
+          <a:xfrm>
+            <a:off x="5462324" y="1301780"/>
+            <a:ext cx="1203948" cy="600778"/>
+          </a:xfrm>
+          <a:prstGeom prst="rect">
+            <a:avLst/>
+          </a:prstGeom>
+          <a:noFill/>
+          <a:ln w="9525">
+            <a:noFill/>
+          </a:ln>
+        </p:spPr>
+        <p:style>
+          <a:lnRef idx="2">
+            <a:schemeClr val="accent1">
+              <a:shade val="15000"/>
+            </a:schemeClr>
+          </a:lnRef>
+          <a:fillRef idx="1">
+            <a:schemeClr val="accent1"/>
+          </a:fillRef>
+          <a:effectRef idx="0">
+            <a:schemeClr val="accent1"/>
+          </a:effectRef>
+          <a:fontRef idx="minor">
+            <a:schemeClr val="lt1"/>
+          </a:fontRef>
+        </p:style>
+        <p:txBody>
+          <a:bodyPr rtlCol="0" anchor="ctr"/>
+          <a:lstStyle/>
+          <a:p>
+            <a:pPr algn="ctr"/>
+            <a:r>
+              <a:rPr lang="en-US" sz="4000" dirty="0">
+                <a:solidFill>
+                  <a:schemeClr val="tx1"/>
+                </a:solidFill>
+                <a:latin typeface="Avenir Book" panose="02000503020000020003" pitchFamily="2" charset="0"/>
+              </a:rPr>
+              <a:t>...</a:t>
+            </a:r>
+          </a:p>
+        </p:txBody>
+      </p:sp>
+      <p:grpSp>
+        <p:nvGrpSpPr>
+          <p:cNvPr id="26" name="Group 25">
+            <a:extLst>
+              <a:ext uri="{FF2B5EF4-FFF2-40B4-BE49-F238E27FC236}">
+                <a16:creationId xmlns:a16="http://schemas.microsoft.com/office/drawing/2014/main" id="{A1F24D39-EEA4-53CC-3F72-2A47F83B40EC}"/>
+              </a:ext>
+            </a:extLst>
+          </p:cNvPr>
+          <p:cNvGrpSpPr/>
+          <p:nvPr/>
+        </p:nvGrpSpPr>
+        <p:grpSpPr>
+          <a:xfrm>
+            <a:off x="911322" y="1411212"/>
+            <a:ext cx="624076" cy="3560323"/>
+            <a:chOff x="911322" y="1411212"/>
+            <a:chExt cx="624076" cy="3560323"/>
+          </a:xfrm>
+        </p:grpSpPr>
+        <p:sp>
+          <p:nvSpPr>
+            <p:cNvPr id="4" name="Regular Pentagon 3">
+              <a:extLst>
+                <a:ext uri="{FF2B5EF4-FFF2-40B4-BE49-F238E27FC236}">
+                  <a16:creationId xmlns:a16="http://schemas.microsoft.com/office/drawing/2014/main" id="{C223F1F4-E632-DC29-2EAD-3100152D3F31}"/>
+                </a:ext>
+              </a:extLst>
+            </p:cNvPr>
+            <p:cNvSpPr/>
+            <p:nvPr/>
+          </p:nvSpPr>
+          <p:spPr>
+            <a:xfrm>
+              <a:off x="911322" y="1411212"/>
+              <a:ext cx="624076" cy="624078"/>
+            </a:xfrm>
+            <a:prstGeom prst="pentagon">
+              <a:avLst/>
+            </a:prstGeom>
+            <a:solidFill>
+              <a:schemeClr val="accent6">
+                <a:lumMod val="20000"/>
+                <a:lumOff val="80000"/>
+              </a:schemeClr>
+            </a:solidFill>
+            <a:ln w="9525">
+              <a:solidFill>
+                <a:schemeClr val="tx1"/>
+              </a:solidFill>
+            </a:ln>
+          </p:spPr>
+          <p:style>
+            <a:lnRef idx="2">
+              <a:schemeClr val="accent1">
+                <a:shade val="15000"/>
+              </a:schemeClr>
+            </a:lnRef>
+            <a:fillRef idx="1">
+              <a:schemeClr val="accent1"/>
+            </a:fillRef>
+            <a:effectRef idx="0">
+              <a:schemeClr val="accent1"/>
+            </a:effectRef>
+            <a:fontRef idx="minor">
+              <a:schemeClr val="lt1"/>
+            </a:fontRef>
+          </p:style>
+          <p:txBody>
+            <a:bodyPr lIns="0" tIns="0" rIns="0" bIns="0" rtlCol="0" anchor="ctr"/>
+            <a:lstStyle/>
+            <a:p>
+              <a:pPr algn="ctr"/>
+              <a:r>
+                <a:rPr lang="en-US" sz="1000" dirty="0">
+                  <a:solidFill>
+                    <a:schemeClr val="tx1"/>
+                  </a:solidFill>
+                  <a:latin typeface="Avenir Book" panose="02000503020000020003" pitchFamily="2" charset="0"/>
+                </a:rPr>
+                <a:t>Patrick</a:t>
+              </a:r>
+            </a:p>
+          </p:txBody>
+        </p:sp>
+        <p:cxnSp>
+          <p:nvCxnSpPr>
+            <p:cNvPr id="9" name="Straight Connector 8">
+              <a:extLst>
+                <a:ext uri="{FF2B5EF4-FFF2-40B4-BE49-F238E27FC236}">
+                  <a16:creationId xmlns:a16="http://schemas.microsoft.com/office/drawing/2014/main" id="{2D67388C-EB4E-E7EA-AA48-DA18FE69C20D}"/>
+                </a:ext>
+              </a:extLst>
+            </p:cNvPr>
+            <p:cNvCxnSpPr>
+              <a:cxnSpLocks/>
+              <a:stCxn id="4" idx="3"/>
+            </p:cNvCxnSpPr>
+            <p:nvPr/>
+          </p:nvCxnSpPr>
+          <p:spPr>
+            <a:xfrm>
+              <a:off x="1223360" y="2035290"/>
+              <a:ext cx="0" cy="2936245"/>
+            </a:xfrm>
+            <a:prstGeom prst="line">
+              <a:avLst/>
+            </a:prstGeom>
+            <a:ln w="9525">
+              <a:solidFill>
+                <a:schemeClr val="tx1"/>
+              </a:solidFill>
+            </a:ln>
+          </p:spPr>
+          <p:style>
+            <a:lnRef idx="2">
+              <a:schemeClr val="accent1"/>
+            </a:lnRef>
+            <a:fillRef idx="0">
+              <a:schemeClr val="accent1"/>
+            </a:fillRef>
+            <a:effectRef idx="1">
+              <a:schemeClr val="accent1"/>
+            </a:effectRef>
+            <a:fontRef idx="minor">
+              <a:schemeClr val="tx1"/>
+            </a:fontRef>
+          </p:style>
+        </p:cxnSp>
+      </p:grpSp>
+      <p:grpSp>
+        <p:nvGrpSpPr>
+          <p:cNvPr id="28" name="Group 27">
+            <a:extLst>
+              <a:ext uri="{FF2B5EF4-FFF2-40B4-BE49-F238E27FC236}">
+                <a16:creationId xmlns:a16="http://schemas.microsoft.com/office/drawing/2014/main" id="{A736EB56-BD6C-9F79-8F11-846615AE129B}"/>
+              </a:ext>
+            </a:extLst>
+          </p:cNvPr>
+          <p:cNvGrpSpPr/>
+          <p:nvPr/>
+        </p:nvGrpSpPr>
+        <p:grpSpPr>
+          <a:xfrm>
+            <a:off x="10567632" y="1411212"/>
+            <a:ext cx="624076" cy="3560323"/>
+            <a:chOff x="911322" y="1411212"/>
+            <a:chExt cx="624076" cy="3560323"/>
+          </a:xfrm>
+        </p:grpSpPr>
+        <p:sp>
+          <p:nvSpPr>
+            <p:cNvPr id="29" name="Regular Pentagon 28">
+              <a:extLst>
+                <a:ext uri="{FF2B5EF4-FFF2-40B4-BE49-F238E27FC236}">
+                  <a16:creationId xmlns:a16="http://schemas.microsoft.com/office/drawing/2014/main" id="{D7AB490C-8238-0760-C2CA-8D6642DC5189}"/>
+                </a:ext>
+              </a:extLst>
+            </p:cNvPr>
+            <p:cNvSpPr/>
+            <p:nvPr/>
+          </p:nvSpPr>
+          <p:spPr>
+            <a:xfrm>
+              <a:off x="911322" y="1411212"/>
+              <a:ext cx="624076" cy="624078"/>
+            </a:xfrm>
+            <a:prstGeom prst="pentagon">
+              <a:avLst/>
+            </a:prstGeom>
+            <a:solidFill>
+              <a:schemeClr val="accent6">
+                <a:lumMod val="20000"/>
+                <a:lumOff val="80000"/>
+              </a:schemeClr>
+            </a:solidFill>
+            <a:ln w="9525">
+              <a:solidFill>
+                <a:schemeClr val="tx1"/>
+              </a:solidFill>
+            </a:ln>
+          </p:spPr>
+          <p:style>
+            <a:lnRef idx="2">
+              <a:schemeClr val="accent1">
+                <a:shade val="15000"/>
+              </a:schemeClr>
+            </a:lnRef>
+            <a:fillRef idx="1">
+              <a:schemeClr val="accent1"/>
+            </a:fillRef>
+            <a:effectRef idx="0">
+              <a:schemeClr val="accent1"/>
+            </a:effectRef>
+            <a:fontRef idx="minor">
+              <a:schemeClr val="lt1"/>
+            </a:fontRef>
+          </p:style>
+          <p:txBody>
+            <a:bodyPr lIns="0" tIns="0" rIns="0" bIns="0" rtlCol="0" anchor="ctr"/>
+            <a:lstStyle/>
+            <a:p>
+              <a:pPr algn="ctr"/>
+              <a:r>
+                <a:rPr lang="en-US" sz="1000" dirty="0">
+                  <a:solidFill>
+                    <a:schemeClr val="tx1"/>
+                  </a:solidFill>
+                  <a:latin typeface="Avenir Book" panose="02000503020000020003" pitchFamily="2" charset="0"/>
+                </a:rPr>
+                <a:t>Patrick</a:t>
+              </a:r>
+            </a:p>
+          </p:txBody>
+        </p:sp>
+        <p:cxnSp>
+          <p:nvCxnSpPr>
+            <p:cNvPr id="43" name="Straight Connector 42">
+              <a:extLst>
+                <a:ext uri="{FF2B5EF4-FFF2-40B4-BE49-F238E27FC236}">
+                  <a16:creationId xmlns:a16="http://schemas.microsoft.com/office/drawing/2014/main" id="{3A47B77B-B9C7-9F86-3A25-9DDEE50FABBE}"/>
+                </a:ext>
+              </a:extLst>
+            </p:cNvPr>
+            <p:cNvCxnSpPr>
+              <a:cxnSpLocks/>
+              <a:stCxn id="29" idx="3"/>
+            </p:cNvCxnSpPr>
+            <p:nvPr/>
+          </p:nvCxnSpPr>
+          <p:spPr>
+            <a:xfrm>
+              <a:off x="1223360" y="2035290"/>
+              <a:ext cx="0" cy="2936245"/>
+            </a:xfrm>
+            <a:prstGeom prst="line">
+              <a:avLst/>
+            </a:prstGeom>
+            <a:ln w="9525">
+              <a:solidFill>
+                <a:schemeClr val="tx1"/>
+              </a:solidFill>
+            </a:ln>
+          </p:spPr>
+          <p:style>
+            <a:lnRef idx="2">
+              <a:schemeClr val="accent1"/>
+            </a:lnRef>
+            <a:fillRef idx="0">
+              <a:schemeClr val="accent1"/>
+            </a:fillRef>
+            <a:effectRef idx="1">
+              <a:schemeClr val="accent1"/>
+            </a:effectRef>
+            <a:fontRef idx="minor">
+              <a:schemeClr val="tx1"/>
+            </a:fontRef>
+          </p:style>
+        </p:cxnSp>
+      </p:grpSp>
+      <p:grpSp>
+        <p:nvGrpSpPr>
+          <p:cNvPr id="92" name="Group 91">
+            <a:extLst>
+              <a:ext uri="{FF2B5EF4-FFF2-40B4-BE49-F238E27FC236}">
+                <a16:creationId xmlns:a16="http://schemas.microsoft.com/office/drawing/2014/main" id="{F8548963-714B-AA39-724F-7517FE20440D}"/>
+              </a:ext>
+            </a:extLst>
+          </p:cNvPr>
+          <p:cNvGrpSpPr/>
+          <p:nvPr/>
+        </p:nvGrpSpPr>
+        <p:grpSpPr>
+          <a:xfrm>
+            <a:off x="1217284" y="2098130"/>
+            <a:ext cx="5535789" cy="894811"/>
+            <a:chOff x="1217284" y="2047330"/>
+            <a:chExt cx="5535789" cy="894811"/>
+          </a:xfrm>
+        </p:grpSpPr>
+        <p:grpSp>
+          <p:nvGrpSpPr>
+            <p:cNvPr id="62" name="Group 61">
+              <a:extLst>
+                <a:ext uri="{FF2B5EF4-FFF2-40B4-BE49-F238E27FC236}">
+                  <a16:creationId xmlns:a16="http://schemas.microsoft.com/office/drawing/2014/main" id="{FBDDC775-6BB0-7841-27E6-4318EE492888}"/>
+                </a:ext>
+              </a:extLst>
+            </p:cNvPr>
+            <p:cNvGrpSpPr/>
+            <p:nvPr/>
+          </p:nvGrpSpPr>
+          <p:grpSpPr>
+            <a:xfrm>
+              <a:off x="1223360" y="2047330"/>
+              <a:ext cx="2013616" cy="298861"/>
+              <a:chOff x="2145799" y="2684192"/>
+              <a:chExt cx="3115997" cy="298861"/>
+            </a:xfrm>
+          </p:grpSpPr>
+          <p:cxnSp>
+            <p:nvCxnSpPr>
+              <p:cNvPr id="66" name="Straight Connector 65">
+                <a:extLst>
+                  <a:ext uri="{FF2B5EF4-FFF2-40B4-BE49-F238E27FC236}">
+                    <a16:creationId xmlns:a16="http://schemas.microsoft.com/office/drawing/2014/main" id="{3461BD3E-CD27-4531-5BF0-C2D8ED723FFF}"/>
+                  </a:ext>
+                </a:extLst>
+              </p:cNvPr>
+              <p:cNvCxnSpPr>
+                <a:cxnSpLocks/>
+              </p:cNvCxnSpPr>
+              <p:nvPr/>
+            </p:nvCxnSpPr>
+            <p:spPr>
+              <a:xfrm flipH="1">
+                <a:off x="2145799" y="2934929"/>
+                <a:ext cx="3115997" cy="0"/>
+              </a:xfrm>
+              <a:prstGeom prst="line">
+                <a:avLst/>
+              </a:prstGeom>
+              <a:ln w="9525">
+                <a:solidFill>
+                  <a:srgbClr val="FF0000"/>
+                </a:solidFill>
+                <a:headEnd type="triangle"/>
+              </a:ln>
+            </p:spPr>
+            <p:style>
+              <a:lnRef idx="2">
+                <a:schemeClr val="accent1"/>
+              </a:lnRef>
+              <a:fillRef idx="0">
+                <a:schemeClr val="accent1"/>
+              </a:fillRef>
+              <a:effectRef idx="1">
+                <a:schemeClr val="accent1"/>
+              </a:effectRef>
+              <a:fontRef idx="minor">
+                <a:schemeClr val="tx1"/>
+              </a:fontRef>
+            </p:style>
+          </p:cxnSp>
+          <p:sp>
+            <p:nvSpPr>
+              <p:cNvPr id="67" name="Rectangle 66">
+                <a:extLst>
+                  <a:ext uri="{FF2B5EF4-FFF2-40B4-BE49-F238E27FC236}">
+                    <a16:creationId xmlns:a16="http://schemas.microsoft.com/office/drawing/2014/main" id="{0079B1DA-0B2B-3B76-1605-4014C252EDC0}"/>
+                  </a:ext>
+                </a:extLst>
+              </p:cNvPr>
+              <p:cNvSpPr/>
+              <p:nvPr/>
+            </p:nvSpPr>
+            <p:spPr>
+              <a:xfrm>
+                <a:off x="2145799" y="2684192"/>
+                <a:ext cx="2784678" cy="298861"/>
+              </a:xfrm>
+              <a:prstGeom prst="rect">
+                <a:avLst/>
+              </a:prstGeom>
+              <a:noFill/>
+              <a:ln w="9525">
+                <a:noFill/>
+              </a:ln>
+            </p:spPr>
+            <p:style>
+              <a:lnRef idx="2">
+                <a:schemeClr val="accent1">
+                  <a:shade val="15000"/>
+                </a:schemeClr>
+              </a:lnRef>
+              <a:fillRef idx="1">
+                <a:schemeClr val="accent1"/>
+              </a:fillRef>
+              <a:effectRef idx="0">
+                <a:schemeClr val="accent1"/>
+              </a:effectRef>
+              <a:fontRef idx="minor">
+                <a:schemeClr val="lt1"/>
+              </a:fontRef>
+            </p:style>
+            <p:txBody>
+              <a:bodyPr rtlCol="0" anchor="ctr"/>
+              <a:lstStyle/>
+              <a:p>
+                <a:r>
+                  <a:rPr lang="en-US" sz="1000" dirty="0">
+                    <a:solidFill>
+                      <a:srgbClr val="FF0000"/>
+                    </a:solidFill>
+                    <a:latin typeface="Avenir Book" panose="02000503020000020003" pitchFamily="2" charset="0"/>
+                  </a:rPr>
+                  <a:t>GET key</a:t>
+                </a:r>
+              </a:p>
+            </p:txBody>
+          </p:sp>
+        </p:grpSp>
+        <p:cxnSp>
+          <p:nvCxnSpPr>
+            <p:cNvPr id="71" name="Straight Connector 70">
+              <a:extLst>
+                <a:ext uri="{FF2B5EF4-FFF2-40B4-BE49-F238E27FC236}">
+                  <a16:creationId xmlns:a16="http://schemas.microsoft.com/office/drawing/2014/main" id="{D09FBAE0-6937-C0B9-90FB-31AAE0A6D6C5}"/>
+                </a:ext>
+              </a:extLst>
+            </p:cNvPr>
+            <p:cNvCxnSpPr>
+              <a:cxnSpLocks/>
+            </p:cNvCxnSpPr>
+            <p:nvPr/>
+          </p:nvCxnSpPr>
+          <p:spPr>
+            <a:xfrm>
+              <a:off x="1225296" y="2893588"/>
+              <a:ext cx="2011215" cy="0"/>
+            </a:xfrm>
+            <a:prstGeom prst="line">
+              <a:avLst/>
+            </a:prstGeom>
+            <a:ln w="9525">
+              <a:solidFill>
+                <a:srgbClr val="FF0000"/>
+              </a:solidFill>
+              <a:headEnd type="triangle"/>
+            </a:ln>
+          </p:spPr>
+          <p:style>
+            <a:lnRef idx="2">
+              <a:schemeClr val="accent1"/>
+            </a:lnRef>
+            <a:fillRef idx="0">
+              <a:schemeClr val="accent1"/>
+            </a:fillRef>
+            <a:effectRef idx="1">
+              <a:schemeClr val="accent1"/>
+            </a:effectRef>
+            <a:fontRef idx="minor">
+              <a:schemeClr val="tx1"/>
+            </a:fontRef>
+          </p:style>
+        </p:cxnSp>
+        <p:sp>
+          <p:nvSpPr>
+            <p:cNvPr id="72" name="Rectangle 71">
+              <a:extLst>
+                <a:ext uri="{FF2B5EF4-FFF2-40B4-BE49-F238E27FC236}">
+                  <a16:creationId xmlns:a16="http://schemas.microsoft.com/office/drawing/2014/main" id="{5F7B3F76-FA7C-30D9-C241-05E4DC032827}"/>
+                </a:ext>
+              </a:extLst>
+            </p:cNvPr>
+            <p:cNvSpPr/>
+            <p:nvPr/>
+          </p:nvSpPr>
+          <p:spPr>
+            <a:xfrm>
+              <a:off x="3236511" y="2298068"/>
+              <a:ext cx="126715" cy="600778"/>
+            </a:xfrm>
+            <a:prstGeom prst="rect">
+              <a:avLst/>
+            </a:prstGeom>
+            <a:solidFill>
+              <a:schemeClr val="accent2">
+                <a:lumMod val="20000"/>
+                <a:lumOff val="80000"/>
+              </a:schemeClr>
+            </a:solidFill>
+            <a:ln w="9525">
+              <a:solidFill>
+                <a:srgbClr val="FF0000"/>
+              </a:solidFill>
+            </a:ln>
+          </p:spPr>
+          <p:style>
+            <a:lnRef idx="2">
+              <a:schemeClr val="accent1">
+                <a:shade val="15000"/>
+              </a:schemeClr>
+            </a:lnRef>
+            <a:fillRef idx="1">
+              <a:schemeClr val="accent1"/>
+            </a:fillRef>
+            <a:effectRef idx="0">
+              <a:schemeClr val="accent1"/>
+            </a:effectRef>
+            <a:fontRef idx="minor">
+              <a:schemeClr val="lt1"/>
+            </a:fontRef>
+          </p:style>
+          <p:txBody>
+            <a:bodyPr rtlCol="0" anchor="ctr"/>
+            <a:lstStyle/>
+            <a:p>
+              <a:pPr algn="ctr"/>
+              <a:endParaRPr lang="en-US" sz="1000" dirty="0">
+                <a:solidFill>
+                  <a:schemeClr val="tx1"/>
+                </a:solidFill>
+                <a:latin typeface="Avenir Book" panose="02000503020000020003" pitchFamily="2" charset="0"/>
+              </a:endParaRPr>
+            </a:p>
+          </p:txBody>
+        </p:sp>
+        <p:sp>
+          <p:nvSpPr>
+            <p:cNvPr id="75" name="Rectangle 74">
+              <a:extLst>
+                <a:ext uri="{FF2B5EF4-FFF2-40B4-BE49-F238E27FC236}">
+                  <a16:creationId xmlns:a16="http://schemas.microsoft.com/office/drawing/2014/main" id="{5F72597D-0DDD-A40B-A702-2B75C9DDD5EE}"/>
+                </a:ext>
+              </a:extLst>
+            </p:cNvPr>
+            <p:cNvSpPr/>
+            <p:nvPr/>
+          </p:nvSpPr>
+          <p:spPr>
+            <a:xfrm>
+              <a:off x="1217284" y="2643280"/>
+              <a:ext cx="1799511" cy="298861"/>
+            </a:xfrm>
+            <a:prstGeom prst="rect">
+              <a:avLst/>
+            </a:prstGeom>
+            <a:noFill/>
+            <a:ln w="9525">
+              <a:noFill/>
+            </a:ln>
+          </p:spPr>
+          <p:style>
+            <a:lnRef idx="2">
+              <a:schemeClr val="accent1">
+                <a:shade val="15000"/>
+              </a:schemeClr>
+            </a:lnRef>
+            <a:fillRef idx="1">
+              <a:schemeClr val="accent1"/>
+            </a:fillRef>
+            <a:effectRef idx="0">
+              <a:schemeClr val="accent1"/>
+            </a:effectRef>
+            <a:fontRef idx="minor">
+              <a:schemeClr val="lt1"/>
+            </a:fontRef>
+          </p:style>
+          <p:txBody>
+            <a:bodyPr rtlCol="0" anchor="ctr"/>
+            <a:lstStyle/>
+            <a:p>
+              <a:r>
+                <a:rPr lang="en-US" sz="1000" dirty="0">
+                  <a:solidFill>
+                    <a:srgbClr val="FF0000"/>
+                  </a:solidFill>
+                  <a:latin typeface="Avenir Book" panose="02000503020000020003" pitchFamily="2" charset="0"/>
+                </a:rPr>
+                <a:t>Key + Key-ID</a:t>
+              </a:r>
+            </a:p>
+          </p:txBody>
+        </p:sp>
+        <p:grpSp>
+          <p:nvGrpSpPr>
+            <p:cNvPr id="76" name="Group 75">
+              <a:extLst>
+                <a:ext uri="{FF2B5EF4-FFF2-40B4-BE49-F238E27FC236}">
+                  <a16:creationId xmlns:a16="http://schemas.microsoft.com/office/drawing/2014/main" id="{F7AEFDE4-FB51-2979-8BF5-6BE370924610}"/>
+                </a:ext>
+              </a:extLst>
+            </p:cNvPr>
+            <p:cNvGrpSpPr/>
+            <p:nvPr/>
+          </p:nvGrpSpPr>
+          <p:grpSpPr>
+            <a:xfrm>
+              <a:off x="3363226" y="2178472"/>
+              <a:ext cx="1978399" cy="298861"/>
+              <a:chOff x="2145799" y="2684192"/>
+              <a:chExt cx="3061500" cy="298861"/>
+            </a:xfrm>
+          </p:grpSpPr>
+          <p:cxnSp>
+            <p:nvCxnSpPr>
+              <p:cNvPr id="77" name="Straight Connector 76">
+                <a:extLst>
+                  <a:ext uri="{FF2B5EF4-FFF2-40B4-BE49-F238E27FC236}">
+                    <a16:creationId xmlns:a16="http://schemas.microsoft.com/office/drawing/2014/main" id="{0C70C868-53DE-F5C2-8229-2F8940F388D8}"/>
+                  </a:ext>
+                </a:extLst>
+              </p:cNvPr>
+              <p:cNvCxnSpPr>
+                <a:cxnSpLocks/>
+              </p:cNvCxnSpPr>
+              <p:nvPr/>
+            </p:nvCxnSpPr>
+            <p:spPr>
+              <a:xfrm flipH="1">
+                <a:off x="2145799" y="2934929"/>
+                <a:ext cx="3061500" cy="0"/>
+              </a:xfrm>
+              <a:prstGeom prst="line">
+                <a:avLst/>
+              </a:prstGeom>
+              <a:ln w="9525">
+                <a:solidFill>
+                  <a:srgbClr val="FF0000"/>
+                </a:solidFill>
+                <a:headEnd type="triangle"/>
+              </a:ln>
+            </p:spPr>
+            <p:style>
+              <a:lnRef idx="2">
+                <a:schemeClr val="accent1"/>
+              </a:lnRef>
+              <a:fillRef idx="0">
+                <a:schemeClr val="accent1"/>
+              </a:fillRef>
+              <a:effectRef idx="1">
+                <a:schemeClr val="accent1"/>
+              </a:effectRef>
+              <a:fontRef idx="minor">
+                <a:schemeClr val="tx1"/>
+              </a:fontRef>
+            </p:style>
+          </p:cxnSp>
+          <p:sp>
+            <p:nvSpPr>
+              <p:cNvPr id="78" name="Rectangle 77">
+                <a:extLst>
+                  <a:ext uri="{FF2B5EF4-FFF2-40B4-BE49-F238E27FC236}">
+                    <a16:creationId xmlns:a16="http://schemas.microsoft.com/office/drawing/2014/main" id="{56594116-FF96-FF00-F076-65EFD26E16E9}"/>
+                  </a:ext>
+                </a:extLst>
+              </p:cNvPr>
+              <p:cNvSpPr/>
+              <p:nvPr/>
+            </p:nvSpPr>
+            <p:spPr>
+              <a:xfrm>
+                <a:off x="2145799" y="2684192"/>
+                <a:ext cx="2784678" cy="298861"/>
+              </a:xfrm>
+              <a:prstGeom prst="rect">
+                <a:avLst/>
+              </a:prstGeom>
+              <a:noFill/>
+              <a:ln w="9525">
+                <a:noFill/>
+              </a:ln>
+            </p:spPr>
+            <p:style>
+              <a:lnRef idx="2">
+                <a:schemeClr val="accent1">
+                  <a:shade val="15000"/>
+                </a:schemeClr>
+              </a:lnRef>
+              <a:fillRef idx="1">
+                <a:schemeClr val="accent1"/>
+              </a:fillRef>
+              <a:effectRef idx="0">
+                <a:schemeClr val="accent1"/>
+              </a:effectRef>
+              <a:fontRef idx="minor">
+                <a:schemeClr val="lt1"/>
+              </a:fontRef>
+            </p:style>
+            <p:txBody>
+              <a:bodyPr rtlCol="0" anchor="ctr"/>
+              <a:lstStyle/>
+              <a:p>
+                <a:r>
+                  <a:rPr lang="en-US" sz="1000" dirty="0">
+                    <a:solidFill>
+                      <a:srgbClr val="FF0000"/>
+                    </a:solidFill>
+                    <a:latin typeface="Avenir Book" panose="02000503020000020003" pitchFamily="2" charset="0"/>
+                  </a:rPr>
+                  <a:t>PUT key-share</a:t>
+                </a:r>
+              </a:p>
+            </p:txBody>
+          </p:sp>
+        </p:grpSp>
+        <p:grpSp>
+          <p:nvGrpSpPr>
+            <p:cNvPr id="81" name="Group 80">
+              <a:extLst>
+                <a:ext uri="{FF2B5EF4-FFF2-40B4-BE49-F238E27FC236}">
+                  <a16:creationId xmlns:a16="http://schemas.microsoft.com/office/drawing/2014/main" id="{3F753FF3-87C6-4CE9-DC6B-5AD173A1AE7E}"/>
+                </a:ext>
+              </a:extLst>
+            </p:cNvPr>
+            <p:cNvGrpSpPr/>
+            <p:nvPr/>
+          </p:nvGrpSpPr>
+          <p:grpSpPr>
+            <a:xfrm>
+              <a:off x="3363226" y="2519503"/>
+              <a:ext cx="3389847" cy="298861"/>
+              <a:chOff x="2145799" y="2684192"/>
+              <a:chExt cx="5245664" cy="298861"/>
+            </a:xfrm>
+          </p:grpSpPr>
+          <p:cxnSp>
+            <p:nvCxnSpPr>
+              <p:cNvPr id="82" name="Straight Connector 81">
+                <a:extLst>
+                  <a:ext uri="{FF2B5EF4-FFF2-40B4-BE49-F238E27FC236}">
+                    <a16:creationId xmlns:a16="http://schemas.microsoft.com/office/drawing/2014/main" id="{948565C5-7DD8-0FBF-CF95-A4D770B9B674}"/>
+                  </a:ext>
+                </a:extLst>
+              </p:cNvPr>
+              <p:cNvCxnSpPr>
+                <a:cxnSpLocks/>
+              </p:cNvCxnSpPr>
+              <p:nvPr/>
+            </p:nvCxnSpPr>
+            <p:spPr>
+              <a:xfrm flipH="1">
+                <a:off x="2145799" y="2934929"/>
+                <a:ext cx="5245664" cy="0"/>
+              </a:xfrm>
+              <a:prstGeom prst="line">
+                <a:avLst/>
+              </a:prstGeom>
+              <a:ln w="9525">
+                <a:solidFill>
+                  <a:srgbClr val="FF0000"/>
+                </a:solidFill>
+                <a:headEnd type="triangle"/>
+              </a:ln>
+            </p:spPr>
+            <p:style>
+              <a:lnRef idx="2">
+                <a:schemeClr val="accent1"/>
+              </a:lnRef>
+              <a:fillRef idx="0">
+                <a:schemeClr val="accent1"/>
+              </a:fillRef>
+              <a:effectRef idx="1">
+                <a:schemeClr val="accent1"/>
+              </a:effectRef>
+              <a:fontRef idx="minor">
+                <a:schemeClr val="tx1"/>
+              </a:fontRef>
+            </p:style>
+          </p:cxnSp>
+          <p:sp>
+            <p:nvSpPr>
+              <p:cNvPr id="83" name="Rectangle 82">
+                <a:extLst>
+                  <a:ext uri="{FF2B5EF4-FFF2-40B4-BE49-F238E27FC236}">
+                    <a16:creationId xmlns:a16="http://schemas.microsoft.com/office/drawing/2014/main" id="{2CE5C9B2-ED36-9319-4528-F06B1BCBCC85}"/>
+                  </a:ext>
+                </a:extLst>
+              </p:cNvPr>
+              <p:cNvSpPr/>
+              <p:nvPr/>
+            </p:nvSpPr>
+            <p:spPr>
+              <a:xfrm>
+                <a:off x="2145799" y="2684192"/>
+                <a:ext cx="2784678" cy="298861"/>
+              </a:xfrm>
+              <a:prstGeom prst="rect">
+                <a:avLst/>
+              </a:prstGeom>
+              <a:noFill/>
+              <a:ln w="9525">
+                <a:noFill/>
+              </a:ln>
+            </p:spPr>
+            <p:style>
+              <a:lnRef idx="2">
+                <a:schemeClr val="accent1">
+                  <a:shade val="15000"/>
+                </a:schemeClr>
+              </a:lnRef>
+              <a:fillRef idx="1">
+                <a:schemeClr val="accent1"/>
+              </a:fillRef>
+              <a:effectRef idx="0">
+                <a:schemeClr val="accent1"/>
+              </a:effectRef>
+              <a:fontRef idx="minor">
+                <a:schemeClr val="lt1"/>
+              </a:fontRef>
+            </p:style>
+            <p:txBody>
+              <a:bodyPr rtlCol="0" anchor="ctr"/>
+              <a:lstStyle/>
+              <a:p>
+                <a:r>
+                  <a:rPr lang="en-US" sz="1000" dirty="0">
+                    <a:solidFill>
+                      <a:srgbClr val="FF0000"/>
+                    </a:solidFill>
+                    <a:latin typeface="Avenir Book" panose="02000503020000020003" pitchFamily="2" charset="0"/>
+                  </a:rPr>
+                  <a:t>PUT key-share</a:t>
+                </a:r>
+              </a:p>
+            </p:txBody>
+          </p:sp>
+        </p:grpSp>
+      </p:grpSp>
+      <p:grpSp>
+        <p:nvGrpSpPr>
+          <p:cNvPr id="85" name="Group 84">
+            <a:extLst>
+              <a:ext uri="{FF2B5EF4-FFF2-40B4-BE49-F238E27FC236}">
+                <a16:creationId xmlns:a16="http://schemas.microsoft.com/office/drawing/2014/main" id="{21823690-E568-F844-A180-4A4461260547}"/>
+              </a:ext>
+            </a:extLst>
+          </p:cNvPr>
+          <p:cNvGrpSpPr/>
+          <p:nvPr/>
+        </p:nvGrpSpPr>
+        <p:grpSpPr>
+          <a:xfrm>
+            <a:off x="1223360" y="3315482"/>
+            <a:ext cx="9656310" cy="298861"/>
+            <a:chOff x="2145799" y="2855777"/>
+            <a:chExt cx="14942787" cy="298861"/>
+          </a:xfrm>
+        </p:grpSpPr>
+        <p:cxnSp>
+          <p:nvCxnSpPr>
+            <p:cNvPr id="86" name="Straight Connector 85">
+              <a:extLst>
+                <a:ext uri="{FF2B5EF4-FFF2-40B4-BE49-F238E27FC236}">
+                  <a16:creationId xmlns:a16="http://schemas.microsoft.com/office/drawing/2014/main" id="{2FF917E0-1D83-3161-C074-0C9DE35388F5}"/>
+                </a:ext>
+              </a:extLst>
+            </p:cNvPr>
+            <p:cNvCxnSpPr>
+              <a:cxnSpLocks/>
+            </p:cNvCxnSpPr>
+            <p:nvPr/>
+          </p:nvCxnSpPr>
+          <p:spPr>
+            <a:xfrm flipH="1">
+              <a:off x="2145799" y="3106514"/>
+              <a:ext cx="14942787" cy="0"/>
+            </a:xfrm>
+            <a:prstGeom prst="line">
+              <a:avLst/>
+            </a:prstGeom>
+            <a:ln w="9525">
+              <a:solidFill>
+                <a:srgbClr val="FF0000"/>
+              </a:solidFill>
+              <a:headEnd type="triangle"/>
+            </a:ln>
+          </p:spPr>
+          <p:style>
+            <a:lnRef idx="2">
+              <a:schemeClr val="accent1"/>
+            </a:lnRef>
+            <a:fillRef idx="0">
+              <a:schemeClr val="accent1"/>
+            </a:fillRef>
+            <a:effectRef idx="1">
+              <a:schemeClr val="accent1"/>
+            </a:effectRef>
+            <a:fontRef idx="minor">
+              <a:schemeClr val="tx1"/>
+            </a:fontRef>
+          </p:style>
+        </p:cxnSp>
+        <p:sp>
+          <p:nvSpPr>
+            <p:cNvPr id="87" name="Rectangle 86">
+              <a:extLst>
+                <a:ext uri="{FF2B5EF4-FFF2-40B4-BE49-F238E27FC236}">
+                  <a16:creationId xmlns:a16="http://schemas.microsoft.com/office/drawing/2014/main" id="{F8361EBC-4CB3-07C3-3A74-E4A297307904}"/>
+                </a:ext>
+              </a:extLst>
+            </p:cNvPr>
+            <p:cNvSpPr/>
+            <p:nvPr/>
+          </p:nvSpPr>
+          <p:spPr>
+            <a:xfrm>
+              <a:off x="2145799" y="2855777"/>
+              <a:ext cx="2784678" cy="298861"/>
+            </a:xfrm>
+            <a:prstGeom prst="rect">
+              <a:avLst/>
+            </a:prstGeom>
+            <a:noFill/>
+            <a:ln w="9525">
+              <a:noFill/>
+            </a:ln>
+          </p:spPr>
+          <p:style>
+            <a:lnRef idx="2">
+              <a:schemeClr val="accent1">
+                <a:shade val="15000"/>
+              </a:schemeClr>
+            </a:lnRef>
+            <a:fillRef idx="1">
+              <a:schemeClr val="accent1"/>
+            </a:fillRef>
+            <a:effectRef idx="0">
+              <a:schemeClr val="accent1"/>
+            </a:effectRef>
+            <a:fontRef idx="minor">
+              <a:schemeClr val="lt1"/>
+            </a:fontRef>
+          </p:style>
+          <p:txBody>
+            <a:bodyPr rtlCol="0" anchor="ctr"/>
+            <a:lstStyle/>
+            <a:p>
+              <a:r>
+                <a:rPr lang="en-US" sz="1000" dirty="0">
+                  <a:solidFill>
+                    <a:srgbClr val="FF0000"/>
+                  </a:solidFill>
+                  <a:latin typeface="Avenir Book" panose="02000503020000020003" pitchFamily="2" charset="0"/>
+                </a:rPr>
+                <a:t>Relay Key-ID</a:t>
+              </a:r>
+            </a:p>
+          </p:txBody>
+        </p:sp>
+      </p:grpSp>
+      <p:grpSp>
+        <p:nvGrpSpPr>
+          <p:cNvPr id="93" name="Group 92">
+            <a:extLst>
+              <a:ext uri="{FF2B5EF4-FFF2-40B4-BE49-F238E27FC236}">
+                <a16:creationId xmlns:a16="http://schemas.microsoft.com/office/drawing/2014/main" id="{B4F0D75B-5EE5-C7C1-DBD0-0680B87101BA}"/>
+              </a:ext>
+            </a:extLst>
+          </p:cNvPr>
+          <p:cNvGrpSpPr/>
+          <p:nvPr/>
+        </p:nvGrpSpPr>
+        <p:grpSpPr>
+          <a:xfrm flipH="1">
+            <a:off x="5343881" y="3815869"/>
+            <a:ext cx="5535789" cy="894811"/>
+            <a:chOff x="1217284" y="2047330"/>
+            <a:chExt cx="5535789" cy="894811"/>
+          </a:xfrm>
+        </p:grpSpPr>
+        <p:grpSp>
+          <p:nvGrpSpPr>
+            <p:cNvPr id="94" name="Group 93">
+              <a:extLst>
+                <a:ext uri="{FF2B5EF4-FFF2-40B4-BE49-F238E27FC236}">
+                  <a16:creationId xmlns:a16="http://schemas.microsoft.com/office/drawing/2014/main" id="{8F1D091B-840E-0231-0DE0-4CC5CD3882AA}"/>
+                </a:ext>
+              </a:extLst>
+            </p:cNvPr>
+            <p:cNvGrpSpPr/>
+            <p:nvPr/>
+          </p:nvGrpSpPr>
+          <p:grpSpPr>
+            <a:xfrm>
+              <a:off x="1223360" y="2047330"/>
+              <a:ext cx="2013616" cy="298861"/>
+              <a:chOff x="2145799" y="2684192"/>
+              <a:chExt cx="3115997" cy="298861"/>
+            </a:xfrm>
+          </p:grpSpPr>
+          <p:cxnSp>
+            <p:nvCxnSpPr>
+              <p:cNvPr id="104" name="Straight Connector 103">
+                <a:extLst>
+                  <a:ext uri="{FF2B5EF4-FFF2-40B4-BE49-F238E27FC236}">
+                    <a16:creationId xmlns:a16="http://schemas.microsoft.com/office/drawing/2014/main" id="{0913FD8D-1F3B-C0B5-958B-B85ED4A409E3}"/>
+                  </a:ext>
+                </a:extLst>
+              </p:cNvPr>
+              <p:cNvCxnSpPr>
+                <a:cxnSpLocks/>
+              </p:cNvCxnSpPr>
+              <p:nvPr/>
+            </p:nvCxnSpPr>
+            <p:spPr>
+              <a:xfrm flipH="1">
+                <a:off x="2145799" y="2934929"/>
+                <a:ext cx="3115997" cy="0"/>
+              </a:xfrm>
+              <a:prstGeom prst="line">
+                <a:avLst/>
+              </a:prstGeom>
+              <a:ln w="9525">
+                <a:solidFill>
+                  <a:srgbClr val="FF0000"/>
+                </a:solidFill>
+                <a:headEnd type="triangle"/>
+              </a:ln>
+            </p:spPr>
+            <p:style>
+              <a:lnRef idx="2">
+                <a:schemeClr val="accent1"/>
+              </a:lnRef>
+              <a:fillRef idx="0">
+                <a:schemeClr val="accent1"/>
+              </a:fillRef>
+              <a:effectRef idx="1">
+                <a:schemeClr val="accent1"/>
+              </a:effectRef>
+              <a:fontRef idx="minor">
+                <a:schemeClr val="tx1"/>
+              </a:fontRef>
+            </p:style>
+          </p:cxnSp>
+          <p:sp>
+            <p:nvSpPr>
+              <p:cNvPr id="105" name="Rectangle 104">
+                <a:extLst>
+                  <a:ext uri="{FF2B5EF4-FFF2-40B4-BE49-F238E27FC236}">
+                    <a16:creationId xmlns:a16="http://schemas.microsoft.com/office/drawing/2014/main" id="{01EDA7E6-775E-8B49-BE3C-F8B35576E3A5}"/>
+                  </a:ext>
+                </a:extLst>
+              </p:cNvPr>
+              <p:cNvSpPr/>
+              <p:nvPr/>
+            </p:nvSpPr>
+            <p:spPr>
+              <a:xfrm>
+                <a:off x="2145799" y="2684192"/>
+                <a:ext cx="2784678" cy="298861"/>
+              </a:xfrm>
+              <a:prstGeom prst="rect">
+                <a:avLst/>
+              </a:prstGeom>
+              <a:noFill/>
+              <a:ln w="9525">
+                <a:noFill/>
+              </a:ln>
+            </p:spPr>
+            <p:style>
+              <a:lnRef idx="2">
+                <a:schemeClr val="accent1">
+                  <a:shade val="15000"/>
+                </a:schemeClr>
+              </a:lnRef>
+              <a:fillRef idx="1">
+                <a:schemeClr val="accent1"/>
+              </a:fillRef>
+              <a:effectRef idx="0">
+                <a:schemeClr val="accent1"/>
+              </a:effectRef>
+              <a:fontRef idx="minor">
+                <a:schemeClr val="lt1"/>
+              </a:fontRef>
+            </p:style>
+            <p:txBody>
+              <a:bodyPr rtlCol="0" anchor="ctr"/>
+              <a:lstStyle/>
+              <a:p>
+                <a:r>
+                  <a:rPr lang="en-US" sz="1000" dirty="0">
+                    <a:solidFill>
+                      <a:srgbClr val="FF0000"/>
+                    </a:solidFill>
+                    <a:latin typeface="Avenir Book" panose="02000503020000020003" pitchFamily="2" charset="0"/>
+                  </a:rPr>
+                  <a:t>GET key-with-key-ID</a:t>
+                </a:r>
+              </a:p>
+            </p:txBody>
+          </p:sp>
+        </p:grpSp>
+        <p:cxnSp>
+          <p:nvCxnSpPr>
+            <p:cNvPr id="95" name="Straight Connector 94">
+              <a:extLst>
+                <a:ext uri="{FF2B5EF4-FFF2-40B4-BE49-F238E27FC236}">
+                  <a16:creationId xmlns:a16="http://schemas.microsoft.com/office/drawing/2014/main" id="{CF5FE163-EFC1-252B-2202-33A0CF174B4E}"/>
+                </a:ext>
+              </a:extLst>
+            </p:cNvPr>
+            <p:cNvCxnSpPr>
+              <a:cxnSpLocks/>
+            </p:cNvCxnSpPr>
+            <p:nvPr/>
+          </p:nvCxnSpPr>
+          <p:spPr>
+            <a:xfrm>
+              <a:off x="1225296" y="2893588"/>
+              <a:ext cx="2011215" cy="0"/>
+            </a:xfrm>
+            <a:prstGeom prst="line">
+              <a:avLst/>
+            </a:prstGeom>
+            <a:ln w="9525">
+              <a:solidFill>
+                <a:srgbClr val="FF0000"/>
+              </a:solidFill>
+              <a:headEnd type="triangle"/>
+            </a:ln>
+          </p:spPr>
+          <p:style>
+            <a:lnRef idx="2">
+              <a:schemeClr val="accent1"/>
+            </a:lnRef>
+            <a:fillRef idx="0">
+              <a:schemeClr val="accent1"/>
+            </a:fillRef>
+            <a:effectRef idx="1">
+              <a:schemeClr val="accent1"/>
+            </a:effectRef>
+            <a:fontRef idx="minor">
+              <a:schemeClr val="tx1"/>
+            </a:fontRef>
+          </p:style>
+        </p:cxnSp>
+        <p:sp>
+          <p:nvSpPr>
+            <p:cNvPr id="96" name="Rectangle 95">
+              <a:extLst>
+                <a:ext uri="{FF2B5EF4-FFF2-40B4-BE49-F238E27FC236}">
+                  <a16:creationId xmlns:a16="http://schemas.microsoft.com/office/drawing/2014/main" id="{4D06398F-7398-B109-CBB7-BFC906ABA483}"/>
+                </a:ext>
+              </a:extLst>
+            </p:cNvPr>
+            <p:cNvSpPr/>
+            <p:nvPr/>
+          </p:nvSpPr>
+          <p:spPr>
+            <a:xfrm>
+              <a:off x="3236511" y="2298068"/>
+              <a:ext cx="126715" cy="600778"/>
+            </a:xfrm>
+            <a:prstGeom prst="rect">
+              <a:avLst/>
+            </a:prstGeom>
+            <a:solidFill>
+              <a:schemeClr val="accent2">
+                <a:lumMod val="20000"/>
+                <a:lumOff val="80000"/>
+              </a:schemeClr>
+            </a:solidFill>
+            <a:ln w="9525">
+              <a:solidFill>
+                <a:srgbClr val="FF0000"/>
+              </a:solidFill>
+            </a:ln>
+          </p:spPr>
+          <p:style>
+            <a:lnRef idx="2">
+              <a:schemeClr val="accent1">
+                <a:shade val="15000"/>
+              </a:schemeClr>
+            </a:lnRef>
+            <a:fillRef idx="1">
+              <a:schemeClr val="accent1"/>
+            </a:fillRef>
+            <a:effectRef idx="0">
+              <a:schemeClr val="accent1"/>
+            </a:effectRef>
+            <a:fontRef idx="minor">
+              <a:schemeClr val="lt1"/>
+            </a:fontRef>
+          </p:style>
+          <p:txBody>
+            <a:bodyPr rtlCol="0" anchor="ctr"/>
+            <a:lstStyle/>
+            <a:p>
+              <a:pPr algn="ctr"/>
+              <a:endParaRPr lang="en-US" sz="1000" dirty="0">
+                <a:solidFill>
+                  <a:schemeClr val="tx1"/>
+                </a:solidFill>
+                <a:latin typeface="Avenir Book" panose="02000503020000020003" pitchFamily="2" charset="0"/>
+              </a:endParaRPr>
+            </a:p>
+          </p:txBody>
+        </p:sp>
+        <p:sp>
+          <p:nvSpPr>
+            <p:cNvPr id="97" name="Rectangle 96">
+              <a:extLst>
+                <a:ext uri="{FF2B5EF4-FFF2-40B4-BE49-F238E27FC236}">
+                  <a16:creationId xmlns:a16="http://schemas.microsoft.com/office/drawing/2014/main" id="{DEDD8038-A8D9-38EE-BD64-C279C72DAEC4}"/>
+                </a:ext>
+              </a:extLst>
+            </p:cNvPr>
+            <p:cNvSpPr/>
+            <p:nvPr/>
+          </p:nvSpPr>
+          <p:spPr>
+            <a:xfrm>
+              <a:off x="1217284" y="2643280"/>
+              <a:ext cx="1799511" cy="298861"/>
+            </a:xfrm>
+            <a:prstGeom prst="rect">
+              <a:avLst/>
+            </a:prstGeom>
+            <a:noFill/>
+            <a:ln w="9525">
+              <a:noFill/>
+            </a:ln>
+          </p:spPr>
+          <p:style>
+            <a:lnRef idx="2">
+              <a:schemeClr val="accent1">
+                <a:shade val="15000"/>
+              </a:schemeClr>
+            </a:lnRef>
+            <a:fillRef idx="1">
+              <a:schemeClr val="accent1"/>
+            </a:fillRef>
+            <a:effectRef idx="0">
+              <a:schemeClr val="accent1"/>
+            </a:effectRef>
+            <a:fontRef idx="minor">
+              <a:schemeClr val="lt1"/>
+            </a:fontRef>
+          </p:style>
+          <p:txBody>
+            <a:bodyPr rtlCol="0" anchor="ctr"/>
+            <a:lstStyle/>
+            <a:p>
+              <a:r>
+                <a:rPr lang="en-US" sz="1000" dirty="0">
+                  <a:solidFill>
+                    <a:srgbClr val="FF0000"/>
+                  </a:solidFill>
+                  <a:latin typeface="Avenir Book" panose="02000503020000020003" pitchFamily="2" charset="0"/>
+                </a:rPr>
+                <a:t>Key</a:t>
+              </a:r>
+            </a:p>
+          </p:txBody>
+        </p:sp>
+        <p:grpSp>
+          <p:nvGrpSpPr>
+            <p:cNvPr id="98" name="Group 97">
+              <a:extLst>
+                <a:ext uri="{FF2B5EF4-FFF2-40B4-BE49-F238E27FC236}">
+                  <a16:creationId xmlns:a16="http://schemas.microsoft.com/office/drawing/2014/main" id="{883A7E9D-DA33-97A8-3792-8A941324AAD1}"/>
+                </a:ext>
+              </a:extLst>
+            </p:cNvPr>
+            <p:cNvGrpSpPr/>
+            <p:nvPr/>
+          </p:nvGrpSpPr>
+          <p:grpSpPr>
+            <a:xfrm>
+              <a:off x="3363226" y="2178472"/>
+              <a:ext cx="1978399" cy="298861"/>
+              <a:chOff x="2145799" y="2684192"/>
+              <a:chExt cx="3061500" cy="298861"/>
+            </a:xfrm>
+          </p:grpSpPr>
+          <p:cxnSp>
+            <p:nvCxnSpPr>
+              <p:cNvPr id="102" name="Straight Connector 101">
+                <a:extLst>
+                  <a:ext uri="{FF2B5EF4-FFF2-40B4-BE49-F238E27FC236}">
+                    <a16:creationId xmlns:a16="http://schemas.microsoft.com/office/drawing/2014/main" id="{2A2CC460-7466-789D-C0B5-6B498212CC12}"/>
+                  </a:ext>
+                </a:extLst>
+              </p:cNvPr>
+              <p:cNvCxnSpPr>
+                <a:cxnSpLocks/>
+              </p:cNvCxnSpPr>
+              <p:nvPr/>
+            </p:nvCxnSpPr>
+            <p:spPr>
+              <a:xfrm flipH="1">
+                <a:off x="2145799" y="2934929"/>
+                <a:ext cx="3061500" cy="0"/>
+              </a:xfrm>
+              <a:prstGeom prst="line">
+                <a:avLst/>
+              </a:prstGeom>
+              <a:ln w="9525">
+                <a:solidFill>
+                  <a:srgbClr val="FF0000"/>
+                </a:solidFill>
+                <a:headEnd type="triangle"/>
+              </a:ln>
+            </p:spPr>
+            <p:style>
+              <a:lnRef idx="2">
+                <a:schemeClr val="accent1"/>
+              </a:lnRef>
+              <a:fillRef idx="0">
+                <a:schemeClr val="accent1"/>
+              </a:fillRef>
+              <a:effectRef idx="1">
+                <a:schemeClr val="accent1"/>
+              </a:effectRef>
+              <a:fontRef idx="minor">
+                <a:schemeClr val="tx1"/>
+              </a:fontRef>
+            </p:style>
+          </p:cxnSp>
+          <p:sp>
+            <p:nvSpPr>
+              <p:cNvPr id="103" name="Rectangle 102">
+                <a:extLst>
+                  <a:ext uri="{FF2B5EF4-FFF2-40B4-BE49-F238E27FC236}">
+                    <a16:creationId xmlns:a16="http://schemas.microsoft.com/office/drawing/2014/main" id="{0C2C119B-096E-5860-0240-91FD38A557B9}"/>
+                  </a:ext>
+                </a:extLst>
+              </p:cNvPr>
+              <p:cNvSpPr/>
+              <p:nvPr/>
+            </p:nvSpPr>
+            <p:spPr>
+              <a:xfrm>
+                <a:off x="2145799" y="2684192"/>
+                <a:ext cx="2784678" cy="298861"/>
+              </a:xfrm>
+              <a:prstGeom prst="rect">
+                <a:avLst/>
+              </a:prstGeom>
+              <a:noFill/>
+              <a:ln w="9525">
+                <a:noFill/>
+              </a:ln>
+            </p:spPr>
+            <p:style>
+              <a:lnRef idx="2">
+                <a:schemeClr val="accent1">
+                  <a:shade val="15000"/>
+                </a:schemeClr>
+              </a:lnRef>
+              <a:fillRef idx="1">
+                <a:schemeClr val="accent1"/>
+              </a:fillRef>
+              <a:effectRef idx="0">
+                <a:schemeClr val="accent1"/>
+              </a:effectRef>
+              <a:fontRef idx="minor">
+                <a:schemeClr val="lt1"/>
+              </a:fontRef>
+            </p:style>
+            <p:txBody>
+              <a:bodyPr rtlCol="0" anchor="ctr"/>
+              <a:lstStyle/>
+              <a:p>
+                <a:r>
+                  <a:rPr lang="en-US" sz="1000" dirty="0">
+                    <a:solidFill>
+                      <a:srgbClr val="FF0000"/>
+                    </a:solidFill>
+                    <a:latin typeface="Avenir Book" panose="02000503020000020003" pitchFamily="2" charset="0"/>
+                  </a:rPr>
+                  <a:t>GET key-share</a:t>
+                </a:r>
+              </a:p>
+            </p:txBody>
+          </p:sp>
+        </p:grpSp>
+        <p:grpSp>
+          <p:nvGrpSpPr>
+            <p:cNvPr id="99" name="Group 98">
+              <a:extLst>
+                <a:ext uri="{FF2B5EF4-FFF2-40B4-BE49-F238E27FC236}">
+                  <a16:creationId xmlns:a16="http://schemas.microsoft.com/office/drawing/2014/main" id="{D8E80D79-197A-5BCD-F24D-6070F761C3E1}"/>
+                </a:ext>
+              </a:extLst>
+            </p:cNvPr>
+            <p:cNvGrpSpPr/>
+            <p:nvPr/>
+          </p:nvGrpSpPr>
+          <p:grpSpPr>
+            <a:xfrm>
+              <a:off x="3363226" y="2519503"/>
+              <a:ext cx="3389847" cy="298861"/>
+              <a:chOff x="2145799" y="2684192"/>
+              <a:chExt cx="5245664" cy="298861"/>
+            </a:xfrm>
+          </p:grpSpPr>
+          <p:cxnSp>
+            <p:nvCxnSpPr>
+              <p:cNvPr id="100" name="Straight Connector 99">
+                <a:extLst>
+                  <a:ext uri="{FF2B5EF4-FFF2-40B4-BE49-F238E27FC236}">
+                    <a16:creationId xmlns:a16="http://schemas.microsoft.com/office/drawing/2014/main" id="{C8DF76A0-98D5-A127-32A9-B5805B48A99F}"/>
+                  </a:ext>
+                </a:extLst>
+              </p:cNvPr>
+              <p:cNvCxnSpPr>
+                <a:cxnSpLocks/>
+              </p:cNvCxnSpPr>
+              <p:nvPr/>
+            </p:nvCxnSpPr>
+            <p:spPr>
+              <a:xfrm flipH="1">
+                <a:off x="2145799" y="2934929"/>
+                <a:ext cx="5245664" cy="0"/>
+              </a:xfrm>
+              <a:prstGeom prst="line">
+                <a:avLst/>
+              </a:prstGeom>
+              <a:ln w="9525">
+                <a:solidFill>
+                  <a:srgbClr val="FF0000"/>
+                </a:solidFill>
+                <a:headEnd type="triangle"/>
+              </a:ln>
+            </p:spPr>
+            <p:style>
+              <a:lnRef idx="2">
+                <a:schemeClr val="accent1"/>
+              </a:lnRef>
+              <a:fillRef idx="0">
+                <a:schemeClr val="accent1"/>
+              </a:fillRef>
+              <a:effectRef idx="1">
+                <a:schemeClr val="accent1"/>
+              </a:effectRef>
+              <a:fontRef idx="minor">
+                <a:schemeClr val="tx1"/>
+              </a:fontRef>
+            </p:style>
+          </p:cxnSp>
+          <p:sp>
+            <p:nvSpPr>
+              <p:cNvPr id="101" name="Rectangle 100">
+                <a:extLst>
+                  <a:ext uri="{FF2B5EF4-FFF2-40B4-BE49-F238E27FC236}">
+                    <a16:creationId xmlns:a16="http://schemas.microsoft.com/office/drawing/2014/main" id="{5C3DCE52-DD1D-2B18-5FB1-918149EEEF96}"/>
+                  </a:ext>
+                </a:extLst>
+              </p:cNvPr>
+              <p:cNvSpPr/>
+              <p:nvPr/>
+            </p:nvSpPr>
+            <p:spPr>
+              <a:xfrm>
+                <a:off x="2145799" y="2684192"/>
+                <a:ext cx="2784678" cy="298861"/>
+              </a:xfrm>
+              <a:prstGeom prst="rect">
+                <a:avLst/>
+              </a:prstGeom>
+              <a:noFill/>
+              <a:ln w="9525">
+                <a:noFill/>
+              </a:ln>
+            </p:spPr>
+            <p:style>
+              <a:lnRef idx="2">
+                <a:schemeClr val="accent1">
+                  <a:shade val="15000"/>
+                </a:schemeClr>
+              </a:lnRef>
+              <a:fillRef idx="1">
+                <a:schemeClr val="accent1"/>
+              </a:fillRef>
+              <a:effectRef idx="0">
+                <a:schemeClr val="accent1"/>
+              </a:effectRef>
+              <a:fontRef idx="minor">
+                <a:schemeClr val="lt1"/>
+              </a:fontRef>
+            </p:style>
+            <p:txBody>
+              <a:bodyPr rtlCol="0" anchor="ctr"/>
+              <a:lstStyle/>
+              <a:p>
+                <a:r>
+                  <a:rPr lang="en-US" sz="1000">
+                    <a:solidFill>
+                      <a:srgbClr val="FF0000"/>
+                    </a:solidFill>
+                    <a:latin typeface="Avenir Book" panose="02000503020000020003" pitchFamily="2" charset="0"/>
+                  </a:rPr>
+                  <a:t>GET </a:t>
+                </a:r>
+                <a:r>
+                  <a:rPr lang="en-US" sz="1000" dirty="0">
+                    <a:solidFill>
+                      <a:srgbClr val="FF0000"/>
+                    </a:solidFill>
+                    <a:latin typeface="Avenir Book" panose="02000503020000020003" pitchFamily="2" charset="0"/>
+                  </a:rPr>
+                  <a:t>key-share</a:t>
+                </a:r>
+              </a:p>
+            </p:txBody>
+          </p:sp>
+        </p:grpSp>
+      </p:grpSp>
+    </p:spTree>
+    <p:extLst>
+      <p:ext uri="{BB962C8B-B14F-4D97-AF65-F5344CB8AC3E}">
+        <p14:creationId xmlns:p14="http://schemas.microsoft.com/office/powerpoint/2010/main" val="1266981807"/>
       </p:ext>
     </p:extLst>
   </p:cSld>

</xml_diff>

<commit_message>
Hugo is last hub
</commit_message>
<xml_diff>
--- a/docs/figures/figures.pptx
+++ b/docs/figures/figures.pptx
@@ -4,6 +4,9 @@
   <p:sldMasterIdLst>
     <p:sldMasterId id="2147483648" r:id="rId1"/>
   </p:sldMasterIdLst>
+  <p:notesMasterIdLst>
+    <p:notesMasterId r:id="rId5"/>
+  </p:notesMasterIdLst>
   <p:sldIdLst>
     <p:sldId id="256" r:id="rId2"/>
     <p:sldId id="257" r:id="rId3"/>
@@ -107,6 +110,439 @@
     </a:lvl9pPr>
   </p:defaultTextStyle>
 </p:presentation>
+</file>
+
+<file path=ppt/notesMasters/notesMaster1.xml><?xml version="1.0" encoding="utf-8"?>
+<p:notesMaster xmlns:a="http://schemas.openxmlformats.org/drawingml/2006/main" xmlns:r="http://schemas.openxmlformats.org/officeDocument/2006/relationships" xmlns:p="http://schemas.openxmlformats.org/presentationml/2006/main">
+  <p:cSld>
+    <p:bg>
+      <p:bgRef idx="1001">
+        <a:schemeClr val="bg1"/>
+      </p:bgRef>
+    </p:bg>
+    <p:spTree>
+      <p:nvGrpSpPr>
+        <p:cNvPr id="1" name=""/>
+        <p:cNvGrpSpPr/>
+        <p:nvPr/>
+      </p:nvGrpSpPr>
+      <p:grpSpPr>
+        <a:xfrm>
+          <a:off x="0" y="0"/>
+          <a:ext cx="0" cy="0"/>
+          <a:chOff x="0" y="0"/>
+          <a:chExt cx="0" cy="0"/>
+        </a:xfrm>
+      </p:grpSpPr>
+      <p:sp>
+        <p:nvSpPr>
+          <p:cNvPr id="2" name="Header Placeholder 1"/>
+          <p:cNvSpPr>
+            <a:spLocks noGrp="1"/>
+          </p:cNvSpPr>
+          <p:nvPr>
+            <p:ph type="hdr" sz="quarter"/>
+          </p:nvPr>
+        </p:nvSpPr>
+        <p:spPr>
+          <a:xfrm>
+            <a:off x="0" y="0"/>
+            <a:ext cx="2971800" cy="458788"/>
+          </a:xfrm>
+          <a:prstGeom prst="rect">
+            <a:avLst/>
+          </a:prstGeom>
+        </p:spPr>
+        <p:txBody>
+          <a:bodyPr vert="horz" lIns="91440" tIns="45720" rIns="91440" bIns="45720" rtlCol="0"/>
+          <a:lstStyle>
+            <a:lvl1pPr algn="l">
+              <a:defRPr sz="1200"/>
+            </a:lvl1pPr>
+          </a:lstStyle>
+          <a:p>
+            <a:endParaRPr lang="en-US"/>
+          </a:p>
+        </p:txBody>
+      </p:sp>
+      <p:sp>
+        <p:nvSpPr>
+          <p:cNvPr id="3" name="Date Placeholder 2"/>
+          <p:cNvSpPr>
+            <a:spLocks noGrp="1"/>
+          </p:cNvSpPr>
+          <p:nvPr>
+            <p:ph type="dt" idx="1"/>
+          </p:nvPr>
+        </p:nvSpPr>
+        <p:spPr>
+          <a:xfrm>
+            <a:off x="3884613" y="0"/>
+            <a:ext cx="2971800" cy="458788"/>
+          </a:xfrm>
+          <a:prstGeom prst="rect">
+            <a:avLst/>
+          </a:prstGeom>
+        </p:spPr>
+        <p:txBody>
+          <a:bodyPr vert="horz" lIns="91440" tIns="45720" rIns="91440" bIns="45720" rtlCol="0"/>
+          <a:lstStyle>
+            <a:lvl1pPr algn="r">
+              <a:defRPr sz="1200"/>
+            </a:lvl1pPr>
+          </a:lstStyle>
+          <a:p>
+            <a:fld id="{66C4A6C0-F2EC-FC45-B98B-ED31D507F3F3}" type="datetimeFigureOut">
+              <a:rPr lang="en-US" smtClean="0"/>
+              <a:t>9/2/25</a:t>
+            </a:fld>
+            <a:endParaRPr lang="en-US"/>
+          </a:p>
+        </p:txBody>
+      </p:sp>
+      <p:sp>
+        <p:nvSpPr>
+          <p:cNvPr id="4" name="Slide Image Placeholder 3"/>
+          <p:cNvSpPr>
+            <a:spLocks noGrp="1" noRot="1" noChangeAspect="1"/>
+          </p:cNvSpPr>
+          <p:nvPr>
+            <p:ph type="sldImg" idx="2"/>
+          </p:nvPr>
+        </p:nvSpPr>
+        <p:spPr>
+          <a:xfrm>
+            <a:off x="685800" y="1143000"/>
+            <a:ext cx="5486400" cy="3086100"/>
+          </a:xfrm>
+          <a:prstGeom prst="rect">
+            <a:avLst/>
+          </a:prstGeom>
+          <a:noFill/>
+          <a:ln w="12700">
+            <a:solidFill>
+              <a:prstClr val="black"/>
+            </a:solidFill>
+          </a:ln>
+        </p:spPr>
+        <p:txBody>
+          <a:bodyPr vert="horz" lIns="91440" tIns="45720" rIns="91440" bIns="45720" rtlCol="0" anchor="ctr"/>
+          <a:lstStyle/>
+          <a:p>
+            <a:endParaRPr lang="en-US"/>
+          </a:p>
+        </p:txBody>
+      </p:sp>
+      <p:sp>
+        <p:nvSpPr>
+          <p:cNvPr id="5" name="Notes Placeholder 4"/>
+          <p:cNvSpPr>
+            <a:spLocks noGrp="1"/>
+          </p:cNvSpPr>
+          <p:nvPr>
+            <p:ph type="body" sz="quarter" idx="3"/>
+          </p:nvPr>
+        </p:nvSpPr>
+        <p:spPr>
+          <a:xfrm>
+            <a:off x="685800" y="4400550"/>
+            <a:ext cx="5486400" cy="3600450"/>
+          </a:xfrm>
+          <a:prstGeom prst="rect">
+            <a:avLst/>
+          </a:prstGeom>
+        </p:spPr>
+        <p:txBody>
+          <a:bodyPr vert="horz" lIns="91440" tIns="45720" rIns="91440" bIns="45720" rtlCol="0"/>
+          <a:lstStyle/>
+          <a:p>
+            <a:pPr lvl="0"/>
+            <a:r>
+              <a:rPr lang="en-US"/>
+              <a:t>Click to edit Master text styles</a:t>
+            </a:r>
+          </a:p>
+          <a:p>
+            <a:pPr lvl="1"/>
+            <a:r>
+              <a:rPr lang="en-US"/>
+              <a:t>Second level</a:t>
+            </a:r>
+          </a:p>
+          <a:p>
+            <a:pPr lvl="2"/>
+            <a:r>
+              <a:rPr lang="en-US"/>
+              <a:t>Third level</a:t>
+            </a:r>
+          </a:p>
+          <a:p>
+            <a:pPr lvl="3"/>
+            <a:r>
+              <a:rPr lang="en-US"/>
+              <a:t>Fourth level</a:t>
+            </a:r>
+          </a:p>
+          <a:p>
+            <a:pPr lvl="4"/>
+            <a:r>
+              <a:rPr lang="en-US"/>
+              <a:t>Fifth level</a:t>
+            </a:r>
+          </a:p>
+        </p:txBody>
+      </p:sp>
+      <p:sp>
+        <p:nvSpPr>
+          <p:cNvPr id="6" name="Footer Placeholder 5"/>
+          <p:cNvSpPr>
+            <a:spLocks noGrp="1"/>
+          </p:cNvSpPr>
+          <p:nvPr>
+            <p:ph type="ftr" sz="quarter" idx="4"/>
+          </p:nvPr>
+        </p:nvSpPr>
+        <p:spPr>
+          <a:xfrm>
+            <a:off x="0" y="8685213"/>
+            <a:ext cx="2971800" cy="458787"/>
+          </a:xfrm>
+          <a:prstGeom prst="rect">
+            <a:avLst/>
+          </a:prstGeom>
+        </p:spPr>
+        <p:txBody>
+          <a:bodyPr vert="horz" lIns="91440" tIns="45720" rIns="91440" bIns="45720" rtlCol="0" anchor="b"/>
+          <a:lstStyle>
+            <a:lvl1pPr algn="l">
+              <a:defRPr sz="1200"/>
+            </a:lvl1pPr>
+          </a:lstStyle>
+          <a:p>
+            <a:endParaRPr lang="en-US"/>
+          </a:p>
+        </p:txBody>
+      </p:sp>
+      <p:sp>
+        <p:nvSpPr>
+          <p:cNvPr id="7" name="Slide Number Placeholder 6"/>
+          <p:cNvSpPr>
+            <a:spLocks noGrp="1"/>
+          </p:cNvSpPr>
+          <p:nvPr>
+            <p:ph type="sldNum" sz="quarter" idx="5"/>
+          </p:nvPr>
+        </p:nvSpPr>
+        <p:spPr>
+          <a:xfrm>
+            <a:off x="3884613" y="8685213"/>
+            <a:ext cx="2971800" cy="458787"/>
+          </a:xfrm>
+          <a:prstGeom prst="rect">
+            <a:avLst/>
+          </a:prstGeom>
+        </p:spPr>
+        <p:txBody>
+          <a:bodyPr vert="horz" lIns="91440" tIns="45720" rIns="91440" bIns="45720" rtlCol="0" anchor="b"/>
+          <a:lstStyle>
+            <a:lvl1pPr algn="r">
+              <a:defRPr sz="1200"/>
+            </a:lvl1pPr>
+          </a:lstStyle>
+          <a:p>
+            <a:fld id="{9E526F2C-6B23-EF40-8ED8-C98EB975494B}" type="slidenum">
+              <a:rPr lang="en-US" smtClean="0"/>
+              <a:t>‹#›</a:t>
+            </a:fld>
+            <a:endParaRPr lang="en-US"/>
+          </a:p>
+        </p:txBody>
+      </p:sp>
+    </p:spTree>
+    <p:extLst>
+      <p:ext uri="{BB962C8B-B14F-4D97-AF65-F5344CB8AC3E}">
+        <p14:creationId xmlns:p14="http://schemas.microsoft.com/office/powerpoint/2010/main" val="2794821264"/>
+      </p:ext>
+    </p:extLst>
+  </p:cSld>
+  <p:clrMap bg1="lt1" tx1="dk1" bg2="lt2" tx2="dk2" accent1="accent1" accent2="accent2" accent3="accent3" accent4="accent4" accent5="accent5" accent6="accent6" hlink="hlink" folHlink="folHlink"/>
+  <p:notesStyle>
+    <a:lvl1pPr marL="0" algn="l" defTabSz="914400" rtl="0" eaLnBrk="1" latinLnBrk="0" hangingPunct="1">
+      <a:defRPr sz="1200" kern="1200">
+        <a:solidFill>
+          <a:schemeClr val="tx1"/>
+        </a:solidFill>
+        <a:latin typeface="+mn-lt"/>
+        <a:ea typeface="+mn-ea"/>
+        <a:cs typeface="+mn-cs"/>
+      </a:defRPr>
+    </a:lvl1pPr>
+    <a:lvl2pPr marL="457200" algn="l" defTabSz="914400" rtl="0" eaLnBrk="1" latinLnBrk="0" hangingPunct="1">
+      <a:defRPr sz="1200" kern="1200">
+        <a:solidFill>
+          <a:schemeClr val="tx1"/>
+        </a:solidFill>
+        <a:latin typeface="+mn-lt"/>
+        <a:ea typeface="+mn-ea"/>
+        <a:cs typeface="+mn-cs"/>
+      </a:defRPr>
+    </a:lvl2pPr>
+    <a:lvl3pPr marL="914400" algn="l" defTabSz="914400" rtl="0" eaLnBrk="1" latinLnBrk="0" hangingPunct="1">
+      <a:defRPr sz="1200" kern="1200">
+        <a:solidFill>
+          <a:schemeClr val="tx1"/>
+        </a:solidFill>
+        <a:latin typeface="+mn-lt"/>
+        <a:ea typeface="+mn-ea"/>
+        <a:cs typeface="+mn-cs"/>
+      </a:defRPr>
+    </a:lvl3pPr>
+    <a:lvl4pPr marL="1371600" algn="l" defTabSz="914400" rtl="0" eaLnBrk="1" latinLnBrk="0" hangingPunct="1">
+      <a:defRPr sz="1200" kern="1200">
+        <a:solidFill>
+          <a:schemeClr val="tx1"/>
+        </a:solidFill>
+        <a:latin typeface="+mn-lt"/>
+        <a:ea typeface="+mn-ea"/>
+        <a:cs typeface="+mn-cs"/>
+      </a:defRPr>
+    </a:lvl4pPr>
+    <a:lvl5pPr marL="1828800" algn="l" defTabSz="914400" rtl="0" eaLnBrk="1" latinLnBrk="0" hangingPunct="1">
+      <a:defRPr sz="1200" kern="1200">
+        <a:solidFill>
+          <a:schemeClr val="tx1"/>
+        </a:solidFill>
+        <a:latin typeface="+mn-lt"/>
+        <a:ea typeface="+mn-ea"/>
+        <a:cs typeface="+mn-cs"/>
+      </a:defRPr>
+    </a:lvl5pPr>
+    <a:lvl6pPr marL="2286000" algn="l" defTabSz="914400" rtl="0" eaLnBrk="1" latinLnBrk="0" hangingPunct="1">
+      <a:defRPr sz="1200" kern="1200">
+        <a:solidFill>
+          <a:schemeClr val="tx1"/>
+        </a:solidFill>
+        <a:latin typeface="+mn-lt"/>
+        <a:ea typeface="+mn-ea"/>
+        <a:cs typeface="+mn-cs"/>
+      </a:defRPr>
+    </a:lvl6pPr>
+    <a:lvl7pPr marL="2743200" algn="l" defTabSz="914400" rtl="0" eaLnBrk="1" latinLnBrk="0" hangingPunct="1">
+      <a:defRPr sz="1200" kern="1200">
+        <a:solidFill>
+          <a:schemeClr val="tx1"/>
+        </a:solidFill>
+        <a:latin typeface="+mn-lt"/>
+        <a:ea typeface="+mn-ea"/>
+        <a:cs typeface="+mn-cs"/>
+      </a:defRPr>
+    </a:lvl7pPr>
+    <a:lvl8pPr marL="3200400" algn="l" defTabSz="914400" rtl="0" eaLnBrk="1" latinLnBrk="0" hangingPunct="1">
+      <a:defRPr sz="1200" kern="1200">
+        <a:solidFill>
+          <a:schemeClr val="tx1"/>
+        </a:solidFill>
+        <a:latin typeface="+mn-lt"/>
+        <a:ea typeface="+mn-ea"/>
+        <a:cs typeface="+mn-cs"/>
+      </a:defRPr>
+    </a:lvl8pPr>
+    <a:lvl9pPr marL="3657600" algn="l" defTabSz="914400" rtl="0" eaLnBrk="1" latinLnBrk="0" hangingPunct="1">
+      <a:defRPr sz="1200" kern="1200">
+        <a:solidFill>
+          <a:schemeClr val="tx1"/>
+        </a:solidFill>
+        <a:latin typeface="+mn-lt"/>
+        <a:ea typeface="+mn-ea"/>
+        <a:cs typeface="+mn-cs"/>
+      </a:defRPr>
+    </a:lvl9pPr>
+  </p:notesStyle>
+</p:notesMaster>
+</file>
+
+<file path=ppt/notesSlides/notesSlide1.xml><?xml version="1.0" encoding="utf-8"?>
+<p:notes xmlns:a="http://schemas.openxmlformats.org/drawingml/2006/main" xmlns:r="http://schemas.openxmlformats.org/officeDocument/2006/relationships" xmlns:p="http://schemas.openxmlformats.org/presentationml/2006/main">
+  <p:cSld>
+    <p:spTree>
+      <p:nvGrpSpPr>
+        <p:cNvPr id="1" name=""/>
+        <p:cNvGrpSpPr/>
+        <p:nvPr/>
+      </p:nvGrpSpPr>
+      <p:grpSpPr>
+        <a:xfrm>
+          <a:off x="0" y="0"/>
+          <a:ext cx="0" cy="0"/>
+          <a:chOff x="0" y="0"/>
+          <a:chExt cx="0" cy="0"/>
+        </a:xfrm>
+      </p:grpSpPr>
+      <p:sp>
+        <p:nvSpPr>
+          <p:cNvPr id="2" name="Slide Image Placeholder 1"/>
+          <p:cNvSpPr>
+            <a:spLocks noGrp="1" noRot="1" noChangeAspect="1"/>
+          </p:cNvSpPr>
+          <p:nvPr>
+            <p:ph type="sldImg"/>
+          </p:nvPr>
+        </p:nvSpPr>
+        <p:spPr/>
+      </p:sp>
+      <p:sp>
+        <p:nvSpPr>
+          <p:cNvPr id="3" name="Notes Placeholder 2"/>
+          <p:cNvSpPr>
+            <a:spLocks noGrp="1"/>
+          </p:cNvSpPr>
+          <p:nvPr>
+            <p:ph type="body" idx="1"/>
+          </p:nvPr>
+        </p:nvSpPr>
+        <p:spPr/>
+        <p:txBody>
+          <a:bodyPr/>
+          <a:lstStyle/>
+          <a:p>
+            <a:endParaRPr lang="en-US" dirty="0"/>
+          </a:p>
+        </p:txBody>
+      </p:sp>
+      <p:sp>
+        <p:nvSpPr>
+          <p:cNvPr id="4" name="Slide Number Placeholder 3"/>
+          <p:cNvSpPr>
+            <a:spLocks noGrp="1"/>
+          </p:cNvSpPr>
+          <p:nvPr>
+            <p:ph type="sldNum" sz="quarter" idx="5"/>
+          </p:nvPr>
+        </p:nvSpPr>
+        <p:spPr/>
+        <p:txBody>
+          <a:bodyPr/>
+          <a:lstStyle/>
+          <a:p>
+            <a:fld id="{9E526F2C-6B23-EF40-8ED8-C98EB975494B}" type="slidenum">
+              <a:rPr lang="en-US" smtClean="0"/>
+              <a:t>3</a:t>
+            </a:fld>
+            <a:endParaRPr lang="en-US"/>
+          </a:p>
+        </p:txBody>
+      </p:sp>
+    </p:spTree>
+    <p:extLst>
+      <p:ext uri="{BB962C8B-B14F-4D97-AF65-F5344CB8AC3E}">
+        <p14:creationId xmlns:p14="http://schemas.microsoft.com/office/powerpoint/2010/main" val="2405605952"/>
+      </p:ext>
+    </p:extLst>
+  </p:cSld>
+  <p:clrMapOvr>
+    <a:masterClrMapping/>
+  </p:clrMapOvr>
+</p:notes>
 </file>
 
 <file path=ppt/slideLayouts/slideLayout1.xml><?xml version="1.0" encoding="utf-8"?>
@@ -6283,7 +6719,7 @@
                   </a:solidFill>
                   <a:latin typeface="AVENIR LIGHT OBLIQUE" panose="020B0402020203090204" pitchFamily="34" charset="77"/>
                 </a:rPr>
-                <a:t>Holly</a:t>
+                <a:t>Hugo</a:t>
               </a:r>
             </a:p>
           </p:txBody>
@@ -7994,14 +8430,20 @@
             <a:p>
               <a:pPr algn="ctr"/>
               <a:r>
-                <a:rPr lang="en-US" sz="1000" dirty="0">
+                <a:rPr lang="en-US" sz="1000">
                   <a:solidFill>
                     <a:schemeClr val="tx1"/>
                   </a:solidFill>
                   <a:latin typeface="AVENIR LIGHT OBLIQUE" panose="020B0402020203090204" pitchFamily="34" charset="77"/>
                 </a:rPr>
-                <a:t>Holly</a:t>
+                <a:t>Hugo</a:t>
               </a:r>
+              <a:endParaRPr lang="en-US" sz="1000" dirty="0">
+                <a:solidFill>
+                  <a:schemeClr val="tx1"/>
+                </a:solidFill>
+                <a:latin typeface="AVENIR LIGHT OBLIQUE" panose="020B0402020203090204" pitchFamily="34" charset="77"/>
+              </a:endParaRPr>
             </a:p>
           </p:txBody>
         </p:sp>
@@ -9636,22 +10078,13 @@
               <a:lstStyle/>
               <a:p>
                 <a:r>
-                  <a:rPr lang="en-US" sz="1000">
-                    <a:solidFill>
-                      <a:srgbClr val="FF0000"/>
-                    </a:solidFill>
-                    <a:latin typeface="Avenir Book" panose="02000503020000020003" pitchFamily="2" charset="0"/>
-                  </a:rPr>
-                  <a:t>GET </a:t>
-                </a:r>
-                <a:r>
                   <a:rPr lang="en-US" sz="1000" dirty="0">
                     <a:solidFill>
                       <a:srgbClr val="FF0000"/>
                     </a:solidFill>
                     <a:latin typeface="Avenir Book" panose="02000503020000020003" pitchFamily="2" charset="0"/>
                   </a:rPr>
-                  <a:t>key-share</a:t>
+                  <a:t>GET key-share</a:t>
                 </a:r>
               </a:p>
             </p:txBody>
@@ -9984,4 +10417,319 @@
     </a:ext>
   </a:extLst>
 </a:theme>
+</file>
+
+<file path=ppt/theme/theme2.xml><?xml version="1.0" encoding="utf-8"?>
+<a:theme xmlns:a="http://schemas.openxmlformats.org/drawingml/2006/main" name="Office Theme">
+  <a:themeElements>
+    <a:clrScheme name="Office">
+      <a:dk1>
+        <a:sysClr val="windowText" lastClr="000000"/>
+      </a:dk1>
+      <a:lt1>
+        <a:sysClr val="window" lastClr="FFFFFF"/>
+      </a:lt1>
+      <a:dk2>
+        <a:srgbClr val="0E2841"/>
+      </a:dk2>
+      <a:lt2>
+        <a:srgbClr val="E8E8E8"/>
+      </a:lt2>
+      <a:accent1>
+        <a:srgbClr val="156082"/>
+      </a:accent1>
+      <a:accent2>
+        <a:srgbClr val="E97132"/>
+      </a:accent2>
+      <a:accent3>
+        <a:srgbClr val="196B24"/>
+      </a:accent3>
+      <a:accent4>
+        <a:srgbClr val="0F9ED5"/>
+      </a:accent4>
+      <a:accent5>
+        <a:srgbClr val="A02B93"/>
+      </a:accent5>
+      <a:accent6>
+        <a:srgbClr val="4EA72E"/>
+      </a:accent6>
+      <a:hlink>
+        <a:srgbClr val="467886"/>
+      </a:hlink>
+      <a:folHlink>
+        <a:srgbClr val="96607D"/>
+      </a:folHlink>
+    </a:clrScheme>
+    <a:fontScheme name="Office">
+      <a:majorFont>
+        <a:latin typeface="Aptos Display" panose="02110004020202020204"/>
+        <a:ea typeface=""/>
+        <a:cs typeface=""/>
+        <a:font script="Jpan" typeface="游ゴシック Light"/>
+        <a:font script="Hang" typeface="맑은 고딕"/>
+        <a:font script="Hans" typeface="等线 Light"/>
+        <a:font script="Hant" typeface="新細明體"/>
+        <a:font script="Arab" typeface="Times New Roman"/>
+        <a:font script="Hebr" typeface="Times New Roman"/>
+        <a:font script="Thai" typeface="Angsana New"/>
+        <a:font script="Ethi" typeface="Nyala"/>
+        <a:font script="Beng" typeface="Vrinda"/>
+        <a:font script="Gujr" typeface="Shruti"/>
+        <a:font script="Khmr" typeface="MoolBoran"/>
+        <a:font script="Knda" typeface="Tunga"/>
+        <a:font script="Guru" typeface="Raavi"/>
+        <a:font script="Cans" typeface="Euphemia"/>
+        <a:font script="Cher" typeface="Plantagenet Cherokee"/>
+        <a:font script="Yiii" typeface="Microsoft Yi Baiti"/>
+        <a:font script="Tibt" typeface="Microsoft Himalaya"/>
+        <a:font script="Thaa" typeface="MV Boli"/>
+        <a:font script="Deva" typeface="Mangal"/>
+        <a:font script="Telu" typeface="Gautami"/>
+        <a:font script="Taml" typeface="Latha"/>
+        <a:font script="Syrc" typeface="Estrangelo Edessa"/>
+        <a:font script="Orya" typeface="Kalinga"/>
+        <a:font script="Mlym" typeface="Kartika"/>
+        <a:font script="Laoo" typeface="DokChampa"/>
+        <a:font script="Sinh" typeface="Iskoola Pota"/>
+        <a:font script="Mong" typeface="Mongolian Baiti"/>
+        <a:font script="Viet" typeface="Times New Roman"/>
+        <a:font script="Uigh" typeface="Microsoft Uighur"/>
+        <a:font script="Geor" typeface="Sylfaen"/>
+        <a:font script="Armn" typeface="Arial"/>
+        <a:font script="Bugi" typeface="Leelawadee UI"/>
+        <a:font script="Bopo" typeface="Microsoft JhengHei"/>
+        <a:font script="Java" typeface="Javanese Text"/>
+        <a:font script="Lisu" typeface="Segoe UI"/>
+        <a:font script="Mymr" typeface="Myanmar Text"/>
+        <a:font script="Nkoo" typeface="Ebrima"/>
+        <a:font script="Olck" typeface="Nirmala UI"/>
+        <a:font script="Osma" typeface="Ebrima"/>
+        <a:font script="Phag" typeface="Phagspa"/>
+        <a:font script="Syrn" typeface="Estrangelo Edessa"/>
+        <a:font script="Syrj" typeface="Estrangelo Edessa"/>
+        <a:font script="Syre" typeface="Estrangelo Edessa"/>
+        <a:font script="Sora" typeface="Nirmala UI"/>
+        <a:font script="Tale" typeface="Microsoft Tai Le"/>
+        <a:font script="Talu" typeface="Microsoft New Tai Lue"/>
+        <a:font script="Tfng" typeface="Ebrima"/>
+      </a:majorFont>
+      <a:minorFont>
+        <a:latin typeface="Aptos" panose="02110004020202020204"/>
+        <a:ea typeface=""/>
+        <a:cs typeface=""/>
+        <a:font script="Jpan" typeface="游ゴシック"/>
+        <a:font script="Hang" typeface="맑은 고딕"/>
+        <a:font script="Hans" typeface="等线"/>
+        <a:font script="Hant" typeface="新細明體"/>
+        <a:font script="Arab" typeface="Arial"/>
+        <a:font script="Hebr" typeface="Arial"/>
+        <a:font script="Thai" typeface="Cordia New"/>
+        <a:font script="Ethi" typeface="Nyala"/>
+        <a:font script="Beng" typeface="Vrinda"/>
+        <a:font script="Gujr" typeface="Shruti"/>
+        <a:font script="Khmr" typeface="DaunPenh"/>
+        <a:font script="Knda" typeface="Tunga"/>
+        <a:font script="Guru" typeface="Raavi"/>
+        <a:font script="Cans" typeface="Euphemia"/>
+        <a:font script="Cher" typeface="Plantagenet Cherokee"/>
+        <a:font script="Yiii" typeface="Microsoft Yi Baiti"/>
+        <a:font script="Tibt" typeface="Microsoft Himalaya"/>
+        <a:font script="Thaa" typeface="MV Boli"/>
+        <a:font script="Deva" typeface="Mangal"/>
+        <a:font script="Telu" typeface="Gautami"/>
+        <a:font script="Taml" typeface="Latha"/>
+        <a:font script="Syrc" typeface="Estrangelo Edessa"/>
+        <a:font script="Orya" typeface="Kalinga"/>
+        <a:font script="Mlym" typeface="Kartika"/>
+        <a:font script="Laoo" typeface="DokChampa"/>
+        <a:font script="Sinh" typeface="Iskoola Pota"/>
+        <a:font script="Mong" typeface="Mongolian Baiti"/>
+        <a:font script="Viet" typeface="Arial"/>
+        <a:font script="Uigh" typeface="Microsoft Uighur"/>
+        <a:font script="Geor" typeface="Sylfaen"/>
+        <a:font script="Armn" typeface="Arial"/>
+        <a:font script="Bugi" typeface="Leelawadee UI"/>
+        <a:font script="Bopo" typeface="Microsoft JhengHei"/>
+        <a:font script="Java" typeface="Javanese Text"/>
+        <a:font script="Lisu" typeface="Segoe UI"/>
+        <a:font script="Mymr" typeface="Myanmar Text"/>
+        <a:font script="Nkoo" typeface="Ebrima"/>
+        <a:font script="Olck" typeface="Nirmala UI"/>
+        <a:font script="Osma" typeface="Ebrima"/>
+        <a:font script="Phag" typeface="Phagspa"/>
+        <a:font script="Syrn" typeface="Estrangelo Edessa"/>
+        <a:font script="Syrj" typeface="Estrangelo Edessa"/>
+        <a:font script="Syre" typeface="Estrangelo Edessa"/>
+        <a:font script="Sora" typeface="Nirmala UI"/>
+        <a:font script="Tale" typeface="Microsoft Tai Le"/>
+        <a:font script="Talu" typeface="Microsoft New Tai Lue"/>
+        <a:font script="Tfng" typeface="Ebrima"/>
+      </a:minorFont>
+    </a:fontScheme>
+    <a:fmtScheme name="Office">
+      <a:fillStyleLst>
+        <a:solidFill>
+          <a:schemeClr val="phClr"/>
+        </a:solidFill>
+        <a:gradFill rotWithShape="1">
+          <a:gsLst>
+            <a:gs pos="0">
+              <a:schemeClr val="phClr">
+                <a:lumMod val="110000"/>
+                <a:satMod val="105000"/>
+                <a:tint val="67000"/>
+              </a:schemeClr>
+            </a:gs>
+            <a:gs pos="50000">
+              <a:schemeClr val="phClr">
+                <a:lumMod val="105000"/>
+                <a:satMod val="103000"/>
+                <a:tint val="73000"/>
+              </a:schemeClr>
+            </a:gs>
+            <a:gs pos="100000">
+              <a:schemeClr val="phClr">
+                <a:lumMod val="105000"/>
+                <a:satMod val="109000"/>
+                <a:tint val="81000"/>
+              </a:schemeClr>
+            </a:gs>
+          </a:gsLst>
+          <a:lin ang="5400000" scaled="0"/>
+        </a:gradFill>
+        <a:gradFill rotWithShape="1">
+          <a:gsLst>
+            <a:gs pos="0">
+              <a:schemeClr val="phClr">
+                <a:satMod val="103000"/>
+                <a:lumMod val="102000"/>
+                <a:tint val="94000"/>
+              </a:schemeClr>
+            </a:gs>
+            <a:gs pos="50000">
+              <a:schemeClr val="phClr">
+                <a:satMod val="110000"/>
+                <a:lumMod val="100000"/>
+                <a:shade val="100000"/>
+              </a:schemeClr>
+            </a:gs>
+            <a:gs pos="100000">
+              <a:schemeClr val="phClr">
+                <a:lumMod val="99000"/>
+                <a:satMod val="120000"/>
+                <a:shade val="78000"/>
+              </a:schemeClr>
+            </a:gs>
+          </a:gsLst>
+          <a:lin ang="5400000" scaled="0"/>
+        </a:gradFill>
+      </a:fillStyleLst>
+      <a:lnStyleLst>
+        <a:ln w="12700" cap="flat" cmpd="sng" algn="ctr">
+          <a:solidFill>
+            <a:schemeClr val="phClr"/>
+          </a:solidFill>
+          <a:prstDash val="solid"/>
+          <a:miter lim="800000"/>
+        </a:ln>
+        <a:ln w="19050" cap="flat" cmpd="sng" algn="ctr">
+          <a:solidFill>
+            <a:schemeClr val="phClr"/>
+          </a:solidFill>
+          <a:prstDash val="solid"/>
+          <a:miter lim="800000"/>
+        </a:ln>
+        <a:ln w="25400" cap="flat" cmpd="sng" algn="ctr">
+          <a:solidFill>
+            <a:schemeClr val="phClr"/>
+          </a:solidFill>
+          <a:prstDash val="solid"/>
+          <a:miter lim="800000"/>
+        </a:ln>
+      </a:lnStyleLst>
+      <a:effectStyleLst>
+        <a:effectStyle>
+          <a:effectLst/>
+        </a:effectStyle>
+        <a:effectStyle>
+          <a:effectLst/>
+        </a:effectStyle>
+        <a:effectStyle>
+          <a:effectLst>
+            <a:outerShdw blurRad="57150" dist="19050" dir="5400000" algn="ctr" rotWithShape="0">
+              <a:srgbClr val="000000">
+                <a:alpha val="63000"/>
+              </a:srgbClr>
+            </a:outerShdw>
+          </a:effectLst>
+        </a:effectStyle>
+      </a:effectStyleLst>
+      <a:bgFillStyleLst>
+        <a:solidFill>
+          <a:schemeClr val="phClr"/>
+        </a:solidFill>
+        <a:solidFill>
+          <a:schemeClr val="phClr">
+            <a:tint val="95000"/>
+            <a:satMod val="170000"/>
+          </a:schemeClr>
+        </a:solidFill>
+        <a:gradFill rotWithShape="1">
+          <a:gsLst>
+            <a:gs pos="0">
+              <a:schemeClr val="phClr">
+                <a:tint val="93000"/>
+                <a:satMod val="150000"/>
+                <a:shade val="98000"/>
+                <a:lumMod val="102000"/>
+              </a:schemeClr>
+            </a:gs>
+            <a:gs pos="50000">
+              <a:schemeClr val="phClr">
+                <a:tint val="98000"/>
+                <a:satMod val="130000"/>
+                <a:shade val="90000"/>
+                <a:lumMod val="103000"/>
+              </a:schemeClr>
+            </a:gs>
+            <a:gs pos="100000">
+              <a:schemeClr val="phClr">
+                <a:shade val="63000"/>
+                <a:satMod val="120000"/>
+              </a:schemeClr>
+            </a:gs>
+          </a:gsLst>
+          <a:lin ang="5400000" scaled="0"/>
+        </a:gradFill>
+      </a:bgFillStyleLst>
+    </a:fmtScheme>
+  </a:themeElements>
+  <a:objectDefaults>
+    <a:lnDef>
+      <a:spPr/>
+      <a:bodyPr/>
+      <a:lstStyle/>
+      <a:style>
+        <a:lnRef idx="2">
+          <a:schemeClr val="accent1"/>
+        </a:lnRef>
+        <a:fillRef idx="0">
+          <a:schemeClr val="accent1"/>
+        </a:fillRef>
+        <a:effectRef idx="1">
+          <a:schemeClr val="accent1"/>
+        </a:effectRef>
+        <a:fontRef idx="minor">
+          <a:schemeClr val="tx1"/>
+        </a:fontRef>
+      </a:style>
+    </a:lnDef>
+  </a:objectDefaults>
+  <a:extraClrSchemeLst/>
+  <a:extLst>
+    <a:ext uri="{05A4C25C-085E-4340-85A3-A5531E510DB2}">
+      <thm15:themeFamily xmlns:thm15="http://schemas.microsoft.com/office/thememl/2012/main" name="Office Theme" id="{2E142A2C-CD16-42D6-873A-C26D2A0506FA}" vid="{1BDDFF52-6CD6-40A5-AB3C-68EB2F1E4D0A}"/>
+    </a:ext>
+  </a:extLst>
+</a:theme>
 </file>
</xml_diff>

<commit_message>
Review and update intro
</commit_message>
<xml_diff>
--- a/docs/figures/figures.pptx
+++ b/docs/figures/figures.pptx
@@ -5,21 +5,22 @@
     <p:sldMasterId id="2147483648" r:id="rId1"/>
   </p:sldMasterIdLst>
   <p:notesMasterIdLst>
-    <p:notesMasterId r:id="rId14"/>
+    <p:notesMasterId r:id="rId15"/>
   </p:notesMasterIdLst>
   <p:sldIdLst>
-    <p:sldId id="261" r:id="rId2"/>
-    <p:sldId id="262" r:id="rId3"/>
-    <p:sldId id="263" r:id="rId4"/>
-    <p:sldId id="256" r:id="rId5"/>
-    <p:sldId id="264" r:id="rId6"/>
-    <p:sldId id="265" r:id="rId7"/>
-    <p:sldId id="266" r:id="rId8"/>
-    <p:sldId id="267" r:id="rId9"/>
-    <p:sldId id="257" r:id="rId10"/>
-    <p:sldId id="258" r:id="rId11"/>
-    <p:sldId id="259" r:id="rId12"/>
-    <p:sldId id="260" r:id="rId13"/>
+    <p:sldId id="268" r:id="rId2"/>
+    <p:sldId id="261" r:id="rId3"/>
+    <p:sldId id="262" r:id="rId4"/>
+    <p:sldId id="263" r:id="rId5"/>
+    <p:sldId id="256" r:id="rId6"/>
+    <p:sldId id="264" r:id="rId7"/>
+    <p:sldId id="265" r:id="rId8"/>
+    <p:sldId id="266" r:id="rId9"/>
+    <p:sldId id="267" r:id="rId10"/>
+    <p:sldId id="257" r:id="rId11"/>
+    <p:sldId id="258" r:id="rId12"/>
+    <p:sldId id="259" r:id="rId13"/>
+    <p:sldId id="260" r:id="rId14"/>
   </p:sldIdLst>
   <p:sldSz cx="12192000" cy="6858000"/>
   <p:notesSz cx="6858000" cy="9144000"/>
@@ -208,7 +209,7 @@
           <a:p>
             <a:fld id="{66C4A6C0-F2EC-FC45-B98B-ED31D507F3F3}" type="datetimeFigureOut">
               <a:rPr lang="en-US" smtClean="0"/>
-              <a:t>10/6/25</a:t>
+              <a:t>10/19/25</a:t>
             </a:fld>
             <a:endParaRPr lang="en-US"/>
           </a:p>
@@ -540,7 +541,7 @@
           <a:p>
             <a:fld id="{9E526F2C-6B23-EF40-8ED8-C98EB975494B}" type="slidenum">
               <a:rPr lang="en-US" smtClean="0"/>
-              <a:t>10</a:t>
+              <a:t>11</a:t>
             </a:fld>
             <a:endParaRPr lang="en-US"/>
           </a:p>
@@ -706,7 +707,7 @@
           <a:p>
             <a:fld id="{6E32B2FD-E7C2-BB4E-8CD5-3A0929CC3D5F}" type="datetimeFigureOut">
               <a:rPr lang="en-US" smtClean="0"/>
-              <a:t>10/6/25</a:t>
+              <a:t>10/19/25</a:t>
             </a:fld>
             <a:endParaRPr lang="en-US"/>
           </a:p>
@@ -904,7 +905,7 @@
           <a:p>
             <a:fld id="{6E32B2FD-E7C2-BB4E-8CD5-3A0929CC3D5F}" type="datetimeFigureOut">
               <a:rPr lang="en-US" smtClean="0"/>
-              <a:t>10/6/25</a:t>
+              <a:t>10/19/25</a:t>
             </a:fld>
             <a:endParaRPr lang="en-US"/>
           </a:p>
@@ -1112,7 +1113,7 @@
           <a:p>
             <a:fld id="{6E32B2FD-E7C2-BB4E-8CD5-3A0929CC3D5F}" type="datetimeFigureOut">
               <a:rPr lang="en-US" smtClean="0"/>
-              <a:t>10/6/25</a:t>
+              <a:t>10/19/25</a:t>
             </a:fld>
             <a:endParaRPr lang="en-US"/>
           </a:p>
@@ -1310,7 +1311,7 @@
           <a:p>
             <a:fld id="{6E32B2FD-E7C2-BB4E-8CD5-3A0929CC3D5F}" type="datetimeFigureOut">
               <a:rPr lang="en-US" smtClean="0"/>
-              <a:t>10/6/25</a:t>
+              <a:t>10/19/25</a:t>
             </a:fld>
             <a:endParaRPr lang="en-US"/>
           </a:p>
@@ -1585,7 +1586,7 @@
           <a:p>
             <a:fld id="{6E32B2FD-E7C2-BB4E-8CD5-3A0929CC3D5F}" type="datetimeFigureOut">
               <a:rPr lang="en-US" smtClean="0"/>
-              <a:t>10/6/25</a:t>
+              <a:t>10/19/25</a:t>
             </a:fld>
             <a:endParaRPr lang="en-US"/>
           </a:p>
@@ -1850,7 +1851,7 @@
           <a:p>
             <a:fld id="{6E32B2FD-E7C2-BB4E-8CD5-3A0929CC3D5F}" type="datetimeFigureOut">
               <a:rPr lang="en-US" smtClean="0"/>
-              <a:t>10/6/25</a:t>
+              <a:t>10/19/25</a:t>
             </a:fld>
             <a:endParaRPr lang="en-US"/>
           </a:p>
@@ -2262,7 +2263,7 @@
           <a:p>
             <a:fld id="{6E32B2FD-E7C2-BB4E-8CD5-3A0929CC3D5F}" type="datetimeFigureOut">
               <a:rPr lang="en-US" smtClean="0"/>
-              <a:t>10/6/25</a:t>
+              <a:t>10/19/25</a:t>
             </a:fld>
             <a:endParaRPr lang="en-US"/>
           </a:p>
@@ -2403,7 +2404,7 @@
           <a:p>
             <a:fld id="{6E32B2FD-E7C2-BB4E-8CD5-3A0929CC3D5F}" type="datetimeFigureOut">
               <a:rPr lang="en-US" smtClean="0"/>
-              <a:t>10/6/25</a:t>
+              <a:t>10/19/25</a:t>
             </a:fld>
             <a:endParaRPr lang="en-US"/>
           </a:p>
@@ -2516,7 +2517,7 @@
           <a:p>
             <a:fld id="{6E32B2FD-E7C2-BB4E-8CD5-3A0929CC3D5F}" type="datetimeFigureOut">
               <a:rPr lang="en-US" smtClean="0"/>
-              <a:t>10/6/25</a:t>
+              <a:t>10/19/25</a:t>
             </a:fld>
             <a:endParaRPr lang="en-US"/>
           </a:p>
@@ -2827,7 +2828,7 @@
           <a:p>
             <a:fld id="{6E32B2FD-E7C2-BB4E-8CD5-3A0929CC3D5F}" type="datetimeFigureOut">
               <a:rPr lang="en-US" smtClean="0"/>
-              <a:t>10/6/25</a:t>
+              <a:t>10/19/25</a:t>
             </a:fld>
             <a:endParaRPr lang="en-US"/>
           </a:p>
@@ -3115,7 +3116,7 @@
           <a:p>
             <a:fld id="{6E32B2FD-E7C2-BB4E-8CD5-3A0929CC3D5F}" type="datetimeFigureOut">
               <a:rPr lang="en-US" smtClean="0"/>
-              <a:t>10/6/25</a:t>
+              <a:t>10/19/25</a:t>
             </a:fld>
             <a:endParaRPr lang="en-US"/>
           </a:p>
@@ -3356,7 +3357,7 @@
           <a:p>
             <a:fld id="{6E32B2FD-E7C2-BB4E-8CD5-3A0929CC3D5F}" type="datetimeFigureOut">
               <a:rPr lang="en-US" smtClean="0"/>
-              <a:t>10/6/25</a:t>
+              <a:t>10/19/25</a:t>
             </a:fld>
             <a:endParaRPr lang="en-US"/>
           </a:p>
@@ -3775,10 +3776,10 @@
       </p:grpSpPr>
       <p:pic>
         <p:nvPicPr>
-          <p:cNvPr id="6" name="Picture 5">
-            <a:extLst>
-              <a:ext uri="{FF2B5EF4-FFF2-40B4-BE49-F238E27FC236}">
-                <a16:creationId xmlns:a16="http://schemas.microsoft.com/office/drawing/2014/main" id="{43A7B373-2306-E4FA-7FF2-DA7699FBB0F2}"/>
+          <p:cNvPr id="2" name="Picture 1">
+            <a:extLst>
+              <a:ext uri="{FF2B5EF4-FFF2-40B4-BE49-F238E27FC236}">
+                <a16:creationId xmlns:a16="http://schemas.microsoft.com/office/drawing/2014/main" id="{C4EF0633-4E9F-3F50-A178-7A7CC01BFBB8}"/>
               </a:ext>
             </a:extLst>
           </p:cNvPr>
@@ -3795,18 +3796,149 @@
         </p:blipFill>
         <p:spPr>
           <a:xfrm>
-            <a:off x="2209800" y="957557"/>
-            <a:ext cx="7772400" cy="4942886"/>
+            <a:off x="3536950" y="969878"/>
+            <a:ext cx="4514850" cy="4726071"/>
           </a:xfrm>
           <a:prstGeom prst="rect">
             <a:avLst/>
           </a:prstGeom>
         </p:spPr>
       </p:pic>
+      <p:sp>
+        <p:nvSpPr>
+          <p:cNvPr id="3" name="Rectangle 2">
+            <a:extLst>
+              <a:ext uri="{FF2B5EF4-FFF2-40B4-BE49-F238E27FC236}">
+                <a16:creationId xmlns:a16="http://schemas.microsoft.com/office/drawing/2014/main" id="{A81F20AD-2360-D971-FB88-B3E54533EBF2}"/>
+              </a:ext>
+            </a:extLst>
+          </p:cNvPr>
+          <p:cNvSpPr/>
+          <p:nvPr/>
+        </p:nvSpPr>
+        <p:spPr>
+          <a:xfrm>
+            <a:off x="575426" y="736600"/>
+            <a:ext cx="11045074" cy="5372100"/>
+          </a:xfrm>
+          <a:prstGeom prst="rect">
+            <a:avLst/>
+          </a:prstGeom>
+          <a:noFill/>
+          <a:ln w="9525">
+            <a:solidFill>
+              <a:schemeClr val="bg1">
+                <a:lumMod val="65000"/>
+              </a:schemeClr>
+            </a:solidFill>
+          </a:ln>
+        </p:spPr>
+        <p:style>
+          <a:lnRef idx="2">
+            <a:schemeClr val="accent1">
+              <a:shade val="15000"/>
+            </a:schemeClr>
+          </a:lnRef>
+          <a:fillRef idx="1">
+            <a:schemeClr val="accent1"/>
+          </a:fillRef>
+          <a:effectRef idx="0">
+            <a:schemeClr val="accent1"/>
+          </a:effectRef>
+          <a:fontRef idx="minor">
+            <a:schemeClr val="lt1"/>
+          </a:fontRef>
+        </p:style>
+        <p:txBody>
+          <a:bodyPr rtlCol="0" anchor="ctr"/>
+          <a:lstStyle/>
+          <a:p>
+            <a:pPr algn="ctr"/>
+            <a:endParaRPr lang="en-US" sz="1000" dirty="0">
+              <a:solidFill>
+                <a:schemeClr val="tx1"/>
+              </a:solidFill>
+              <a:latin typeface="Avenir Book" panose="02000503020000020003" pitchFamily="2" charset="0"/>
+            </a:endParaRPr>
+          </a:p>
+        </p:txBody>
+      </p:sp>
+      <p:sp>
+        <p:nvSpPr>
+          <p:cNvPr id="4" name="Rectangle 3">
+            <a:extLst>
+              <a:ext uri="{FF2B5EF4-FFF2-40B4-BE49-F238E27FC236}">
+                <a16:creationId xmlns:a16="http://schemas.microsoft.com/office/drawing/2014/main" id="{396E23AC-4A57-3756-074F-9A0E9C28857B}"/>
+              </a:ext>
+            </a:extLst>
+          </p:cNvPr>
+          <p:cNvSpPr/>
+          <p:nvPr/>
+        </p:nvSpPr>
+        <p:spPr>
+          <a:xfrm>
+            <a:off x="584200" y="5480049"/>
+            <a:ext cx="9347200" cy="624078"/>
+          </a:xfrm>
+          <a:prstGeom prst="rect">
+            <a:avLst/>
+          </a:prstGeom>
+          <a:noFill/>
+          <a:ln w="9525">
+            <a:noFill/>
+          </a:ln>
+        </p:spPr>
+        <p:style>
+          <a:lnRef idx="2">
+            <a:schemeClr val="accent1">
+              <a:shade val="15000"/>
+            </a:schemeClr>
+          </a:lnRef>
+          <a:fillRef idx="1">
+            <a:schemeClr val="accent1"/>
+          </a:fillRef>
+          <a:effectRef idx="0">
+            <a:schemeClr val="accent1"/>
+          </a:effectRef>
+          <a:fontRef idx="minor">
+            <a:schemeClr val="lt1"/>
+          </a:fontRef>
+        </p:style>
+        <p:txBody>
+          <a:bodyPr rtlCol="0" anchor="b"/>
+          <a:lstStyle/>
+          <a:p>
+            <a:r>
+              <a:rPr lang="en-US" sz="1000" dirty="0">
+                <a:solidFill>
+                  <a:schemeClr val="tx1"/>
+                </a:solidFill>
+                <a:latin typeface="Avenir Book" panose="02000503020000020003" pitchFamily="2" charset="0"/>
+              </a:rPr>
+              <a:t>Source: “Quantum Threat Timeline Report 2024 Executive Summary”, Global </a:t>
+            </a:r>
+            <a:r>
+              <a:rPr lang="en-US" sz="1000">
+                <a:solidFill>
+                  <a:schemeClr val="tx1"/>
+                </a:solidFill>
+                <a:latin typeface="Avenir Book" panose="02000503020000020003" pitchFamily="2" charset="0"/>
+              </a:rPr>
+              <a:t>Risk Institute</a:t>
+            </a:r>
+            <a:endParaRPr lang="en-US" sz="1000" dirty="0">
+              <a:solidFill>
+                <a:schemeClr val="tx1"/>
+              </a:solidFill>
+              <a:latin typeface="Avenir Book" panose="02000503020000020003" pitchFamily="2" charset="0"/>
+            </a:endParaRPr>
+          </a:p>
+        </p:txBody>
+      </p:sp>
     </p:spTree>
     <p:extLst>
       <p:ext uri="{BB962C8B-B14F-4D97-AF65-F5344CB8AC3E}">
-        <p14:creationId xmlns:p14="http://schemas.microsoft.com/office/powerpoint/2010/main" val="791609908"/>
+        <p14:creationId xmlns:p14="http://schemas.microsoft.com/office/powerpoint/2010/main" val="1439571522"/>
       </p:ext>
     </p:extLst>
   </p:cSld>
@@ -3817,6 +3949,1783 @@
 </file>
 
 <file path=ppt/slides/slide10.xml><?xml version="1.0" encoding="utf-8"?>
+<p:sld xmlns:a="http://schemas.openxmlformats.org/drawingml/2006/main" xmlns:r="http://schemas.openxmlformats.org/officeDocument/2006/relationships" xmlns:p="http://schemas.openxmlformats.org/presentationml/2006/main">
+  <p:cSld>
+    <p:spTree>
+      <p:nvGrpSpPr>
+        <p:cNvPr id="1" name=""/>
+        <p:cNvGrpSpPr/>
+        <p:nvPr/>
+      </p:nvGrpSpPr>
+      <p:grpSpPr>
+        <a:xfrm>
+          <a:off x="0" y="0"/>
+          <a:ext cx="0" cy="0"/>
+          <a:chOff x="0" y="0"/>
+          <a:chExt cx="0" cy="0"/>
+        </a:xfrm>
+      </p:grpSpPr>
+      <p:grpSp>
+        <p:nvGrpSpPr>
+          <p:cNvPr id="13" name="Group 12">
+            <a:extLst>
+              <a:ext uri="{FF2B5EF4-FFF2-40B4-BE49-F238E27FC236}">
+                <a16:creationId xmlns:a16="http://schemas.microsoft.com/office/drawing/2014/main" id="{3116D5A4-77C1-CADF-0372-1CE15D96B3F7}"/>
+              </a:ext>
+            </a:extLst>
+          </p:cNvPr>
+          <p:cNvGrpSpPr/>
+          <p:nvPr/>
+        </p:nvGrpSpPr>
+        <p:grpSpPr>
+          <a:xfrm>
+            <a:off x="9649561" y="1434512"/>
+            <a:ext cx="600778" cy="3537023"/>
+            <a:chOff x="3608757" y="1282112"/>
+            <a:chExt cx="600778" cy="3537023"/>
+          </a:xfrm>
+        </p:grpSpPr>
+        <p:sp>
+          <p:nvSpPr>
+            <p:cNvPr id="2" name="Rectangle 1">
+              <a:extLst>
+                <a:ext uri="{FF2B5EF4-FFF2-40B4-BE49-F238E27FC236}">
+                  <a16:creationId xmlns:a16="http://schemas.microsoft.com/office/drawing/2014/main" id="{8D9F02F5-5029-4E5E-E371-20BF19D8B497}"/>
+                </a:ext>
+              </a:extLst>
+            </p:cNvPr>
+            <p:cNvSpPr/>
+            <p:nvPr/>
+          </p:nvSpPr>
+          <p:spPr>
+            <a:xfrm>
+              <a:off x="3608757" y="1282112"/>
+              <a:ext cx="600778" cy="600778"/>
+            </a:xfrm>
+            <a:prstGeom prst="rect">
+              <a:avLst/>
+            </a:prstGeom>
+            <a:solidFill>
+              <a:schemeClr val="tx2">
+                <a:lumMod val="10000"/>
+                <a:lumOff val="90000"/>
+              </a:schemeClr>
+            </a:solidFill>
+            <a:ln w="9525"/>
+          </p:spPr>
+          <p:style>
+            <a:lnRef idx="2">
+              <a:schemeClr val="accent1">
+                <a:shade val="15000"/>
+              </a:schemeClr>
+            </a:lnRef>
+            <a:fillRef idx="1">
+              <a:schemeClr val="accent1"/>
+            </a:fillRef>
+            <a:effectRef idx="0">
+              <a:schemeClr val="accent1"/>
+            </a:effectRef>
+            <a:fontRef idx="minor">
+              <a:schemeClr val="lt1"/>
+            </a:fontRef>
+          </p:style>
+          <p:txBody>
+            <a:bodyPr rtlCol="0" anchor="ctr"/>
+            <a:lstStyle/>
+            <a:p>
+              <a:pPr algn="ctr"/>
+              <a:r>
+                <a:rPr lang="en-US" sz="1000" dirty="0">
+                  <a:solidFill>
+                    <a:schemeClr val="tx1"/>
+                  </a:solidFill>
+                  <a:latin typeface="Avenir Book" panose="02000503020000020003" pitchFamily="2" charset="0"/>
+                </a:rPr>
+                <a:t>Conny</a:t>
+              </a:r>
+            </a:p>
+          </p:txBody>
+        </p:sp>
+        <p:cxnSp>
+          <p:nvCxnSpPr>
+            <p:cNvPr id="3" name="Straight Connector 2">
+              <a:extLst>
+                <a:ext uri="{FF2B5EF4-FFF2-40B4-BE49-F238E27FC236}">
+                  <a16:creationId xmlns:a16="http://schemas.microsoft.com/office/drawing/2014/main" id="{387D53CB-DA6A-2BCF-9E1C-B6547719F656}"/>
+                </a:ext>
+              </a:extLst>
+            </p:cNvPr>
+            <p:cNvCxnSpPr>
+              <a:cxnSpLocks/>
+              <a:stCxn id="2" idx="2"/>
+            </p:cNvCxnSpPr>
+            <p:nvPr/>
+          </p:nvCxnSpPr>
+          <p:spPr>
+            <a:xfrm>
+              <a:off x="3909146" y="1882890"/>
+              <a:ext cx="0" cy="2936245"/>
+            </a:xfrm>
+            <a:prstGeom prst="line">
+              <a:avLst/>
+            </a:prstGeom>
+            <a:ln w="9525">
+              <a:solidFill>
+                <a:schemeClr val="tx1"/>
+              </a:solidFill>
+            </a:ln>
+          </p:spPr>
+          <p:style>
+            <a:lnRef idx="2">
+              <a:schemeClr val="accent1"/>
+            </a:lnRef>
+            <a:fillRef idx="0">
+              <a:schemeClr val="accent1"/>
+            </a:fillRef>
+            <a:effectRef idx="1">
+              <a:schemeClr val="accent1"/>
+            </a:effectRef>
+            <a:fontRef idx="minor">
+              <a:schemeClr val="tx1"/>
+            </a:fontRef>
+          </p:style>
+        </p:cxnSp>
+      </p:grpSp>
+      <p:grpSp>
+        <p:nvGrpSpPr>
+          <p:cNvPr id="14" name="Group 13">
+            <a:extLst>
+              <a:ext uri="{FF2B5EF4-FFF2-40B4-BE49-F238E27FC236}">
+                <a16:creationId xmlns:a16="http://schemas.microsoft.com/office/drawing/2014/main" id="{F9060226-1E25-9836-5D17-38D67E230D2F}"/>
+              </a:ext>
+            </a:extLst>
+          </p:cNvPr>
+          <p:cNvGrpSpPr/>
+          <p:nvPr/>
+        </p:nvGrpSpPr>
+        <p:grpSpPr>
+          <a:xfrm>
+            <a:off x="1845411" y="1434512"/>
+            <a:ext cx="600778" cy="3537023"/>
+            <a:chOff x="3608757" y="1282112"/>
+            <a:chExt cx="600778" cy="3537023"/>
+          </a:xfrm>
+        </p:grpSpPr>
+        <p:sp>
+          <p:nvSpPr>
+            <p:cNvPr id="15" name="Rectangle 14">
+              <a:extLst>
+                <a:ext uri="{FF2B5EF4-FFF2-40B4-BE49-F238E27FC236}">
+                  <a16:creationId xmlns:a16="http://schemas.microsoft.com/office/drawing/2014/main" id="{62A114E7-049C-D8D1-35C7-FAB12170CC9B}"/>
+                </a:ext>
+              </a:extLst>
+            </p:cNvPr>
+            <p:cNvSpPr/>
+            <p:nvPr/>
+          </p:nvSpPr>
+          <p:spPr>
+            <a:xfrm>
+              <a:off x="3608757" y="1282112"/>
+              <a:ext cx="600778" cy="600778"/>
+            </a:xfrm>
+            <a:prstGeom prst="rect">
+              <a:avLst/>
+            </a:prstGeom>
+            <a:solidFill>
+              <a:schemeClr val="tx2">
+                <a:lumMod val="10000"/>
+                <a:lumOff val="90000"/>
+              </a:schemeClr>
+            </a:solidFill>
+            <a:ln w="9525"/>
+          </p:spPr>
+          <p:style>
+            <a:lnRef idx="2">
+              <a:schemeClr val="accent1">
+                <a:shade val="15000"/>
+              </a:schemeClr>
+            </a:lnRef>
+            <a:fillRef idx="1">
+              <a:schemeClr val="accent1"/>
+            </a:fillRef>
+            <a:effectRef idx="0">
+              <a:schemeClr val="accent1"/>
+            </a:effectRef>
+            <a:fontRef idx="minor">
+              <a:schemeClr val="lt1"/>
+            </a:fontRef>
+          </p:style>
+          <p:txBody>
+            <a:bodyPr rtlCol="0" anchor="ctr"/>
+            <a:lstStyle/>
+            <a:p>
+              <a:pPr algn="ctr"/>
+              <a:r>
+                <a:rPr lang="en-US" sz="1000" dirty="0">
+                  <a:solidFill>
+                    <a:schemeClr val="tx1"/>
+                  </a:solidFill>
+                  <a:latin typeface="Avenir Book" panose="02000503020000020003" pitchFamily="2" charset="0"/>
+                </a:rPr>
+                <a:t>Carol</a:t>
+              </a:r>
+            </a:p>
+          </p:txBody>
+        </p:sp>
+        <p:cxnSp>
+          <p:nvCxnSpPr>
+            <p:cNvPr id="16" name="Straight Connector 15">
+              <a:extLst>
+                <a:ext uri="{FF2B5EF4-FFF2-40B4-BE49-F238E27FC236}">
+                  <a16:creationId xmlns:a16="http://schemas.microsoft.com/office/drawing/2014/main" id="{DFB3D1A6-1E80-7B8A-BB8B-17052F348BE5}"/>
+                </a:ext>
+              </a:extLst>
+            </p:cNvPr>
+            <p:cNvCxnSpPr>
+              <a:cxnSpLocks/>
+              <a:stCxn id="15" idx="2"/>
+            </p:cNvCxnSpPr>
+            <p:nvPr/>
+          </p:nvCxnSpPr>
+          <p:spPr>
+            <a:xfrm>
+              <a:off x="3909146" y="1882890"/>
+              <a:ext cx="0" cy="2936245"/>
+            </a:xfrm>
+            <a:prstGeom prst="line">
+              <a:avLst/>
+            </a:prstGeom>
+            <a:ln w="9525">
+              <a:solidFill>
+                <a:schemeClr val="tx1"/>
+              </a:solidFill>
+            </a:ln>
+          </p:spPr>
+          <p:style>
+            <a:lnRef idx="2">
+              <a:schemeClr val="accent1"/>
+            </a:lnRef>
+            <a:fillRef idx="0">
+              <a:schemeClr val="accent1"/>
+            </a:fillRef>
+            <a:effectRef idx="1">
+              <a:schemeClr val="accent1"/>
+            </a:effectRef>
+            <a:fontRef idx="minor">
+              <a:schemeClr val="tx1"/>
+            </a:fontRef>
+          </p:style>
+        </p:cxnSp>
+      </p:grpSp>
+      <p:grpSp>
+        <p:nvGrpSpPr>
+          <p:cNvPr id="20" name="Group 19">
+            <a:extLst>
+              <a:ext uri="{FF2B5EF4-FFF2-40B4-BE49-F238E27FC236}">
+                <a16:creationId xmlns:a16="http://schemas.microsoft.com/office/drawing/2014/main" id="{788DBFFC-48F1-8A7F-B13D-BE181395E5A3}"/>
+              </a:ext>
+            </a:extLst>
+          </p:cNvPr>
+          <p:cNvGrpSpPr/>
+          <p:nvPr/>
+        </p:nvGrpSpPr>
+        <p:grpSpPr>
+          <a:xfrm>
+            <a:off x="5041237" y="1434512"/>
+            <a:ext cx="600777" cy="3537023"/>
+            <a:chOff x="4840314" y="1500414"/>
+            <a:chExt cx="600777" cy="3537023"/>
+          </a:xfrm>
+        </p:grpSpPr>
+        <p:sp>
+          <p:nvSpPr>
+            <p:cNvPr id="17" name="Oval 16">
+              <a:extLst>
+                <a:ext uri="{FF2B5EF4-FFF2-40B4-BE49-F238E27FC236}">
+                  <a16:creationId xmlns:a16="http://schemas.microsoft.com/office/drawing/2014/main" id="{590E73C1-CE61-2736-50F1-35BD38C83939}"/>
+                </a:ext>
+              </a:extLst>
+            </p:cNvPr>
+            <p:cNvSpPr/>
+            <p:nvPr/>
+          </p:nvSpPr>
+          <p:spPr>
+            <a:xfrm>
+              <a:off x="4840314" y="1500414"/>
+              <a:ext cx="600777" cy="600778"/>
+            </a:xfrm>
+            <a:prstGeom prst="ellipse">
+              <a:avLst/>
+            </a:prstGeom>
+            <a:solidFill>
+              <a:schemeClr val="tx2">
+                <a:lumMod val="10000"/>
+                <a:lumOff val="90000"/>
+              </a:schemeClr>
+            </a:solidFill>
+            <a:ln w="6350"/>
+          </p:spPr>
+          <p:style>
+            <a:lnRef idx="2">
+              <a:schemeClr val="accent1">
+                <a:shade val="15000"/>
+              </a:schemeClr>
+            </a:lnRef>
+            <a:fillRef idx="1">
+              <a:schemeClr val="accent1"/>
+            </a:fillRef>
+            <a:effectRef idx="0">
+              <a:schemeClr val="accent1"/>
+            </a:effectRef>
+            <a:fontRef idx="minor">
+              <a:schemeClr val="lt1"/>
+            </a:fontRef>
+          </p:style>
+          <p:txBody>
+            <a:bodyPr lIns="0" tIns="0" rIns="0" bIns="0" rtlCol="0" anchor="ctr"/>
+            <a:lstStyle/>
+            <a:p>
+              <a:pPr algn="ctr"/>
+              <a:r>
+                <a:rPr lang="en-US" sz="1000" dirty="0">
+                  <a:solidFill>
+                    <a:schemeClr val="tx1"/>
+                  </a:solidFill>
+                  <a:latin typeface="AVENIR LIGHT OBLIQUE" panose="020B0402020203090204" pitchFamily="34" charset="77"/>
+                </a:rPr>
+                <a:t>Hank</a:t>
+              </a:r>
+            </a:p>
+          </p:txBody>
+        </p:sp>
+        <p:cxnSp>
+          <p:nvCxnSpPr>
+            <p:cNvPr id="18" name="Straight Connector 17">
+              <a:extLst>
+                <a:ext uri="{FF2B5EF4-FFF2-40B4-BE49-F238E27FC236}">
+                  <a16:creationId xmlns:a16="http://schemas.microsoft.com/office/drawing/2014/main" id="{E2008D6F-05C4-984B-F63F-F69B4E6F3EC0}"/>
+                </a:ext>
+              </a:extLst>
+            </p:cNvPr>
+            <p:cNvCxnSpPr>
+              <a:cxnSpLocks/>
+              <a:stCxn id="17" idx="4"/>
+            </p:cNvCxnSpPr>
+            <p:nvPr/>
+          </p:nvCxnSpPr>
+          <p:spPr>
+            <a:xfrm>
+              <a:off x="5140703" y="2101192"/>
+              <a:ext cx="4410" cy="2936245"/>
+            </a:xfrm>
+            <a:prstGeom prst="line">
+              <a:avLst/>
+            </a:prstGeom>
+            <a:ln w="9525">
+              <a:solidFill>
+                <a:schemeClr val="tx1"/>
+              </a:solidFill>
+            </a:ln>
+          </p:spPr>
+          <p:style>
+            <a:lnRef idx="2">
+              <a:schemeClr val="accent1"/>
+            </a:lnRef>
+            <a:fillRef idx="0">
+              <a:schemeClr val="accent1"/>
+            </a:fillRef>
+            <a:effectRef idx="1">
+              <a:schemeClr val="accent1"/>
+            </a:effectRef>
+            <a:fontRef idx="minor">
+              <a:schemeClr val="tx1"/>
+            </a:fontRef>
+          </p:style>
+        </p:cxnSp>
+      </p:grpSp>
+      <p:grpSp>
+        <p:nvGrpSpPr>
+          <p:cNvPr id="21" name="Group 20">
+            <a:extLst>
+              <a:ext uri="{FF2B5EF4-FFF2-40B4-BE49-F238E27FC236}">
+                <a16:creationId xmlns:a16="http://schemas.microsoft.com/office/drawing/2014/main" id="{17BD5C65-21CD-0985-5807-1FF66B77FB6C}"/>
+              </a:ext>
+            </a:extLst>
+          </p:cNvPr>
+          <p:cNvGrpSpPr/>
+          <p:nvPr/>
+        </p:nvGrpSpPr>
+        <p:grpSpPr>
+          <a:xfrm>
+            <a:off x="6452685" y="1434512"/>
+            <a:ext cx="600777" cy="3537023"/>
+            <a:chOff x="4840314" y="1500414"/>
+            <a:chExt cx="600777" cy="3537023"/>
+          </a:xfrm>
+        </p:grpSpPr>
+        <p:sp>
+          <p:nvSpPr>
+            <p:cNvPr id="22" name="Oval 21">
+              <a:extLst>
+                <a:ext uri="{FF2B5EF4-FFF2-40B4-BE49-F238E27FC236}">
+                  <a16:creationId xmlns:a16="http://schemas.microsoft.com/office/drawing/2014/main" id="{01D47920-01FC-30AB-478E-AF8493776FDC}"/>
+                </a:ext>
+              </a:extLst>
+            </p:cNvPr>
+            <p:cNvSpPr/>
+            <p:nvPr/>
+          </p:nvSpPr>
+          <p:spPr>
+            <a:xfrm>
+              <a:off x="4840314" y="1500414"/>
+              <a:ext cx="600777" cy="600778"/>
+            </a:xfrm>
+            <a:prstGeom prst="ellipse">
+              <a:avLst/>
+            </a:prstGeom>
+            <a:solidFill>
+              <a:schemeClr val="tx2">
+                <a:lumMod val="10000"/>
+                <a:lumOff val="90000"/>
+              </a:schemeClr>
+            </a:solidFill>
+            <a:ln w="6350"/>
+          </p:spPr>
+          <p:style>
+            <a:lnRef idx="2">
+              <a:schemeClr val="accent1">
+                <a:shade val="15000"/>
+              </a:schemeClr>
+            </a:lnRef>
+            <a:fillRef idx="1">
+              <a:schemeClr val="accent1"/>
+            </a:fillRef>
+            <a:effectRef idx="0">
+              <a:schemeClr val="accent1"/>
+            </a:effectRef>
+            <a:fontRef idx="minor">
+              <a:schemeClr val="lt1"/>
+            </a:fontRef>
+          </p:style>
+          <p:txBody>
+            <a:bodyPr lIns="0" tIns="0" rIns="0" bIns="0" rtlCol="0" anchor="ctr"/>
+            <a:lstStyle/>
+            <a:p>
+              <a:pPr algn="ctr"/>
+              <a:r>
+                <a:rPr lang="en-US" sz="1000" dirty="0">
+                  <a:solidFill>
+                    <a:schemeClr val="tx1"/>
+                  </a:solidFill>
+                  <a:latin typeface="AVENIR LIGHT OBLIQUE" panose="020B0402020203090204" pitchFamily="34" charset="77"/>
+                </a:rPr>
+                <a:t>Hugo</a:t>
+              </a:r>
+            </a:p>
+          </p:txBody>
+        </p:sp>
+        <p:cxnSp>
+          <p:nvCxnSpPr>
+            <p:cNvPr id="23" name="Straight Connector 22">
+              <a:extLst>
+                <a:ext uri="{FF2B5EF4-FFF2-40B4-BE49-F238E27FC236}">
+                  <a16:creationId xmlns:a16="http://schemas.microsoft.com/office/drawing/2014/main" id="{95C70D6F-C628-A58E-3202-1C5B56088961}"/>
+                </a:ext>
+              </a:extLst>
+            </p:cNvPr>
+            <p:cNvCxnSpPr>
+              <a:cxnSpLocks/>
+              <a:stCxn id="22" idx="4"/>
+            </p:cNvCxnSpPr>
+            <p:nvPr/>
+          </p:nvCxnSpPr>
+          <p:spPr>
+            <a:xfrm>
+              <a:off x="5140703" y="2101192"/>
+              <a:ext cx="4410" cy="2936245"/>
+            </a:xfrm>
+            <a:prstGeom prst="line">
+              <a:avLst/>
+            </a:prstGeom>
+            <a:ln w="9525">
+              <a:solidFill>
+                <a:schemeClr val="tx1"/>
+              </a:solidFill>
+            </a:ln>
+          </p:spPr>
+          <p:style>
+            <a:lnRef idx="2">
+              <a:schemeClr val="accent1"/>
+            </a:lnRef>
+            <a:fillRef idx="0">
+              <a:schemeClr val="accent1"/>
+            </a:fillRef>
+            <a:effectRef idx="1">
+              <a:schemeClr val="accent1"/>
+            </a:effectRef>
+            <a:fontRef idx="minor">
+              <a:schemeClr val="tx1"/>
+            </a:fontRef>
+          </p:style>
+        </p:cxnSp>
+      </p:grpSp>
+      <p:sp>
+        <p:nvSpPr>
+          <p:cNvPr id="24" name="Rectangle 23">
+            <a:extLst>
+              <a:ext uri="{FF2B5EF4-FFF2-40B4-BE49-F238E27FC236}">
+                <a16:creationId xmlns:a16="http://schemas.microsoft.com/office/drawing/2014/main" id="{0F6B5FC9-1875-13A1-9A55-B850810A7F34}"/>
+              </a:ext>
+            </a:extLst>
+          </p:cNvPr>
+          <p:cNvSpPr/>
+          <p:nvPr/>
+        </p:nvSpPr>
+        <p:spPr>
+          <a:xfrm>
+            <a:off x="575426" y="1027238"/>
+            <a:ext cx="11045074" cy="4396250"/>
+          </a:xfrm>
+          <a:prstGeom prst="rect">
+            <a:avLst/>
+          </a:prstGeom>
+          <a:noFill/>
+          <a:ln w="9525">
+            <a:solidFill>
+              <a:schemeClr val="bg1">
+                <a:lumMod val="65000"/>
+              </a:schemeClr>
+            </a:solidFill>
+          </a:ln>
+        </p:spPr>
+        <p:style>
+          <a:lnRef idx="2">
+            <a:schemeClr val="accent1">
+              <a:shade val="15000"/>
+            </a:schemeClr>
+          </a:lnRef>
+          <a:fillRef idx="1">
+            <a:schemeClr val="accent1"/>
+          </a:fillRef>
+          <a:effectRef idx="0">
+            <a:schemeClr val="accent1"/>
+          </a:effectRef>
+          <a:fontRef idx="minor">
+            <a:schemeClr val="lt1"/>
+          </a:fontRef>
+        </p:style>
+        <p:txBody>
+          <a:bodyPr rtlCol="0" anchor="ctr"/>
+          <a:lstStyle/>
+          <a:p>
+            <a:pPr algn="ctr"/>
+            <a:endParaRPr lang="en-US" sz="1000" dirty="0">
+              <a:solidFill>
+                <a:schemeClr val="tx1"/>
+              </a:solidFill>
+              <a:latin typeface="Avenir Book" panose="02000503020000020003" pitchFamily="2" charset="0"/>
+            </a:endParaRPr>
+          </a:p>
+        </p:txBody>
+      </p:sp>
+      <p:sp>
+        <p:nvSpPr>
+          <p:cNvPr id="25" name="Rectangle 24">
+            <a:extLst>
+              <a:ext uri="{FF2B5EF4-FFF2-40B4-BE49-F238E27FC236}">
+                <a16:creationId xmlns:a16="http://schemas.microsoft.com/office/drawing/2014/main" id="{6CD4514A-45F2-9200-D9C4-371DE023D7F8}"/>
+              </a:ext>
+            </a:extLst>
+          </p:cNvPr>
+          <p:cNvSpPr/>
+          <p:nvPr/>
+        </p:nvSpPr>
+        <p:spPr>
+          <a:xfrm>
+            <a:off x="5462324" y="1301780"/>
+            <a:ext cx="1203948" cy="600778"/>
+          </a:xfrm>
+          <a:prstGeom prst="rect">
+            <a:avLst/>
+          </a:prstGeom>
+          <a:noFill/>
+          <a:ln w="9525">
+            <a:noFill/>
+          </a:ln>
+        </p:spPr>
+        <p:style>
+          <a:lnRef idx="2">
+            <a:schemeClr val="accent1">
+              <a:shade val="15000"/>
+            </a:schemeClr>
+          </a:lnRef>
+          <a:fillRef idx="1">
+            <a:schemeClr val="accent1"/>
+          </a:fillRef>
+          <a:effectRef idx="0">
+            <a:schemeClr val="accent1"/>
+          </a:effectRef>
+          <a:fontRef idx="minor">
+            <a:schemeClr val="lt1"/>
+          </a:fontRef>
+        </p:style>
+        <p:txBody>
+          <a:bodyPr rtlCol="0" anchor="ctr"/>
+          <a:lstStyle/>
+          <a:p>
+            <a:pPr algn="ctr"/>
+            <a:r>
+              <a:rPr lang="en-US" sz="4000" dirty="0">
+                <a:solidFill>
+                  <a:schemeClr val="tx1"/>
+                </a:solidFill>
+                <a:latin typeface="Avenir Book" panose="02000503020000020003" pitchFamily="2" charset="0"/>
+              </a:rPr>
+              <a:t>...</a:t>
+            </a:r>
+          </a:p>
+        </p:txBody>
+      </p:sp>
+      <p:grpSp>
+        <p:nvGrpSpPr>
+          <p:cNvPr id="35" name="Group 34">
+            <a:extLst>
+              <a:ext uri="{FF2B5EF4-FFF2-40B4-BE49-F238E27FC236}">
+                <a16:creationId xmlns:a16="http://schemas.microsoft.com/office/drawing/2014/main" id="{F945E0F3-5B89-C3E6-C48C-891A71320874}"/>
+              </a:ext>
+            </a:extLst>
+          </p:cNvPr>
+          <p:cNvGrpSpPr/>
+          <p:nvPr/>
+        </p:nvGrpSpPr>
+        <p:grpSpPr>
+          <a:xfrm>
+            <a:off x="2145799" y="2077799"/>
+            <a:ext cx="3195826" cy="612038"/>
+            <a:chOff x="2145799" y="2684192"/>
+            <a:chExt cx="3195826" cy="612038"/>
+          </a:xfrm>
+        </p:grpSpPr>
+        <p:grpSp>
+          <p:nvGrpSpPr>
+            <p:cNvPr id="31" name="Group 30">
+              <a:extLst>
+                <a:ext uri="{FF2B5EF4-FFF2-40B4-BE49-F238E27FC236}">
+                  <a16:creationId xmlns:a16="http://schemas.microsoft.com/office/drawing/2014/main" id="{C7252AA2-859F-3FA4-8A67-65BCCAB56F56}"/>
+                </a:ext>
+              </a:extLst>
+            </p:cNvPr>
+            <p:cNvGrpSpPr/>
+            <p:nvPr/>
+          </p:nvGrpSpPr>
+          <p:grpSpPr>
+            <a:xfrm>
+              <a:off x="2145799" y="2684192"/>
+              <a:ext cx="3195826" cy="298861"/>
+              <a:chOff x="2145799" y="2684192"/>
+              <a:chExt cx="3195826" cy="298861"/>
+            </a:xfrm>
+          </p:grpSpPr>
+          <p:cxnSp>
+            <p:nvCxnSpPr>
+              <p:cNvPr id="27" name="Straight Connector 26">
+                <a:extLst>
+                  <a:ext uri="{FF2B5EF4-FFF2-40B4-BE49-F238E27FC236}">
+                    <a16:creationId xmlns:a16="http://schemas.microsoft.com/office/drawing/2014/main" id="{E7E85747-01A3-5EC6-D841-BF173DAB9362}"/>
+                  </a:ext>
+                </a:extLst>
+              </p:cNvPr>
+              <p:cNvCxnSpPr>
+                <a:cxnSpLocks/>
+              </p:cNvCxnSpPr>
+              <p:nvPr/>
+            </p:nvCxnSpPr>
+            <p:spPr>
+              <a:xfrm flipH="1">
+                <a:off x="2145799" y="2934929"/>
+                <a:ext cx="3195826" cy="0"/>
+              </a:xfrm>
+              <a:prstGeom prst="line">
+                <a:avLst/>
+              </a:prstGeom>
+              <a:ln w="9525">
+                <a:solidFill>
+                  <a:srgbClr val="FF0000"/>
+                </a:solidFill>
+                <a:headEnd type="triangle"/>
+              </a:ln>
+            </p:spPr>
+            <p:style>
+              <a:lnRef idx="2">
+                <a:schemeClr val="accent1"/>
+              </a:lnRef>
+              <a:fillRef idx="0">
+                <a:schemeClr val="accent1"/>
+              </a:fillRef>
+              <a:effectRef idx="1">
+                <a:schemeClr val="accent1"/>
+              </a:effectRef>
+              <a:fontRef idx="minor">
+                <a:schemeClr val="tx1"/>
+              </a:fontRef>
+            </p:style>
+          </p:cxnSp>
+          <p:sp>
+            <p:nvSpPr>
+              <p:cNvPr id="30" name="Rectangle 29">
+                <a:extLst>
+                  <a:ext uri="{FF2B5EF4-FFF2-40B4-BE49-F238E27FC236}">
+                    <a16:creationId xmlns:a16="http://schemas.microsoft.com/office/drawing/2014/main" id="{8F5122EC-8E1F-DE8B-5685-836CD4D299F6}"/>
+                  </a:ext>
+                </a:extLst>
+              </p:cNvPr>
+              <p:cNvSpPr/>
+              <p:nvPr/>
+            </p:nvSpPr>
+            <p:spPr>
+              <a:xfrm>
+                <a:off x="2145799" y="2684192"/>
+                <a:ext cx="2784678" cy="298861"/>
+              </a:xfrm>
+              <a:prstGeom prst="rect">
+                <a:avLst/>
+              </a:prstGeom>
+              <a:noFill/>
+              <a:ln w="9525">
+                <a:noFill/>
+              </a:ln>
+            </p:spPr>
+            <p:style>
+              <a:lnRef idx="2">
+                <a:schemeClr val="accent1">
+                  <a:shade val="15000"/>
+                </a:schemeClr>
+              </a:lnRef>
+              <a:fillRef idx="1">
+                <a:schemeClr val="accent1"/>
+              </a:fillRef>
+              <a:effectRef idx="0">
+                <a:schemeClr val="accent1"/>
+              </a:effectRef>
+              <a:fontRef idx="minor">
+                <a:schemeClr val="lt1"/>
+              </a:fontRef>
+            </p:style>
+            <p:txBody>
+              <a:bodyPr rtlCol="0" anchor="ctr"/>
+              <a:lstStyle/>
+              <a:p>
+                <a:r>
+                  <a:rPr lang="en-US" sz="1000" dirty="0">
+                    <a:solidFill>
+                      <a:srgbClr val="FF0000"/>
+                    </a:solidFill>
+                    <a:latin typeface="Avenir Book" panose="02000503020000020003" pitchFamily="2" charset="0"/>
+                  </a:rPr>
+                  <a:t>PUT registration</a:t>
+                </a:r>
+              </a:p>
+            </p:txBody>
+          </p:sp>
+        </p:grpSp>
+        <p:grpSp>
+          <p:nvGrpSpPr>
+            <p:cNvPr id="32" name="Group 31">
+              <a:extLst>
+                <a:ext uri="{FF2B5EF4-FFF2-40B4-BE49-F238E27FC236}">
+                  <a16:creationId xmlns:a16="http://schemas.microsoft.com/office/drawing/2014/main" id="{BBA2A2DD-8DF3-80E0-FF55-77291C7B0B60}"/>
+                </a:ext>
+              </a:extLst>
+            </p:cNvPr>
+            <p:cNvGrpSpPr/>
+            <p:nvPr/>
+          </p:nvGrpSpPr>
+          <p:grpSpPr>
+            <a:xfrm>
+              <a:off x="2145799" y="2997369"/>
+              <a:ext cx="3195826" cy="298861"/>
+              <a:chOff x="2145799" y="2684192"/>
+              <a:chExt cx="3195826" cy="298861"/>
+            </a:xfrm>
+          </p:grpSpPr>
+          <p:cxnSp>
+            <p:nvCxnSpPr>
+              <p:cNvPr id="33" name="Straight Connector 32">
+                <a:extLst>
+                  <a:ext uri="{FF2B5EF4-FFF2-40B4-BE49-F238E27FC236}">
+                    <a16:creationId xmlns:a16="http://schemas.microsoft.com/office/drawing/2014/main" id="{65CA86CA-BDC4-A983-82B9-B8D39E73DCCD}"/>
+                  </a:ext>
+                </a:extLst>
+              </p:cNvPr>
+              <p:cNvCxnSpPr>
+                <a:cxnSpLocks/>
+              </p:cNvCxnSpPr>
+              <p:nvPr/>
+            </p:nvCxnSpPr>
+            <p:spPr>
+              <a:xfrm flipH="1">
+                <a:off x="2145799" y="2934929"/>
+                <a:ext cx="3195826" cy="0"/>
+              </a:xfrm>
+              <a:prstGeom prst="line">
+                <a:avLst/>
+              </a:prstGeom>
+              <a:ln w="9525">
+                <a:solidFill>
+                  <a:srgbClr val="FF0000"/>
+                </a:solidFill>
+                <a:headEnd type="triangle"/>
+              </a:ln>
+            </p:spPr>
+            <p:style>
+              <a:lnRef idx="2">
+                <a:schemeClr val="accent1"/>
+              </a:lnRef>
+              <a:fillRef idx="0">
+                <a:schemeClr val="accent1"/>
+              </a:fillRef>
+              <a:effectRef idx="1">
+                <a:schemeClr val="accent1"/>
+              </a:effectRef>
+              <a:fontRef idx="minor">
+                <a:schemeClr val="tx1"/>
+              </a:fontRef>
+            </p:style>
+          </p:cxnSp>
+          <p:sp>
+            <p:nvSpPr>
+              <p:cNvPr id="34" name="Rectangle 33">
+                <a:extLst>
+                  <a:ext uri="{FF2B5EF4-FFF2-40B4-BE49-F238E27FC236}">
+                    <a16:creationId xmlns:a16="http://schemas.microsoft.com/office/drawing/2014/main" id="{E4485CA7-40CF-0BC4-B8F1-912E0746168B}"/>
+                  </a:ext>
+                </a:extLst>
+              </p:cNvPr>
+              <p:cNvSpPr/>
+              <p:nvPr/>
+            </p:nvSpPr>
+            <p:spPr>
+              <a:xfrm>
+                <a:off x="2145799" y="2684192"/>
+                <a:ext cx="2784678" cy="298861"/>
+              </a:xfrm>
+              <a:prstGeom prst="rect">
+                <a:avLst/>
+              </a:prstGeom>
+              <a:noFill/>
+              <a:ln w="9525">
+                <a:noFill/>
+              </a:ln>
+            </p:spPr>
+            <p:style>
+              <a:lnRef idx="2">
+                <a:schemeClr val="accent1">
+                  <a:shade val="15000"/>
+                </a:schemeClr>
+              </a:lnRef>
+              <a:fillRef idx="1">
+                <a:schemeClr val="accent1"/>
+              </a:fillRef>
+              <a:effectRef idx="0">
+                <a:schemeClr val="accent1"/>
+              </a:effectRef>
+              <a:fontRef idx="minor">
+                <a:schemeClr val="lt1"/>
+              </a:fontRef>
+            </p:style>
+            <p:txBody>
+              <a:bodyPr rtlCol="0" anchor="ctr"/>
+              <a:lstStyle/>
+              <a:p>
+                <a:r>
+                  <a:rPr lang="en-US" sz="1000" dirty="0">
+                    <a:solidFill>
+                      <a:srgbClr val="FF0000"/>
+                    </a:solidFill>
+                    <a:latin typeface="Avenir Book" panose="02000503020000020003" pitchFamily="2" charset="0"/>
+                  </a:rPr>
+                  <a:t>GET </a:t>
+                </a:r>
+                <a:r>
+                  <a:rPr lang="en-US" sz="1000" dirty="0" err="1">
+                    <a:solidFill>
+                      <a:srgbClr val="FF0000"/>
+                    </a:solidFill>
+                    <a:latin typeface="Avenir Book" panose="02000503020000020003" pitchFamily="2" charset="0"/>
+                  </a:rPr>
+                  <a:t>psrd</a:t>
+                </a:r>
+                <a:endParaRPr lang="en-US" sz="1000" dirty="0">
+                  <a:solidFill>
+                    <a:srgbClr val="FF0000"/>
+                  </a:solidFill>
+                  <a:latin typeface="Avenir Book" panose="02000503020000020003" pitchFamily="2" charset="0"/>
+                </a:endParaRPr>
+              </a:p>
+            </p:txBody>
+          </p:sp>
+        </p:grpSp>
+      </p:grpSp>
+      <p:grpSp>
+        <p:nvGrpSpPr>
+          <p:cNvPr id="36" name="Group 35">
+            <a:extLst>
+              <a:ext uri="{FF2B5EF4-FFF2-40B4-BE49-F238E27FC236}">
+                <a16:creationId xmlns:a16="http://schemas.microsoft.com/office/drawing/2014/main" id="{0DDCE860-A8CB-3B9A-A77F-A74DAB0D0295}"/>
+              </a:ext>
+            </a:extLst>
+          </p:cNvPr>
+          <p:cNvGrpSpPr/>
+          <p:nvPr/>
+        </p:nvGrpSpPr>
+        <p:grpSpPr>
+          <a:xfrm>
+            <a:off x="2145799" y="2794782"/>
+            <a:ext cx="4607274" cy="612038"/>
+            <a:chOff x="2145799" y="2684192"/>
+            <a:chExt cx="4607274" cy="612038"/>
+          </a:xfrm>
+        </p:grpSpPr>
+        <p:grpSp>
+          <p:nvGrpSpPr>
+            <p:cNvPr id="37" name="Group 36">
+              <a:extLst>
+                <a:ext uri="{FF2B5EF4-FFF2-40B4-BE49-F238E27FC236}">
+                  <a16:creationId xmlns:a16="http://schemas.microsoft.com/office/drawing/2014/main" id="{89B52564-CB00-C57B-FA65-FB393B5C5E57}"/>
+                </a:ext>
+              </a:extLst>
+            </p:cNvPr>
+            <p:cNvGrpSpPr/>
+            <p:nvPr/>
+          </p:nvGrpSpPr>
+          <p:grpSpPr>
+            <a:xfrm>
+              <a:off x="2145799" y="2684192"/>
+              <a:ext cx="4607274" cy="298861"/>
+              <a:chOff x="2145799" y="2684192"/>
+              <a:chExt cx="4607274" cy="298861"/>
+            </a:xfrm>
+          </p:grpSpPr>
+          <p:cxnSp>
+            <p:nvCxnSpPr>
+              <p:cNvPr id="41" name="Straight Connector 40">
+                <a:extLst>
+                  <a:ext uri="{FF2B5EF4-FFF2-40B4-BE49-F238E27FC236}">
+                    <a16:creationId xmlns:a16="http://schemas.microsoft.com/office/drawing/2014/main" id="{3ACBE410-1217-C1F0-0962-DA9E39547C2A}"/>
+                  </a:ext>
+                </a:extLst>
+              </p:cNvPr>
+              <p:cNvCxnSpPr>
+                <a:cxnSpLocks/>
+              </p:cNvCxnSpPr>
+              <p:nvPr/>
+            </p:nvCxnSpPr>
+            <p:spPr>
+              <a:xfrm flipH="1">
+                <a:off x="2145799" y="2934929"/>
+                <a:ext cx="4607274" cy="0"/>
+              </a:xfrm>
+              <a:prstGeom prst="line">
+                <a:avLst/>
+              </a:prstGeom>
+              <a:ln w="9525">
+                <a:solidFill>
+                  <a:srgbClr val="FF0000"/>
+                </a:solidFill>
+                <a:headEnd type="triangle"/>
+              </a:ln>
+            </p:spPr>
+            <p:style>
+              <a:lnRef idx="2">
+                <a:schemeClr val="accent1"/>
+              </a:lnRef>
+              <a:fillRef idx="0">
+                <a:schemeClr val="accent1"/>
+              </a:fillRef>
+              <a:effectRef idx="1">
+                <a:schemeClr val="accent1"/>
+              </a:effectRef>
+              <a:fontRef idx="minor">
+                <a:schemeClr val="tx1"/>
+              </a:fontRef>
+            </p:style>
+          </p:cxnSp>
+          <p:sp>
+            <p:nvSpPr>
+              <p:cNvPr id="42" name="Rectangle 41">
+                <a:extLst>
+                  <a:ext uri="{FF2B5EF4-FFF2-40B4-BE49-F238E27FC236}">
+                    <a16:creationId xmlns:a16="http://schemas.microsoft.com/office/drawing/2014/main" id="{E1884416-8714-C367-508F-11ECFA456D2B}"/>
+                  </a:ext>
+                </a:extLst>
+              </p:cNvPr>
+              <p:cNvSpPr/>
+              <p:nvPr/>
+            </p:nvSpPr>
+            <p:spPr>
+              <a:xfrm>
+                <a:off x="2145799" y="2684192"/>
+                <a:ext cx="2784678" cy="298861"/>
+              </a:xfrm>
+              <a:prstGeom prst="rect">
+                <a:avLst/>
+              </a:prstGeom>
+              <a:noFill/>
+              <a:ln w="9525">
+                <a:noFill/>
+              </a:ln>
+            </p:spPr>
+            <p:style>
+              <a:lnRef idx="2">
+                <a:schemeClr val="accent1">
+                  <a:shade val="15000"/>
+                </a:schemeClr>
+              </a:lnRef>
+              <a:fillRef idx="1">
+                <a:schemeClr val="accent1"/>
+              </a:fillRef>
+              <a:effectRef idx="0">
+                <a:schemeClr val="accent1"/>
+              </a:effectRef>
+              <a:fontRef idx="minor">
+                <a:schemeClr val="lt1"/>
+              </a:fontRef>
+            </p:style>
+            <p:txBody>
+              <a:bodyPr rtlCol="0" anchor="ctr"/>
+              <a:lstStyle/>
+              <a:p>
+                <a:r>
+                  <a:rPr lang="en-US" sz="1000">
+                    <a:solidFill>
+                      <a:srgbClr val="FF0000"/>
+                    </a:solidFill>
+                    <a:latin typeface="Avenir Book" panose="02000503020000020003" pitchFamily="2" charset="0"/>
+                  </a:rPr>
+                  <a:t>PUT registration</a:t>
+                </a:r>
+                <a:endParaRPr lang="en-US" sz="1000" dirty="0">
+                  <a:solidFill>
+                    <a:srgbClr val="FF0000"/>
+                  </a:solidFill>
+                  <a:latin typeface="Avenir Book" panose="02000503020000020003" pitchFamily="2" charset="0"/>
+                </a:endParaRPr>
+              </a:p>
+            </p:txBody>
+          </p:sp>
+        </p:grpSp>
+        <p:grpSp>
+          <p:nvGrpSpPr>
+            <p:cNvPr id="38" name="Group 37">
+              <a:extLst>
+                <a:ext uri="{FF2B5EF4-FFF2-40B4-BE49-F238E27FC236}">
+                  <a16:creationId xmlns:a16="http://schemas.microsoft.com/office/drawing/2014/main" id="{4D63BEAA-B914-5169-CBF2-E839586B288F}"/>
+                </a:ext>
+              </a:extLst>
+            </p:cNvPr>
+            <p:cNvGrpSpPr/>
+            <p:nvPr/>
+          </p:nvGrpSpPr>
+          <p:grpSpPr>
+            <a:xfrm>
+              <a:off x="2145799" y="2997369"/>
+              <a:ext cx="4607274" cy="298861"/>
+              <a:chOff x="2145799" y="2684192"/>
+              <a:chExt cx="4607274" cy="298861"/>
+            </a:xfrm>
+          </p:grpSpPr>
+          <p:cxnSp>
+            <p:nvCxnSpPr>
+              <p:cNvPr id="39" name="Straight Connector 38">
+                <a:extLst>
+                  <a:ext uri="{FF2B5EF4-FFF2-40B4-BE49-F238E27FC236}">
+                    <a16:creationId xmlns:a16="http://schemas.microsoft.com/office/drawing/2014/main" id="{CDBA45C2-048D-7835-06A7-C403393483B0}"/>
+                  </a:ext>
+                </a:extLst>
+              </p:cNvPr>
+              <p:cNvCxnSpPr>
+                <a:cxnSpLocks/>
+              </p:cNvCxnSpPr>
+              <p:nvPr/>
+            </p:nvCxnSpPr>
+            <p:spPr>
+              <a:xfrm flipH="1">
+                <a:off x="2145799" y="2934929"/>
+                <a:ext cx="4607274" cy="0"/>
+              </a:xfrm>
+              <a:prstGeom prst="line">
+                <a:avLst/>
+              </a:prstGeom>
+              <a:ln w="9525">
+                <a:solidFill>
+                  <a:srgbClr val="FF0000"/>
+                </a:solidFill>
+                <a:headEnd type="triangle"/>
+              </a:ln>
+            </p:spPr>
+            <p:style>
+              <a:lnRef idx="2">
+                <a:schemeClr val="accent1"/>
+              </a:lnRef>
+              <a:fillRef idx="0">
+                <a:schemeClr val="accent1"/>
+              </a:fillRef>
+              <a:effectRef idx="1">
+                <a:schemeClr val="accent1"/>
+              </a:effectRef>
+              <a:fontRef idx="minor">
+                <a:schemeClr val="tx1"/>
+              </a:fontRef>
+            </p:style>
+          </p:cxnSp>
+          <p:sp>
+            <p:nvSpPr>
+              <p:cNvPr id="40" name="Rectangle 39">
+                <a:extLst>
+                  <a:ext uri="{FF2B5EF4-FFF2-40B4-BE49-F238E27FC236}">
+                    <a16:creationId xmlns:a16="http://schemas.microsoft.com/office/drawing/2014/main" id="{723966DC-C1A4-88DF-7B9B-601C78B06C0F}"/>
+                  </a:ext>
+                </a:extLst>
+              </p:cNvPr>
+              <p:cNvSpPr/>
+              <p:nvPr/>
+            </p:nvSpPr>
+            <p:spPr>
+              <a:xfrm>
+                <a:off x="2145799" y="2684192"/>
+                <a:ext cx="2784678" cy="298861"/>
+              </a:xfrm>
+              <a:prstGeom prst="rect">
+                <a:avLst/>
+              </a:prstGeom>
+              <a:noFill/>
+              <a:ln w="9525">
+                <a:noFill/>
+              </a:ln>
+            </p:spPr>
+            <p:style>
+              <a:lnRef idx="2">
+                <a:schemeClr val="accent1">
+                  <a:shade val="15000"/>
+                </a:schemeClr>
+              </a:lnRef>
+              <a:fillRef idx="1">
+                <a:schemeClr val="accent1"/>
+              </a:fillRef>
+              <a:effectRef idx="0">
+                <a:schemeClr val="accent1"/>
+              </a:effectRef>
+              <a:fontRef idx="minor">
+                <a:schemeClr val="lt1"/>
+              </a:fontRef>
+            </p:style>
+            <p:txBody>
+              <a:bodyPr rtlCol="0" anchor="ctr"/>
+              <a:lstStyle/>
+              <a:p>
+                <a:r>
+                  <a:rPr lang="en-US" sz="1000" dirty="0">
+                    <a:solidFill>
+                      <a:srgbClr val="FF0000"/>
+                    </a:solidFill>
+                    <a:latin typeface="Avenir Book" panose="02000503020000020003" pitchFamily="2" charset="0"/>
+                  </a:rPr>
+                  <a:t>GET </a:t>
+                </a:r>
+                <a:r>
+                  <a:rPr lang="en-US" sz="1000" dirty="0" err="1">
+                    <a:solidFill>
+                      <a:srgbClr val="FF0000"/>
+                    </a:solidFill>
+                    <a:latin typeface="Avenir Book" panose="02000503020000020003" pitchFamily="2" charset="0"/>
+                  </a:rPr>
+                  <a:t>psrd</a:t>
+                </a:r>
+                <a:endParaRPr lang="en-US" sz="1000" dirty="0">
+                  <a:solidFill>
+                    <a:srgbClr val="FF0000"/>
+                  </a:solidFill>
+                  <a:latin typeface="Avenir Book" panose="02000503020000020003" pitchFamily="2" charset="0"/>
+                </a:endParaRPr>
+              </a:p>
+            </p:txBody>
+          </p:sp>
+        </p:grpSp>
+      </p:grpSp>
+      <p:grpSp>
+        <p:nvGrpSpPr>
+          <p:cNvPr id="45" name="Group 44">
+            <a:extLst>
+              <a:ext uri="{FF2B5EF4-FFF2-40B4-BE49-F238E27FC236}">
+                <a16:creationId xmlns:a16="http://schemas.microsoft.com/office/drawing/2014/main" id="{CF4C12BA-A173-B622-AB35-8A4667510D1A}"/>
+              </a:ext>
+            </a:extLst>
+          </p:cNvPr>
+          <p:cNvGrpSpPr/>
+          <p:nvPr/>
+        </p:nvGrpSpPr>
+        <p:grpSpPr>
+          <a:xfrm flipH="1">
+            <a:off x="6753073" y="3526779"/>
+            <a:ext cx="3195826" cy="612038"/>
+            <a:chOff x="2145799" y="2684192"/>
+            <a:chExt cx="3195826" cy="612038"/>
+          </a:xfrm>
+        </p:grpSpPr>
+        <p:grpSp>
+          <p:nvGrpSpPr>
+            <p:cNvPr id="46" name="Group 45">
+              <a:extLst>
+                <a:ext uri="{FF2B5EF4-FFF2-40B4-BE49-F238E27FC236}">
+                  <a16:creationId xmlns:a16="http://schemas.microsoft.com/office/drawing/2014/main" id="{45E8EA47-294A-E762-99AC-26233B315772}"/>
+                </a:ext>
+              </a:extLst>
+            </p:cNvPr>
+            <p:cNvGrpSpPr/>
+            <p:nvPr/>
+          </p:nvGrpSpPr>
+          <p:grpSpPr>
+            <a:xfrm>
+              <a:off x="2145799" y="2684192"/>
+              <a:ext cx="3195826" cy="298861"/>
+              <a:chOff x="2145799" y="2684192"/>
+              <a:chExt cx="3195826" cy="298861"/>
+            </a:xfrm>
+          </p:grpSpPr>
+          <p:cxnSp>
+            <p:nvCxnSpPr>
+              <p:cNvPr id="50" name="Straight Connector 49">
+                <a:extLst>
+                  <a:ext uri="{FF2B5EF4-FFF2-40B4-BE49-F238E27FC236}">
+                    <a16:creationId xmlns:a16="http://schemas.microsoft.com/office/drawing/2014/main" id="{C3B6AFCA-5CE0-C31C-CF5C-925A5B71FF90}"/>
+                  </a:ext>
+                </a:extLst>
+              </p:cNvPr>
+              <p:cNvCxnSpPr>
+                <a:cxnSpLocks/>
+              </p:cNvCxnSpPr>
+              <p:nvPr/>
+            </p:nvCxnSpPr>
+            <p:spPr>
+              <a:xfrm flipH="1">
+                <a:off x="2145799" y="2934929"/>
+                <a:ext cx="3195826" cy="0"/>
+              </a:xfrm>
+              <a:prstGeom prst="line">
+                <a:avLst/>
+              </a:prstGeom>
+              <a:ln w="9525">
+                <a:solidFill>
+                  <a:srgbClr val="FF0000"/>
+                </a:solidFill>
+                <a:headEnd type="triangle"/>
+              </a:ln>
+            </p:spPr>
+            <p:style>
+              <a:lnRef idx="2">
+                <a:schemeClr val="accent1"/>
+              </a:lnRef>
+              <a:fillRef idx="0">
+                <a:schemeClr val="accent1"/>
+              </a:fillRef>
+              <a:effectRef idx="1">
+                <a:schemeClr val="accent1"/>
+              </a:effectRef>
+              <a:fontRef idx="minor">
+                <a:schemeClr val="tx1"/>
+              </a:fontRef>
+            </p:style>
+          </p:cxnSp>
+          <p:sp>
+            <p:nvSpPr>
+              <p:cNvPr id="51" name="Rectangle 50">
+                <a:extLst>
+                  <a:ext uri="{FF2B5EF4-FFF2-40B4-BE49-F238E27FC236}">
+                    <a16:creationId xmlns:a16="http://schemas.microsoft.com/office/drawing/2014/main" id="{6551DE2D-B0FD-7650-348F-790BF15D06A7}"/>
+                  </a:ext>
+                </a:extLst>
+              </p:cNvPr>
+              <p:cNvSpPr/>
+              <p:nvPr/>
+            </p:nvSpPr>
+            <p:spPr>
+              <a:xfrm>
+                <a:off x="2145799" y="2684192"/>
+                <a:ext cx="2784678" cy="298861"/>
+              </a:xfrm>
+              <a:prstGeom prst="rect">
+                <a:avLst/>
+              </a:prstGeom>
+              <a:noFill/>
+              <a:ln w="9525">
+                <a:noFill/>
+              </a:ln>
+            </p:spPr>
+            <p:style>
+              <a:lnRef idx="2">
+                <a:schemeClr val="accent1">
+                  <a:shade val="15000"/>
+                </a:schemeClr>
+              </a:lnRef>
+              <a:fillRef idx="1">
+                <a:schemeClr val="accent1"/>
+              </a:fillRef>
+              <a:effectRef idx="0">
+                <a:schemeClr val="accent1"/>
+              </a:effectRef>
+              <a:fontRef idx="minor">
+                <a:schemeClr val="lt1"/>
+              </a:fontRef>
+            </p:style>
+            <p:txBody>
+              <a:bodyPr rtlCol="0" anchor="ctr"/>
+              <a:lstStyle/>
+              <a:p>
+                <a:r>
+                  <a:rPr lang="en-US" sz="1000" dirty="0">
+                    <a:solidFill>
+                      <a:srgbClr val="FF0000"/>
+                    </a:solidFill>
+                    <a:latin typeface="Avenir Book" panose="02000503020000020003" pitchFamily="2" charset="0"/>
+                  </a:rPr>
+                  <a:t>PUT registration</a:t>
+                </a:r>
+              </a:p>
+            </p:txBody>
+          </p:sp>
+        </p:grpSp>
+        <p:grpSp>
+          <p:nvGrpSpPr>
+            <p:cNvPr id="47" name="Group 46">
+              <a:extLst>
+                <a:ext uri="{FF2B5EF4-FFF2-40B4-BE49-F238E27FC236}">
+                  <a16:creationId xmlns:a16="http://schemas.microsoft.com/office/drawing/2014/main" id="{91C9EEE2-FD1B-09E1-3D71-B150D7C89084}"/>
+                </a:ext>
+              </a:extLst>
+            </p:cNvPr>
+            <p:cNvGrpSpPr/>
+            <p:nvPr/>
+          </p:nvGrpSpPr>
+          <p:grpSpPr>
+            <a:xfrm>
+              <a:off x="2145799" y="2997369"/>
+              <a:ext cx="3195826" cy="298861"/>
+              <a:chOff x="2145799" y="2684192"/>
+              <a:chExt cx="3195826" cy="298861"/>
+            </a:xfrm>
+          </p:grpSpPr>
+          <p:cxnSp>
+            <p:nvCxnSpPr>
+              <p:cNvPr id="48" name="Straight Connector 47">
+                <a:extLst>
+                  <a:ext uri="{FF2B5EF4-FFF2-40B4-BE49-F238E27FC236}">
+                    <a16:creationId xmlns:a16="http://schemas.microsoft.com/office/drawing/2014/main" id="{42E1CF90-8451-2888-A8D1-72959D1BF1C9}"/>
+                  </a:ext>
+                </a:extLst>
+              </p:cNvPr>
+              <p:cNvCxnSpPr>
+                <a:cxnSpLocks/>
+              </p:cNvCxnSpPr>
+              <p:nvPr/>
+            </p:nvCxnSpPr>
+            <p:spPr>
+              <a:xfrm flipH="1">
+                <a:off x="2145799" y="2934929"/>
+                <a:ext cx="3195826" cy="0"/>
+              </a:xfrm>
+              <a:prstGeom prst="line">
+                <a:avLst/>
+              </a:prstGeom>
+              <a:ln w="9525">
+                <a:solidFill>
+                  <a:srgbClr val="FF0000"/>
+                </a:solidFill>
+                <a:headEnd type="triangle"/>
+              </a:ln>
+            </p:spPr>
+            <p:style>
+              <a:lnRef idx="2">
+                <a:schemeClr val="accent1"/>
+              </a:lnRef>
+              <a:fillRef idx="0">
+                <a:schemeClr val="accent1"/>
+              </a:fillRef>
+              <a:effectRef idx="1">
+                <a:schemeClr val="accent1"/>
+              </a:effectRef>
+              <a:fontRef idx="minor">
+                <a:schemeClr val="tx1"/>
+              </a:fontRef>
+            </p:style>
+          </p:cxnSp>
+          <p:sp>
+            <p:nvSpPr>
+              <p:cNvPr id="49" name="Rectangle 48">
+                <a:extLst>
+                  <a:ext uri="{FF2B5EF4-FFF2-40B4-BE49-F238E27FC236}">
+                    <a16:creationId xmlns:a16="http://schemas.microsoft.com/office/drawing/2014/main" id="{60BF63FD-3A8E-CAC4-755E-1C25CE465046}"/>
+                  </a:ext>
+                </a:extLst>
+              </p:cNvPr>
+              <p:cNvSpPr/>
+              <p:nvPr/>
+            </p:nvSpPr>
+            <p:spPr>
+              <a:xfrm>
+                <a:off x="2145799" y="2684192"/>
+                <a:ext cx="2784678" cy="298861"/>
+              </a:xfrm>
+              <a:prstGeom prst="rect">
+                <a:avLst/>
+              </a:prstGeom>
+              <a:noFill/>
+              <a:ln w="9525">
+                <a:noFill/>
+              </a:ln>
+            </p:spPr>
+            <p:style>
+              <a:lnRef idx="2">
+                <a:schemeClr val="accent1">
+                  <a:shade val="15000"/>
+                </a:schemeClr>
+              </a:lnRef>
+              <a:fillRef idx="1">
+                <a:schemeClr val="accent1"/>
+              </a:fillRef>
+              <a:effectRef idx="0">
+                <a:schemeClr val="accent1"/>
+              </a:effectRef>
+              <a:fontRef idx="minor">
+                <a:schemeClr val="lt1"/>
+              </a:fontRef>
+            </p:style>
+            <p:txBody>
+              <a:bodyPr rtlCol="0" anchor="ctr"/>
+              <a:lstStyle/>
+              <a:p>
+                <a:r>
+                  <a:rPr lang="en-US" sz="1000" dirty="0">
+                    <a:solidFill>
+                      <a:srgbClr val="FF0000"/>
+                    </a:solidFill>
+                    <a:latin typeface="Avenir Book" panose="02000503020000020003" pitchFamily="2" charset="0"/>
+                  </a:rPr>
+                  <a:t>GET </a:t>
+                </a:r>
+                <a:r>
+                  <a:rPr lang="en-US" sz="1000" dirty="0" err="1">
+                    <a:solidFill>
+                      <a:srgbClr val="FF0000"/>
+                    </a:solidFill>
+                    <a:latin typeface="Avenir Book" panose="02000503020000020003" pitchFamily="2" charset="0"/>
+                  </a:rPr>
+                  <a:t>psrd</a:t>
+                </a:r>
+                <a:endParaRPr lang="en-US" sz="1000" dirty="0">
+                  <a:solidFill>
+                    <a:srgbClr val="FF0000"/>
+                  </a:solidFill>
+                  <a:latin typeface="Avenir Book" panose="02000503020000020003" pitchFamily="2" charset="0"/>
+                </a:endParaRPr>
+              </a:p>
+            </p:txBody>
+          </p:sp>
+        </p:grpSp>
+      </p:grpSp>
+      <p:grpSp>
+        <p:nvGrpSpPr>
+          <p:cNvPr id="52" name="Group 51">
+            <a:extLst>
+              <a:ext uri="{FF2B5EF4-FFF2-40B4-BE49-F238E27FC236}">
+                <a16:creationId xmlns:a16="http://schemas.microsoft.com/office/drawing/2014/main" id="{274C9872-2A0F-3D2E-7ABC-D2A623D5F965}"/>
+              </a:ext>
+            </a:extLst>
+          </p:cNvPr>
+          <p:cNvGrpSpPr/>
+          <p:nvPr/>
+        </p:nvGrpSpPr>
+        <p:grpSpPr>
+          <a:xfrm flipH="1">
+            <a:off x="5341625" y="4243762"/>
+            <a:ext cx="4607274" cy="612038"/>
+            <a:chOff x="2145799" y="2684192"/>
+            <a:chExt cx="4607274" cy="612038"/>
+          </a:xfrm>
+        </p:grpSpPr>
+        <p:grpSp>
+          <p:nvGrpSpPr>
+            <p:cNvPr id="53" name="Group 52">
+              <a:extLst>
+                <a:ext uri="{FF2B5EF4-FFF2-40B4-BE49-F238E27FC236}">
+                  <a16:creationId xmlns:a16="http://schemas.microsoft.com/office/drawing/2014/main" id="{511382C1-4879-95D2-F2C2-F1AD324FF722}"/>
+                </a:ext>
+              </a:extLst>
+            </p:cNvPr>
+            <p:cNvGrpSpPr/>
+            <p:nvPr/>
+          </p:nvGrpSpPr>
+          <p:grpSpPr>
+            <a:xfrm>
+              <a:off x="2145799" y="2684192"/>
+              <a:ext cx="4607274" cy="298861"/>
+              <a:chOff x="2145799" y="2684192"/>
+              <a:chExt cx="4607274" cy="298861"/>
+            </a:xfrm>
+          </p:grpSpPr>
+          <p:cxnSp>
+            <p:nvCxnSpPr>
+              <p:cNvPr id="57" name="Straight Connector 56">
+                <a:extLst>
+                  <a:ext uri="{FF2B5EF4-FFF2-40B4-BE49-F238E27FC236}">
+                    <a16:creationId xmlns:a16="http://schemas.microsoft.com/office/drawing/2014/main" id="{7EB06316-808F-603D-1386-89EA49CB6B14}"/>
+                  </a:ext>
+                </a:extLst>
+              </p:cNvPr>
+              <p:cNvCxnSpPr>
+                <a:cxnSpLocks/>
+              </p:cNvCxnSpPr>
+              <p:nvPr/>
+            </p:nvCxnSpPr>
+            <p:spPr>
+              <a:xfrm flipH="1">
+                <a:off x="2145799" y="2934929"/>
+                <a:ext cx="4607274" cy="0"/>
+              </a:xfrm>
+              <a:prstGeom prst="line">
+                <a:avLst/>
+              </a:prstGeom>
+              <a:ln w="9525">
+                <a:solidFill>
+                  <a:srgbClr val="FF0000"/>
+                </a:solidFill>
+                <a:headEnd type="triangle"/>
+              </a:ln>
+            </p:spPr>
+            <p:style>
+              <a:lnRef idx="2">
+                <a:schemeClr val="accent1"/>
+              </a:lnRef>
+              <a:fillRef idx="0">
+                <a:schemeClr val="accent1"/>
+              </a:fillRef>
+              <a:effectRef idx="1">
+                <a:schemeClr val="accent1"/>
+              </a:effectRef>
+              <a:fontRef idx="minor">
+                <a:schemeClr val="tx1"/>
+              </a:fontRef>
+            </p:style>
+          </p:cxnSp>
+          <p:sp>
+            <p:nvSpPr>
+              <p:cNvPr id="58" name="Rectangle 57">
+                <a:extLst>
+                  <a:ext uri="{FF2B5EF4-FFF2-40B4-BE49-F238E27FC236}">
+                    <a16:creationId xmlns:a16="http://schemas.microsoft.com/office/drawing/2014/main" id="{2D396F21-9B29-2E42-1089-F4B634C22103}"/>
+                  </a:ext>
+                </a:extLst>
+              </p:cNvPr>
+              <p:cNvSpPr/>
+              <p:nvPr/>
+            </p:nvSpPr>
+            <p:spPr>
+              <a:xfrm>
+                <a:off x="2145799" y="2684192"/>
+                <a:ext cx="2784678" cy="298861"/>
+              </a:xfrm>
+              <a:prstGeom prst="rect">
+                <a:avLst/>
+              </a:prstGeom>
+              <a:noFill/>
+              <a:ln w="9525">
+                <a:noFill/>
+              </a:ln>
+            </p:spPr>
+            <p:style>
+              <a:lnRef idx="2">
+                <a:schemeClr val="accent1">
+                  <a:shade val="15000"/>
+                </a:schemeClr>
+              </a:lnRef>
+              <a:fillRef idx="1">
+                <a:schemeClr val="accent1"/>
+              </a:fillRef>
+              <a:effectRef idx="0">
+                <a:schemeClr val="accent1"/>
+              </a:effectRef>
+              <a:fontRef idx="minor">
+                <a:schemeClr val="lt1"/>
+              </a:fontRef>
+            </p:style>
+            <p:txBody>
+              <a:bodyPr rtlCol="0" anchor="ctr"/>
+              <a:lstStyle/>
+              <a:p>
+                <a:r>
+                  <a:rPr lang="en-US" sz="1000" dirty="0">
+                    <a:solidFill>
+                      <a:srgbClr val="FF0000"/>
+                    </a:solidFill>
+                    <a:latin typeface="Avenir Book" panose="02000503020000020003" pitchFamily="2" charset="0"/>
+                  </a:rPr>
+                  <a:t>PUT registration</a:t>
+                </a:r>
+              </a:p>
+            </p:txBody>
+          </p:sp>
+        </p:grpSp>
+        <p:grpSp>
+          <p:nvGrpSpPr>
+            <p:cNvPr id="54" name="Group 53">
+              <a:extLst>
+                <a:ext uri="{FF2B5EF4-FFF2-40B4-BE49-F238E27FC236}">
+                  <a16:creationId xmlns:a16="http://schemas.microsoft.com/office/drawing/2014/main" id="{41A69A98-1D44-171B-BF83-373AADFBD424}"/>
+                </a:ext>
+              </a:extLst>
+            </p:cNvPr>
+            <p:cNvGrpSpPr/>
+            <p:nvPr/>
+          </p:nvGrpSpPr>
+          <p:grpSpPr>
+            <a:xfrm>
+              <a:off x="2145799" y="2997369"/>
+              <a:ext cx="4607274" cy="298861"/>
+              <a:chOff x="2145799" y="2684192"/>
+              <a:chExt cx="4607274" cy="298861"/>
+            </a:xfrm>
+          </p:grpSpPr>
+          <p:cxnSp>
+            <p:nvCxnSpPr>
+              <p:cNvPr id="55" name="Straight Connector 54">
+                <a:extLst>
+                  <a:ext uri="{FF2B5EF4-FFF2-40B4-BE49-F238E27FC236}">
+                    <a16:creationId xmlns:a16="http://schemas.microsoft.com/office/drawing/2014/main" id="{127435E4-4637-76A9-0C5F-D6C9CF13C3DA}"/>
+                  </a:ext>
+                </a:extLst>
+              </p:cNvPr>
+              <p:cNvCxnSpPr>
+                <a:cxnSpLocks/>
+              </p:cNvCxnSpPr>
+              <p:nvPr/>
+            </p:nvCxnSpPr>
+            <p:spPr>
+              <a:xfrm flipH="1">
+                <a:off x="2145799" y="2934929"/>
+                <a:ext cx="4607274" cy="0"/>
+              </a:xfrm>
+              <a:prstGeom prst="line">
+                <a:avLst/>
+              </a:prstGeom>
+              <a:ln w="9525">
+                <a:solidFill>
+                  <a:srgbClr val="FF0000"/>
+                </a:solidFill>
+                <a:headEnd type="triangle"/>
+              </a:ln>
+            </p:spPr>
+            <p:style>
+              <a:lnRef idx="2">
+                <a:schemeClr val="accent1"/>
+              </a:lnRef>
+              <a:fillRef idx="0">
+                <a:schemeClr val="accent1"/>
+              </a:fillRef>
+              <a:effectRef idx="1">
+                <a:schemeClr val="accent1"/>
+              </a:effectRef>
+              <a:fontRef idx="minor">
+                <a:schemeClr val="tx1"/>
+              </a:fontRef>
+            </p:style>
+          </p:cxnSp>
+          <p:sp>
+            <p:nvSpPr>
+              <p:cNvPr id="56" name="Rectangle 55">
+                <a:extLst>
+                  <a:ext uri="{FF2B5EF4-FFF2-40B4-BE49-F238E27FC236}">
+                    <a16:creationId xmlns:a16="http://schemas.microsoft.com/office/drawing/2014/main" id="{3928276B-7CC2-C69B-F819-F4EEF1C57120}"/>
+                  </a:ext>
+                </a:extLst>
+              </p:cNvPr>
+              <p:cNvSpPr/>
+              <p:nvPr/>
+            </p:nvSpPr>
+            <p:spPr>
+              <a:xfrm>
+                <a:off x="2145799" y="2684192"/>
+                <a:ext cx="2784678" cy="298861"/>
+              </a:xfrm>
+              <a:prstGeom prst="rect">
+                <a:avLst/>
+              </a:prstGeom>
+              <a:noFill/>
+              <a:ln w="9525">
+                <a:noFill/>
+              </a:ln>
+            </p:spPr>
+            <p:style>
+              <a:lnRef idx="2">
+                <a:schemeClr val="accent1">
+                  <a:shade val="15000"/>
+                </a:schemeClr>
+              </a:lnRef>
+              <a:fillRef idx="1">
+                <a:schemeClr val="accent1"/>
+              </a:fillRef>
+              <a:effectRef idx="0">
+                <a:schemeClr val="accent1"/>
+              </a:effectRef>
+              <a:fontRef idx="minor">
+                <a:schemeClr val="lt1"/>
+              </a:fontRef>
+            </p:style>
+            <p:txBody>
+              <a:bodyPr rtlCol="0" anchor="ctr"/>
+              <a:lstStyle/>
+              <a:p>
+                <a:r>
+                  <a:rPr lang="en-US" sz="1000" dirty="0">
+                    <a:solidFill>
+                      <a:srgbClr val="FF0000"/>
+                    </a:solidFill>
+                    <a:latin typeface="Avenir Book" panose="02000503020000020003" pitchFamily="2" charset="0"/>
+                  </a:rPr>
+                  <a:t>GET </a:t>
+                </a:r>
+                <a:r>
+                  <a:rPr lang="en-US" sz="1000" dirty="0" err="1">
+                    <a:solidFill>
+                      <a:srgbClr val="FF0000"/>
+                    </a:solidFill>
+                    <a:latin typeface="Avenir Book" panose="02000503020000020003" pitchFamily="2" charset="0"/>
+                  </a:rPr>
+                  <a:t>psrd</a:t>
+                </a:r>
+                <a:endParaRPr lang="en-US" sz="1000" dirty="0">
+                  <a:solidFill>
+                    <a:srgbClr val="FF0000"/>
+                  </a:solidFill>
+                  <a:latin typeface="Avenir Book" panose="02000503020000020003" pitchFamily="2" charset="0"/>
+                </a:endParaRPr>
+              </a:p>
+            </p:txBody>
+          </p:sp>
+        </p:grpSp>
+      </p:grpSp>
+    </p:spTree>
+    <p:extLst>
+      <p:ext uri="{BB962C8B-B14F-4D97-AF65-F5344CB8AC3E}">
+        <p14:creationId xmlns:p14="http://schemas.microsoft.com/office/powerpoint/2010/main" val="2243908987"/>
+      </p:ext>
+    </p:extLst>
+  </p:cSld>
+  <p:clrMapOvr>
+    <a:masterClrMapping/>
+  </p:clrMapOvr>
+</p:sld>
+</file>
+
+<file path=ppt/slides/slide11.xml><?xml version="1.0" encoding="utf-8"?>
 <p:sld xmlns:a="http://schemas.openxmlformats.org/drawingml/2006/main" xmlns:r="http://schemas.openxmlformats.org/officeDocument/2006/relationships" xmlns:p="http://schemas.openxmlformats.org/presentationml/2006/main">
   <p:cSld>
     <p:spTree>
@@ -6005,7 +7914,7 @@
 </p:sld>
 </file>
 
-<file path=ppt/slides/slide11.xml><?xml version="1.0" encoding="utf-8"?>
+<file path=ppt/slides/slide12.xml><?xml version="1.0" encoding="utf-8"?>
 <p:sld xmlns:a="http://schemas.openxmlformats.org/drawingml/2006/main" xmlns:r="http://schemas.openxmlformats.org/officeDocument/2006/relationships" xmlns:p="http://schemas.openxmlformats.org/presentationml/2006/main">
   <p:cSld>
     <p:spTree>
@@ -6924,7 +8833,7 @@
 </p:sld>
 </file>
 
-<file path=ppt/slides/slide12.xml><?xml version="1.0" encoding="utf-8"?>
+<file path=ppt/slides/slide13.xml><?xml version="1.0" encoding="utf-8"?>
 <p:sld xmlns:a="http://schemas.openxmlformats.org/drawingml/2006/main" xmlns:r="http://schemas.openxmlformats.org/officeDocument/2006/relationships" xmlns:p="http://schemas.openxmlformats.org/presentationml/2006/main">
   <p:cSld>
     <p:spTree>
@@ -11858,6 +13767,66 @@
       </p:grpSpPr>
       <p:pic>
         <p:nvPicPr>
+          <p:cNvPr id="6" name="Picture 5">
+            <a:extLst>
+              <a:ext uri="{FF2B5EF4-FFF2-40B4-BE49-F238E27FC236}">
+                <a16:creationId xmlns:a16="http://schemas.microsoft.com/office/drawing/2014/main" id="{43A7B373-2306-E4FA-7FF2-DA7699FBB0F2}"/>
+              </a:ext>
+            </a:extLst>
+          </p:cNvPr>
+          <p:cNvPicPr>
+            <a:picLocks noChangeAspect="1"/>
+          </p:cNvPicPr>
+          <p:nvPr/>
+        </p:nvPicPr>
+        <p:blipFill>
+          <a:blip r:embed="rId2"/>
+          <a:stretch>
+            <a:fillRect/>
+          </a:stretch>
+        </p:blipFill>
+        <p:spPr>
+          <a:xfrm>
+            <a:off x="2209800" y="957557"/>
+            <a:ext cx="7772400" cy="4942886"/>
+          </a:xfrm>
+          <a:prstGeom prst="rect">
+            <a:avLst/>
+          </a:prstGeom>
+        </p:spPr>
+      </p:pic>
+    </p:spTree>
+    <p:extLst>
+      <p:ext uri="{BB962C8B-B14F-4D97-AF65-F5344CB8AC3E}">
+        <p14:creationId xmlns:p14="http://schemas.microsoft.com/office/powerpoint/2010/main" val="791609908"/>
+      </p:ext>
+    </p:extLst>
+  </p:cSld>
+  <p:clrMapOvr>
+    <a:masterClrMapping/>
+  </p:clrMapOvr>
+</p:sld>
+</file>
+
+<file path=ppt/slides/slide3.xml><?xml version="1.0" encoding="utf-8"?>
+<p:sld xmlns:a="http://schemas.openxmlformats.org/drawingml/2006/main" xmlns:r="http://schemas.openxmlformats.org/officeDocument/2006/relationships" xmlns:p="http://schemas.openxmlformats.org/presentationml/2006/main">
+  <p:cSld>
+    <p:spTree>
+      <p:nvGrpSpPr>
+        <p:cNvPr id="1" name=""/>
+        <p:cNvGrpSpPr/>
+        <p:nvPr/>
+      </p:nvGrpSpPr>
+      <p:grpSpPr>
+        <a:xfrm>
+          <a:off x="0" y="0"/>
+          <a:ext cx="0" cy="0"/>
+          <a:chOff x="0" y="0"/>
+          <a:chExt cx="0" cy="0"/>
+        </a:xfrm>
+      </p:grpSpPr>
+      <p:pic>
+        <p:nvPicPr>
           <p:cNvPr id="2" name="Picture 1">
             <a:extLst>
               <a:ext uri="{FF2B5EF4-FFF2-40B4-BE49-F238E27FC236}">
@@ -11899,7 +13868,7 @@
 </p:sld>
 </file>
 
-<file path=ppt/slides/slide3.xml><?xml version="1.0" encoding="utf-8"?>
+<file path=ppt/slides/slide4.xml><?xml version="1.0" encoding="utf-8"?>
 <p:sld xmlns:a="http://schemas.openxmlformats.org/drawingml/2006/main" xmlns:r="http://schemas.openxmlformats.org/officeDocument/2006/relationships" xmlns:p="http://schemas.openxmlformats.org/presentationml/2006/main">
   <p:cSld>
     <p:spTree>
@@ -11959,7 +13928,7 @@
 </p:sld>
 </file>
 
-<file path=ppt/slides/slide4.xml><?xml version="1.0" encoding="utf-8"?>
+<file path=ppt/slides/slide5.xml><?xml version="1.0" encoding="utf-8"?>
 <p:sld xmlns:a="http://schemas.openxmlformats.org/drawingml/2006/main" xmlns:r="http://schemas.openxmlformats.org/officeDocument/2006/relationships" xmlns:p="http://schemas.openxmlformats.org/presentationml/2006/main">
   <p:cSld>
     <p:spTree>
@@ -14465,7 +16434,7 @@
 </p:sld>
 </file>
 
-<file path=ppt/slides/slide5.xml><?xml version="1.0" encoding="utf-8"?>
+<file path=ppt/slides/slide6.xml><?xml version="1.0" encoding="utf-8"?>
 <p:sld xmlns:a="http://schemas.openxmlformats.org/drawingml/2006/main" xmlns:r="http://schemas.openxmlformats.org/officeDocument/2006/relationships" xmlns:p="http://schemas.openxmlformats.org/presentationml/2006/main">
   <p:cSld>
     <p:spTree>
@@ -17921,7 +19890,7 @@
 </p:sld>
 </file>
 
-<file path=ppt/slides/slide6.xml><?xml version="1.0" encoding="utf-8"?>
+<file path=ppt/slides/slide7.xml><?xml version="1.0" encoding="utf-8"?>
 <p:sld xmlns:a="http://schemas.openxmlformats.org/drawingml/2006/main" xmlns:r="http://schemas.openxmlformats.org/officeDocument/2006/relationships" xmlns:p="http://schemas.openxmlformats.org/presentationml/2006/main">
   <p:cSld>
     <p:spTree>
@@ -21297,7 +23266,7 @@
 </p:sld>
 </file>
 
-<file path=ppt/slides/slide7.xml><?xml version="1.0" encoding="utf-8"?>
+<file path=ppt/slides/slide8.xml><?xml version="1.0" encoding="utf-8"?>
 <p:sld xmlns:a="http://schemas.openxmlformats.org/drawingml/2006/main" xmlns:r="http://schemas.openxmlformats.org/officeDocument/2006/relationships" xmlns:p="http://schemas.openxmlformats.org/presentationml/2006/main">
   <p:cSld>
     <p:spTree>
@@ -22406,7 +24375,7 @@
 </p:sld>
 </file>
 
-<file path=ppt/slides/slide8.xml><?xml version="1.0" encoding="utf-8"?>
+<file path=ppt/slides/slide9.xml><?xml version="1.0" encoding="utf-8"?>
 <p:sld xmlns:a="http://schemas.openxmlformats.org/drawingml/2006/main" xmlns:r="http://schemas.openxmlformats.org/officeDocument/2006/relationships" xmlns:p="http://schemas.openxmlformats.org/presentationml/2006/main">
   <p:cSld>
     <p:spTree>
@@ -24917,1783 +26886,6 @@
     <p:extLst>
       <p:ext uri="{BB962C8B-B14F-4D97-AF65-F5344CB8AC3E}">
         <p14:creationId xmlns:p14="http://schemas.microsoft.com/office/powerpoint/2010/main" val="3347430111"/>
-      </p:ext>
-    </p:extLst>
-  </p:cSld>
-  <p:clrMapOvr>
-    <a:masterClrMapping/>
-  </p:clrMapOvr>
-</p:sld>
-</file>
-
-<file path=ppt/slides/slide9.xml><?xml version="1.0" encoding="utf-8"?>
-<p:sld xmlns:a="http://schemas.openxmlformats.org/drawingml/2006/main" xmlns:r="http://schemas.openxmlformats.org/officeDocument/2006/relationships" xmlns:p="http://schemas.openxmlformats.org/presentationml/2006/main">
-  <p:cSld>
-    <p:spTree>
-      <p:nvGrpSpPr>
-        <p:cNvPr id="1" name=""/>
-        <p:cNvGrpSpPr/>
-        <p:nvPr/>
-      </p:nvGrpSpPr>
-      <p:grpSpPr>
-        <a:xfrm>
-          <a:off x="0" y="0"/>
-          <a:ext cx="0" cy="0"/>
-          <a:chOff x="0" y="0"/>
-          <a:chExt cx="0" cy="0"/>
-        </a:xfrm>
-      </p:grpSpPr>
-      <p:grpSp>
-        <p:nvGrpSpPr>
-          <p:cNvPr id="13" name="Group 12">
-            <a:extLst>
-              <a:ext uri="{FF2B5EF4-FFF2-40B4-BE49-F238E27FC236}">
-                <a16:creationId xmlns:a16="http://schemas.microsoft.com/office/drawing/2014/main" id="{3116D5A4-77C1-CADF-0372-1CE15D96B3F7}"/>
-              </a:ext>
-            </a:extLst>
-          </p:cNvPr>
-          <p:cNvGrpSpPr/>
-          <p:nvPr/>
-        </p:nvGrpSpPr>
-        <p:grpSpPr>
-          <a:xfrm>
-            <a:off x="9649561" y="1434512"/>
-            <a:ext cx="600778" cy="3537023"/>
-            <a:chOff x="3608757" y="1282112"/>
-            <a:chExt cx="600778" cy="3537023"/>
-          </a:xfrm>
-        </p:grpSpPr>
-        <p:sp>
-          <p:nvSpPr>
-            <p:cNvPr id="2" name="Rectangle 1">
-              <a:extLst>
-                <a:ext uri="{FF2B5EF4-FFF2-40B4-BE49-F238E27FC236}">
-                  <a16:creationId xmlns:a16="http://schemas.microsoft.com/office/drawing/2014/main" id="{8D9F02F5-5029-4E5E-E371-20BF19D8B497}"/>
-                </a:ext>
-              </a:extLst>
-            </p:cNvPr>
-            <p:cNvSpPr/>
-            <p:nvPr/>
-          </p:nvSpPr>
-          <p:spPr>
-            <a:xfrm>
-              <a:off x="3608757" y="1282112"/>
-              <a:ext cx="600778" cy="600778"/>
-            </a:xfrm>
-            <a:prstGeom prst="rect">
-              <a:avLst/>
-            </a:prstGeom>
-            <a:solidFill>
-              <a:schemeClr val="tx2">
-                <a:lumMod val="10000"/>
-                <a:lumOff val="90000"/>
-              </a:schemeClr>
-            </a:solidFill>
-            <a:ln w="9525"/>
-          </p:spPr>
-          <p:style>
-            <a:lnRef idx="2">
-              <a:schemeClr val="accent1">
-                <a:shade val="15000"/>
-              </a:schemeClr>
-            </a:lnRef>
-            <a:fillRef idx="1">
-              <a:schemeClr val="accent1"/>
-            </a:fillRef>
-            <a:effectRef idx="0">
-              <a:schemeClr val="accent1"/>
-            </a:effectRef>
-            <a:fontRef idx="minor">
-              <a:schemeClr val="lt1"/>
-            </a:fontRef>
-          </p:style>
-          <p:txBody>
-            <a:bodyPr rtlCol="0" anchor="ctr"/>
-            <a:lstStyle/>
-            <a:p>
-              <a:pPr algn="ctr"/>
-              <a:r>
-                <a:rPr lang="en-US" sz="1000" dirty="0">
-                  <a:solidFill>
-                    <a:schemeClr val="tx1"/>
-                  </a:solidFill>
-                  <a:latin typeface="Avenir Book" panose="02000503020000020003" pitchFamily="2" charset="0"/>
-                </a:rPr>
-                <a:t>Conny</a:t>
-              </a:r>
-            </a:p>
-          </p:txBody>
-        </p:sp>
-        <p:cxnSp>
-          <p:nvCxnSpPr>
-            <p:cNvPr id="3" name="Straight Connector 2">
-              <a:extLst>
-                <a:ext uri="{FF2B5EF4-FFF2-40B4-BE49-F238E27FC236}">
-                  <a16:creationId xmlns:a16="http://schemas.microsoft.com/office/drawing/2014/main" id="{387D53CB-DA6A-2BCF-9E1C-B6547719F656}"/>
-                </a:ext>
-              </a:extLst>
-            </p:cNvPr>
-            <p:cNvCxnSpPr>
-              <a:cxnSpLocks/>
-              <a:stCxn id="2" idx="2"/>
-            </p:cNvCxnSpPr>
-            <p:nvPr/>
-          </p:nvCxnSpPr>
-          <p:spPr>
-            <a:xfrm>
-              <a:off x="3909146" y="1882890"/>
-              <a:ext cx="0" cy="2936245"/>
-            </a:xfrm>
-            <a:prstGeom prst="line">
-              <a:avLst/>
-            </a:prstGeom>
-            <a:ln w="9525">
-              <a:solidFill>
-                <a:schemeClr val="tx1"/>
-              </a:solidFill>
-            </a:ln>
-          </p:spPr>
-          <p:style>
-            <a:lnRef idx="2">
-              <a:schemeClr val="accent1"/>
-            </a:lnRef>
-            <a:fillRef idx="0">
-              <a:schemeClr val="accent1"/>
-            </a:fillRef>
-            <a:effectRef idx="1">
-              <a:schemeClr val="accent1"/>
-            </a:effectRef>
-            <a:fontRef idx="minor">
-              <a:schemeClr val="tx1"/>
-            </a:fontRef>
-          </p:style>
-        </p:cxnSp>
-      </p:grpSp>
-      <p:grpSp>
-        <p:nvGrpSpPr>
-          <p:cNvPr id="14" name="Group 13">
-            <a:extLst>
-              <a:ext uri="{FF2B5EF4-FFF2-40B4-BE49-F238E27FC236}">
-                <a16:creationId xmlns:a16="http://schemas.microsoft.com/office/drawing/2014/main" id="{F9060226-1E25-9836-5D17-38D67E230D2F}"/>
-              </a:ext>
-            </a:extLst>
-          </p:cNvPr>
-          <p:cNvGrpSpPr/>
-          <p:nvPr/>
-        </p:nvGrpSpPr>
-        <p:grpSpPr>
-          <a:xfrm>
-            <a:off x="1845411" y="1434512"/>
-            <a:ext cx="600778" cy="3537023"/>
-            <a:chOff x="3608757" y="1282112"/>
-            <a:chExt cx="600778" cy="3537023"/>
-          </a:xfrm>
-        </p:grpSpPr>
-        <p:sp>
-          <p:nvSpPr>
-            <p:cNvPr id="15" name="Rectangle 14">
-              <a:extLst>
-                <a:ext uri="{FF2B5EF4-FFF2-40B4-BE49-F238E27FC236}">
-                  <a16:creationId xmlns:a16="http://schemas.microsoft.com/office/drawing/2014/main" id="{62A114E7-049C-D8D1-35C7-FAB12170CC9B}"/>
-                </a:ext>
-              </a:extLst>
-            </p:cNvPr>
-            <p:cNvSpPr/>
-            <p:nvPr/>
-          </p:nvSpPr>
-          <p:spPr>
-            <a:xfrm>
-              <a:off x="3608757" y="1282112"/>
-              <a:ext cx="600778" cy="600778"/>
-            </a:xfrm>
-            <a:prstGeom prst="rect">
-              <a:avLst/>
-            </a:prstGeom>
-            <a:solidFill>
-              <a:schemeClr val="tx2">
-                <a:lumMod val="10000"/>
-                <a:lumOff val="90000"/>
-              </a:schemeClr>
-            </a:solidFill>
-            <a:ln w="9525"/>
-          </p:spPr>
-          <p:style>
-            <a:lnRef idx="2">
-              <a:schemeClr val="accent1">
-                <a:shade val="15000"/>
-              </a:schemeClr>
-            </a:lnRef>
-            <a:fillRef idx="1">
-              <a:schemeClr val="accent1"/>
-            </a:fillRef>
-            <a:effectRef idx="0">
-              <a:schemeClr val="accent1"/>
-            </a:effectRef>
-            <a:fontRef idx="minor">
-              <a:schemeClr val="lt1"/>
-            </a:fontRef>
-          </p:style>
-          <p:txBody>
-            <a:bodyPr rtlCol="0" anchor="ctr"/>
-            <a:lstStyle/>
-            <a:p>
-              <a:pPr algn="ctr"/>
-              <a:r>
-                <a:rPr lang="en-US" sz="1000" dirty="0">
-                  <a:solidFill>
-                    <a:schemeClr val="tx1"/>
-                  </a:solidFill>
-                  <a:latin typeface="Avenir Book" panose="02000503020000020003" pitchFamily="2" charset="0"/>
-                </a:rPr>
-                <a:t>Carol</a:t>
-              </a:r>
-            </a:p>
-          </p:txBody>
-        </p:sp>
-        <p:cxnSp>
-          <p:nvCxnSpPr>
-            <p:cNvPr id="16" name="Straight Connector 15">
-              <a:extLst>
-                <a:ext uri="{FF2B5EF4-FFF2-40B4-BE49-F238E27FC236}">
-                  <a16:creationId xmlns:a16="http://schemas.microsoft.com/office/drawing/2014/main" id="{DFB3D1A6-1E80-7B8A-BB8B-17052F348BE5}"/>
-                </a:ext>
-              </a:extLst>
-            </p:cNvPr>
-            <p:cNvCxnSpPr>
-              <a:cxnSpLocks/>
-              <a:stCxn id="15" idx="2"/>
-            </p:cNvCxnSpPr>
-            <p:nvPr/>
-          </p:nvCxnSpPr>
-          <p:spPr>
-            <a:xfrm>
-              <a:off x="3909146" y="1882890"/>
-              <a:ext cx="0" cy="2936245"/>
-            </a:xfrm>
-            <a:prstGeom prst="line">
-              <a:avLst/>
-            </a:prstGeom>
-            <a:ln w="9525">
-              <a:solidFill>
-                <a:schemeClr val="tx1"/>
-              </a:solidFill>
-            </a:ln>
-          </p:spPr>
-          <p:style>
-            <a:lnRef idx="2">
-              <a:schemeClr val="accent1"/>
-            </a:lnRef>
-            <a:fillRef idx="0">
-              <a:schemeClr val="accent1"/>
-            </a:fillRef>
-            <a:effectRef idx="1">
-              <a:schemeClr val="accent1"/>
-            </a:effectRef>
-            <a:fontRef idx="minor">
-              <a:schemeClr val="tx1"/>
-            </a:fontRef>
-          </p:style>
-        </p:cxnSp>
-      </p:grpSp>
-      <p:grpSp>
-        <p:nvGrpSpPr>
-          <p:cNvPr id="20" name="Group 19">
-            <a:extLst>
-              <a:ext uri="{FF2B5EF4-FFF2-40B4-BE49-F238E27FC236}">
-                <a16:creationId xmlns:a16="http://schemas.microsoft.com/office/drawing/2014/main" id="{788DBFFC-48F1-8A7F-B13D-BE181395E5A3}"/>
-              </a:ext>
-            </a:extLst>
-          </p:cNvPr>
-          <p:cNvGrpSpPr/>
-          <p:nvPr/>
-        </p:nvGrpSpPr>
-        <p:grpSpPr>
-          <a:xfrm>
-            <a:off x="5041237" y="1434512"/>
-            <a:ext cx="600777" cy="3537023"/>
-            <a:chOff x="4840314" y="1500414"/>
-            <a:chExt cx="600777" cy="3537023"/>
-          </a:xfrm>
-        </p:grpSpPr>
-        <p:sp>
-          <p:nvSpPr>
-            <p:cNvPr id="17" name="Oval 16">
-              <a:extLst>
-                <a:ext uri="{FF2B5EF4-FFF2-40B4-BE49-F238E27FC236}">
-                  <a16:creationId xmlns:a16="http://schemas.microsoft.com/office/drawing/2014/main" id="{590E73C1-CE61-2736-50F1-35BD38C83939}"/>
-                </a:ext>
-              </a:extLst>
-            </p:cNvPr>
-            <p:cNvSpPr/>
-            <p:nvPr/>
-          </p:nvSpPr>
-          <p:spPr>
-            <a:xfrm>
-              <a:off x="4840314" y="1500414"/>
-              <a:ext cx="600777" cy="600778"/>
-            </a:xfrm>
-            <a:prstGeom prst="ellipse">
-              <a:avLst/>
-            </a:prstGeom>
-            <a:solidFill>
-              <a:schemeClr val="tx2">
-                <a:lumMod val="10000"/>
-                <a:lumOff val="90000"/>
-              </a:schemeClr>
-            </a:solidFill>
-            <a:ln w="6350"/>
-          </p:spPr>
-          <p:style>
-            <a:lnRef idx="2">
-              <a:schemeClr val="accent1">
-                <a:shade val="15000"/>
-              </a:schemeClr>
-            </a:lnRef>
-            <a:fillRef idx="1">
-              <a:schemeClr val="accent1"/>
-            </a:fillRef>
-            <a:effectRef idx="0">
-              <a:schemeClr val="accent1"/>
-            </a:effectRef>
-            <a:fontRef idx="minor">
-              <a:schemeClr val="lt1"/>
-            </a:fontRef>
-          </p:style>
-          <p:txBody>
-            <a:bodyPr lIns="0" tIns="0" rIns="0" bIns="0" rtlCol="0" anchor="ctr"/>
-            <a:lstStyle/>
-            <a:p>
-              <a:pPr algn="ctr"/>
-              <a:r>
-                <a:rPr lang="en-US" sz="1000" dirty="0">
-                  <a:solidFill>
-                    <a:schemeClr val="tx1"/>
-                  </a:solidFill>
-                  <a:latin typeface="AVENIR LIGHT OBLIQUE" panose="020B0402020203090204" pitchFamily="34" charset="77"/>
-                </a:rPr>
-                <a:t>Hank</a:t>
-              </a:r>
-            </a:p>
-          </p:txBody>
-        </p:sp>
-        <p:cxnSp>
-          <p:nvCxnSpPr>
-            <p:cNvPr id="18" name="Straight Connector 17">
-              <a:extLst>
-                <a:ext uri="{FF2B5EF4-FFF2-40B4-BE49-F238E27FC236}">
-                  <a16:creationId xmlns:a16="http://schemas.microsoft.com/office/drawing/2014/main" id="{E2008D6F-05C4-984B-F63F-F69B4E6F3EC0}"/>
-                </a:ext>
-              </a:extLst>
-            </p:cNvPr>
-            <p:cNvCxnSpPr>
-              <a:cxnSpLocks/>
-              <a:stCxn id="17" idx="4"/>
-            </p:cNvCxnSpPr>
-            <p:nvPr/>
-          </p:nvCxnSpPr>
-          <p:spPr>
-            <a:xfrm>
-              <a:off x="5140703" y="2101192"/>
-              <a:ext cx="4410" cy="2936245"/>
-            </a:xfrm>
-            <a:prstGeom prst="line">
-              <a:avLst/>
-            </a:prstGeom>
-            <a:ln w="9525">
-              <a:solidFill>
-                <a:schemeClr val="tx1"/>
-              </a:solidFill>
-            </a:ln>
-          </p:spPr>
-          <p:style>
-            <a:lnRef idx="2">
-              <a:schemeClr val="accent1"/>
-            </a:lnRef>
-            <a:fillRef idx="0">
-              <a:schemeClr val="accent1"/>
-            </a:fillRef>
-            <a:effectRef idx="1">
-              <a:schemeClr val="accent1"/>
-            </a:effectRef>
-            <a:fontRef idx="minor">
-              <a:schemeClr val="tx1"/>
-            </a:fontRef>
-          </p:style>
-        </p:cxnSp>
-      </p:grpSp>
-      <p:grpSp>
-        <p:nvGrpSpPr>
-          <p:cNvPr id="21" name="Group 20">
-            <a:extLst>
-              <a:ext uri="{FF2B5EF4-FFF2-40B4-BE49-F238E27FC236}">
-                <a16:creationId xmlns:a16="http://schemas.microsoft.com/office/drawing/2014/main" id="{17BD5C65-21CD-0985-5807-1FF66B77FB6C}"/>
-              </a:ext>
-            </a:extLst>
-          </p:cNvPr>
-          <p:cNvGrpSpPr/>
-          <p:nvPr/>
-        </p:nvGrpSpPr>
-        <p:grpSpPr>
-          <a:xfrm>
-            <a:off x="6452685" y="1434512"/>
-            <a:ext cx="600777" cy="3537023"/>
-            <a:chOff x="4840314" y="1500414"/>
-            <a:chExt cx="600777" cy="3537023"/>
-          </a:xfrm>
-        </p:grpSpPr>
-        <p:sp>
-          <p:nvSpPr>
-            <p:cNvPr id="22" name="Oval 21">
-              <a:extLst>
-                <a:ext uri="{FF2B5EF4-FFF2-40B4-BE49-F238E27FC236}">
-                  <a16:creationId xmlns:a16="http://schemas.microsoft.com/office/drawing/2014/main" id="{01D47920-01FC-30AB-478E-AF8493776FDC}"/>
-                </a:ext>
-              </a:extLst>
-            </p:cNvPr>
-            <p:cNvSpPr/>
-            <p:nvPr/>
-          </p:nvSpPr>
-          <p:spPr>
-            <a:xfrm>
-              <a:off x="4840314" y="1500414"/>
-              <a:ext cx="600777" cy="600778"/>
-            </a:xfrm>
-            <a:prstGeom prst="ellipse">
-              <a:avLst/>
-            </a:prstGeom>
-            <a:solidFill>
-              <a:schemeClr val="tx2">
-                <a:lumMod val="10000"/>
-                <a:lumOff val="90000"/>
-              </a:schemeClr>
-            </a:solidFill>
-            <a:ln w="6350"/>
-          </p:spPr>
-          <p:style>
-            <a:lnRef idx="2">
-              <a:schemeClr val="accent1">
-                <a:shade val="15000"/>
-              </a:schemeClr>
-            </a:lnRef>
-            <a:fillRef idx="1">
-              <a:schemeClr val="accent1"/>
-            </a:fillRef>
-            <a:effectRef idx="0">
-              <a:schemeClr val="accent1"/>
-            </a:effectRef>
-            <a:fontRef idx="minor">
-              <a:schemeClr val="lt1"/>
-            </a:fontRef>
-          </p:style>
-          <p:txBody>
-            <a:bodyPr lIns="0" tIns="0" rIns="0" bIns="0" rtlCol="0" anchor="ctr"/>
-            <a:lstStyle/>
-            <a:p>
-              <a:pPr algn="ctr"/>
-              <a:r>
-                <a:rPr lang="en-US" sz="1000" dirty="0">
-                  <a:solidFill>
-                    <a:schemeClr val="tx1"/>
-                  </a:solidFill>
-                  <a:latin typeface="AVENIR LIGHT OBLIQUE" panose="020B0402020203090204" pitchFamily="34" charset="77"/>
-                </a:rPr>
-                <a:t>Hugo</a:t>
-              </a:r>
-            </a:p>
-          </p:txBody>
-        </p:sp>
-        <p:cxnSp>
-          <p:nvCxnSpPr>
-            <p:cNvPr id="23" name="Straight Connector 22">
-              <a:extLst>
-                <a:ext uri="{FF2B5EF4-FFF2-40B4-BE49-F238E27FC236}">
-                  <a16:creationId xmlns:a16="http://schemas.microsoft.com/office/drawing/2014/main" id="{95C70D6F-C628-A58E-3202-1C5B56088961}"/>
-                </a:ext>
-              </a:extLst>
-            </p:cNvPr>
-            <p:cNvCxnSpPr>
-              <a:cxnSpLocks/>
-              <a:stCxn id="22" idx="4"/>
-            </p:cNvCxnSpPr>
-            <p:nvPr/>
-          </p:nvCxnSpPr>
-          <p:spPr>
-            <a:xfrm>
-              <a:off x="5140703" y="2101192"/>
-              <a:ext cx="4410" cy="2936245"/>
-            </a:xfrm>
-            <a:prstGeom prst="line">
-              <a:avLst/>
-            </a:prstGeom>
-            <a:ln w="9525">
-              <a:solidFill>
-                <a:schemeClr val="tx1"/>
-              </a:solidFill>
-            </a:ln>
-          </p:spPr>
-          <p:style>
-            <a:lnRef idx="2">
-              <a:schemeClr val="accent1"/>
-            </a:lnRef>
-            <a:fillRef idx="0">
-              <a:schemeClr val="accent1"/>
-            </a:fillRef>
-            <a:effectRef idx="1">
-              <a:schemeClr val="accent1"/>
-            </a:effectRef>
-            <a:fontRef idx="minor">
-              <a:schemeClr val="tx1"/>
-            </a:fontRef>
-          </p:style>
-        </p:cxnSp>
-      </p:grpSp>
-      <p:sp>
-        <p:nvSpPr>
-          <p:cNvPr id="24" name="Rectangle 23">
-            <a:extLst>
-              <a:ext uri="{FF2B5EF4-FFF2-40B4-BE49-F238E27FC236}">
-                <a16:creationId xmlns:a16="http://schemas.microsoft.com/office/drawing/2014/main" id="{0F6B5FC9-1875-13A1-9A55-B850810A7F34}"/>
-              </a:ext>
-            </a:extLst>
-          </p:cNvPr>
-          <p:cNvSpPr/>
-          <p:nvPr/>
-        </p:nvSpPr>
-        <p:spPr>
-          <a:xfrm>
-            <a:off x="575426" y="1027238"/>
-            <a:ext cx="11045074" cy="4396250"/>
-          </a:xfrm>
-          <a:prstGeom prst="rect">
-            <a:avLst/>
-          </a:prstGeom>
-          <a:noFill/>
-          <a:ln w="9525">
-            <a:solidFill>
-              <a:schemeClr val="bg1">
-                <a:lumMod val="65000"/>
-              </a:schemeClr>
-            </a:solidFill>
-          </a:ln>
-        </p:spPr>
-        <p:style>
-          <a:lnRef idx="2">
-            <a:schemeClr val="accent1">
-              <a:shade val="15000"/>
-            </a:schemeClr>
-          </a:lnRef>
-          <a:fillRef idx="1">
-            <a:schemeClr val="accent1"/>
-          </a:fillRef>
-          <a:effectRef idx="0">
-            <a:schemeClr val="accent1"/>
-          </a:effectRef>
-          <a:fontRef idx="minor">
-            <a:schemeClr val="lt1"/>
-          </a:fontRef>
-        </p:style>
-        <p:txBody>
-          <a:bodyPr rtlCol="0" anchor="ctr"/>
-          <a:lstStyle/>
-          <a:p>
-            <a:pPr algn="ctr"/>
-            <a:endParaRPr lang="en-US" sz="1000" dirty="0">
-              <a:solidFill>
-                <a:schemeClr val="tx1"/>
-              </a:solidFill>
-              <a:latin typeface="Avenir Book" panose="02000503020000020003" pitchFamily="2" charset="0"/>
-            </a:endParaRPr>
-          </a:p>
-        </p:txBody>
-      </p:sp>
-      <p:sp>
-        <p:nvSpPr>
-          <p:cNvPr id="25" name="Rectangle 24">
-            <a:extLst>
-              <a:ext uri="{FF2B5EF4-FFF2-40B4-BE49-F238E27FC236}">
-                <a16:creationId xmlns:a16="http://schemas.microsoft.com/office/drawing/2014/main" id="{6CD4514A-45F2-9200-D9C4-371DE023D7F8}"/>
-              </a:ext>
-            </a:extLst>
-          </p:cNvPr>
-          <p:cNvSpPr/>
-          <p:nvPr/>
-        </p:nvSpPr>
-        <p:spPr>
-          <a:xfrm>
-            <a:off x="5462324" y="1301780"/>
-            <a:ext cx="1203948" cy="600778"/>
-          </a:xfrm>
-          <a:prstGeom prst="rect">
-            <a:avLst/>
-          </a:prstGeom>
-          <a:noFill/>
-          <a:ln w="9525">
-            <a:noFill/>
-          </a:ln>
-        </p:spPr>
-        <p:style>
-          <a:lnRef idx="2">
-            <a:schemeClr val="accent1">
-              <a:shade val="15000"/>
-            </a:schemeClr>
-          </a:lnRef>
-          <a:fillRef idx="1">
-            <a:schemeClr val="accent1"/>
-          </a:fillRef>
-          <a:effectRef idx="0">
-            <a:schemeClr val="accent1"/>
-          </a:effectRef>
-          <a:fontRef idx="minor">
-            <a:schemeClr val="lt1"/>
-          </a:fontRef>
-        </p:style>
-        <p:txBody>
-          <a:bodyPr rtlCol="0" anchor="ctr"/>
-          <a:lstStyle/>
-          <a:p>
-            <a:pPr algn="ctr"/>
-            <a:r>
-              <a:rPr lang="en-US" sz="4000" dirty="0">
-                <a:solidFill>
-                  <a:schemeClr val="tx1"/>
-                </a:solidFill>
-                <a:latin typeface="Avenir Book" panose="02000503020000020003" pitchFamily="2" charset="0"/>
-              </a:rPr>
-              <a:t>...</a:t>
-            </a:r>
-          </a:p>
-        </p:txBody>
-      </p:sp>
-      <p:grpSp>
-        <p:nvGrpSpPr>
-          <p:cNvPr id="35" name="Group 34">
-            <a:extLst>
-              <a:ext uri="{FF2B5EF4-FFF2-40B4-BE49-F238E27FC236}">
-                <a16:creationId xmlns:a16="http://schemas.microsoft.com/office/drawing/2014/main" id="{F945E0F3-5B89-C3E6-C48C-891A71320874}"/>
-              </a:ext>
-            </a:extLst>
-          </p:cNvPr>
-          <p:cNvGrpSpPr/>
-          <p:nvPr/>
-        </p:nvGrpSpPr>
-        <p:grpSpPr>
-          <a:xfrm>
-            <a:off x="2145799" y="2077799"/>
-            <a:ext cx="3195826" cy="612038"/>
-            <a:chOff x="2145799" y="2684192"/>
-            <a:chExt cx="3195826" cy="612038"/>
-          </a:xfrm>
-        </p:grpSpPr>
-        <p:grpSp>
-          <p:nvGrpSpPr>
-            <p:cNvPr id="31" name="Group 30">
-              <a:extLst>
-                <a:ext uri="{FF2B5EF4-FFF2-40B4-BE49-F238E27FC236}">
-                  <a16:creationId xmlns:a16="http://schemas.microsoft.com/office/drawing/2014/main" id="{C7252AA2-859F-3FA4-8A67-65BCCAB56F56}"/>
-                </a:ext>
-              </a:extLst>
-            </p:cNvPr>
-            <p:cNvGrpSpPr/>
-            <p:nvPr/>
-          </p:nvGrpSpPr>
-          <p:grpSpPr>
-            <a:xfrm>
-              <a:off x="2145799" y="2684192"/>
-              <a:ext cx="3195826" cy="298861"/>
-              <a:chOff x="2145799" y="2684192"/>
-              <a:chExt cx="3195826" cy="298861"/>
-            </a:xfrm>
-          </p:grpSpPr>
-          <p:cxnSp>
-            <p:nvCxnSpPr>
-              <p:cNvPr id="27" name="Straight Connector 26">
-                <a:extLst>
-                  <a:ext uri="{FF2B5EF4-FFF2-40B4-BE49-F238E27FC236}">
-                    <a16:creationId xmlns:a16="http://schemas.microsoft.com/office/drawing/2014/main" id="{E7E85747-01A3-5EC6-D841-BF173DAB9362}"/>
-                  </a:ext>
-                </a:extLst>
-              </p:cNvPr>
-              <p:cNvCxnSpPr>
-                <a:cxnSpLocks/>
-              </p:cNvCxnSpPr>
-              <p:nvPr/>
-            </p:nvCxnSpPr>
-            <p:spPr>
-              <a:xfrm flipH="1">
-                <a:off x="2145799" y="2934929"/>
-                <a:ext cx="3195826" cy="0"/>
-              </a:xfrm>
-              <a:prstGeom prst="line">
-                <a:avLst/>
-              </a:prstGeom>
-              <a:ln w="9525">
-                <a:solidFill>
-                  <a:srgbClr val="FF0000"/>
-                </a:solidFill>
-                <a:headEnd type="triangle"/>
-              </a:ln>
-            </p:spPr>
-            <p:style>
-              <a:lnRef idx="2">
-                <a:schemeClr val="accent1"/>
-              </a:lnRef>
-              <a:fillRef idx="0">
-                <a:schemeClr val="accent1"/>
-              </a:fillRef>
-              <a:effectRef idx="1">
-                <a:schemeClr val="accent1"/>
-              </a:effectRef>
-              <a:fontRef idx="minor">
-                <a:schemeClr val="tx1"/>
-              </a:fontRef>
-            </p:style>
-          </p:cxnSp>
-          <p:sp>
-            <p:nvSpPr>
-              <p:cNvPr id="30" name="Rectangle 29">
-                <a:extLst>
-                  <a:ext uri="{FF2B5EF4-FFF2-40B4-BE49-F238E27FC236}">
-                    <a16:creationId xmlns:a16="http://schemas.microsoft.com/office/drawing/2014/main" id="{8F5122EC-8E1F-DE8B-5685-836CD4D299F6}"/>
-                  </a:ext>
-                </a:extLst>
-              </p:cNvPr>
-              <p:cNvSpPr/>
-              <p:nvPr/>
-            </p:nvSpPr>
-            <p:spPr>
-              <a:xfrm>
-                <a:off x="2145799" y="2684192"/>
-                <a:ext cx="2784678" cy="298861"/>
-              </a:xfrm>
-              <a:prstGeom prst="rect">
-                <a:avLst/>
-              </a:prstGeom>
-              <a:noFill/>
-              <a:ln w="9525">
-                <a:noFill/>
-              </a:ln>
-            </p:spPr>
-            <p:style>
-              <a:lnRef idx="2">
-                <a:schemeClr val="accent1">
-                  <a:shade val="15000"/>
-                </a:schemeClr>
-              </a:lnRef>
-              <a:fillRef idx="1">
-                <a:schemeClr val="accent1"/>
-              </a:fillRef>
-              <a:effectRef idx="0">
-                <a:schemeClr val="accent1"/>
-              </a:effectRef>
-              <a:fontRef idx="minor">
-                <a:schemeClr val="lt1"/>
-              </a:fontRef>
-            </p:style>
-            <p:txBody>
-              <a:bodyPr rtlCol="0" anchor="ctr"/>
-              <a:lstStyle/>
-              <a:p>
-                <a:r>
-                  <a:rPr lang="en-US" sz="1000" dirty="0">
-                    <a:solidFill>
-                      <a:srgbClr val="FF0000"/>
-                    </a:solidFill>
-                    <a:latin typeface="Avenir Book" panose="02000503020000020003" pitchFamily="2" charset="0"/>
-                  </a:rPr>
-                  <a:t>PUT registration</a:t>
-                </a:r>
-              </a:p>
-            </p:txBody>
-          </p:sp>
-        </p:grpSp>
-        <p:grpSp>
-          <p:nvGrpSpPr>
-            <p:cNvPr id="32" name="Group 31">
-              <a:extLst>
-                <a:ext uri="{FF2B5EF4-FFF2-40B4-BE49-F238E27FC236}">
-                  <a16:creationId xmlns:a16="http://schemas.microsoft.com/office/drawing/2014/main" id="{BBA2A2DD-8DF3-80E0-FF55-77291C7B0B60}"/>
-                </a:ext>
-              </a:extLst>
-            </p:cNvPr>
-            <p:cNvGrpSpPr/>
-            <p:nvPr/>
-          </p:nvGrpSpPr>
-          <p:grpSpPr>
-            <a:xfrm>
-              <a:off x="2145799" y="2997369"/>
-              <a:ext cx="3195826" cy="298861"/>
-              <a:chOff x="2145799" y="2684192"/>
-              <a:chExt cx="3195826" cy="298861"/>
-            </a:xfrm>
-          </p:grpSpPr>
-          <p:cxnSp>
-            <p:nvCxnSpPr>
-              <p:cNvPr id="33" name="Straight Connector 32">
-                <a:extLst>
-                  <a:ext uri="{FF2B5EF4-FFF2-40B4-BE49-F238E27FC236}">
-                    <a16:creationId xmlns:a16="http://schemas.microsoft.com/office/drawing/2014/main" id="{65CA86CA-BDC4-A983-82B9-B8D39E73DCCD}"/>
-                  </a:ext>
-                </a:extLst>
-              </p:cNvPr>
-              <p:cNvCxnSpPr>
-                <a:cxnSpLocks/>
-              </p:cNvCxnSpPr>
-              <p:nvPr/>
-            </p:nvCxnSpPr>
-            <p:spPr>
-              <a:xfrm flipH="1">
-                <a:off x="2145799" y="2934929"/>
-                <a:ext cx="3195826" cy="0"/>
-              </a:xfrm>
-              <a:prstGeom prst="line">
-                <a:avLst/>
-              </a:prstGeom>
-              <a:ln w="9525">
-                <a:solidFill>
-                  <a:srgbClr val="FF0000"/>
-                </a:solidFill>
-                <a:headEnd type="triangle"/>
-              </a:ln>
-            </p:spPr>
-            <p:style>
-              <a:lnRef idx="2">
-                <a:schemeClr val="accent1"/>
-              </a:lnRef>
-              <a:fillRef idx="0">
-                <a:schemeClr val="accent1"/>
-              </a:fillRef>
-              <a:effectRef idx="1">
-                <a:schemeClr val="accent1"/>
-              </a:effectRef>
-              <a:fontRef idx="minor">
-                <a:schemeClr val="tx1"/>
-              </a:fontRef>
-            </p:style>
-          </p:cxnSp>
-          <p:sp>
-            <p:nvSpPr>
-              <p:cNvPr id="34" name="Rectangle 33">
-                <a:extLst>
-                  <a:ext uri="{FF2B5EF4-FFF2-40B4-BE49-F238E27FC236}">
-                    <a16:creationId xmlns:a16="http://schemas.microsoft.com/office/drawing/2014/main" id="{E4485CA7-40CF-0BC4-B8F1-912E0746168B}"/>
-                  </a:ext>
-                </a:extLst>
-              </p:cNvPr>
-              <p:cNvSpPr/>
-              <p:nvPr/>
-            </p:nvSpPr>
-            <p:spPr>
-              <a:xfrm>
-                <a:off x="2145799" y="2684192"/>
-                <a:ext cx="2784678" cy="298861"/>
-              </a:xfrm>
-              <a:prstGeom prst="rect">
-                <a:avLst/>
-              </a:prstGeom>
-              <a:noFill/>
-              <a:ln w="9525">
-                <a:noFill/>
-              </a:ln>
-            </p:spPr>
-            <p:style>
-              <a:lnRef idx="2">
-                <a:schemeClr val="accent1">
-                  <a:shade val="15000"/>
-                </a:schemeClr>
-              </a:lnRef>
-              <a:fillRef idx="1">
-                <a:schemeClr val="accent1"/>
-              </a:fillRef>
-              <a:effectRef idx="0">
-                <a:schemeClr val="accent1"/>
-              </a:effectRef>
-              <a:fontRef idx="minor">
-                <a:schemeClr val="lt1"/>
-              </a:fontRef>
-            </p:style>
-            <p:txBody>
-              <a:bodyPr rtlCol="0" anchor="ctr"/>
-              <a:lstStyle/>
-              <a:p>
-                <a:r>
-                  <a:rPr lang="en-US" sz="1000" dirty="0">
-                    <a:solidFill>
-                      <a:srgbClr val="FF0000"/>
-                    </a:solidFill>
-                    <a:latin typeface="Avenir Book" panose="02000503020000020003" pitchFamily="2" charset="0"/>
-                  </a:rPr>
-                  <a:t>GET </a:t>
-                </a:r>
-                <a:r>
-                  <a:rPr lang="en-US" sz="1000" dirty="0" err="1">
-                    <a:solidFill>
-                      <a:srgbClr val="FF0000"/>
-                    </a:solidFill>
-                    <a:latin typeface="Avenir Book" panose="02000503020000020003" pitchFamily="2" charset="0"/>
-                  </a:rPr>
-                  <a:t>psrd</a:t>
-                </a:r>
-                <a:endParaRPr lang="en-US" sz="1000" dirty="0">
-                  <a:solidFill>
-                    <a:srgbClr val="FF0000"/>
-                  </a:solidFill>
-                  <a:latin typeface="Avenir Book" panose="02000503020000020003" pitchFamily="2" charset="0"/>
-                </a:endParaRPr>
-              </a:p>
-            </p:txBody>
-          </p:sp>
-        </p:grpSp>
-      </p:grpSp>
-      <p:grpSp>
-        <p:nvGrpSpPr>
-          <p:cNvPr id="36" name="Group 35">
-            <a:extLst>
-              <a:ext uri="{FF2B5EF4-FFF2-40B4-BE49-F238E27FC236}">
-                <a16:creationId xmlns:a16="http://schemas.microsoft.com/office/drawing/2014/main" id="{0DDCE860-A8CB-3B9A-A77F-A74DAB0D0295}"/>
-              </a:ext>
-            </a:extLst>
-          </p:cNvPr>
-          <p:cNvGrpSpPr/>
-          <p:nvPr/>
-        </p:nvGrpSpPr>
-        <p:grpSpPr>
-          <a:xfrm>
-            <a:off x="2145799" y="2794782"/>
-            <a:ext cx="4607274" cy="612038"/>
-            <a:chOff x="2145799" y="2684192"/>
-            <a:chExt cx="4607274" cy="612038"/>
-          </a:xfrm>
-        </p:grpSpPr>
-        <p:grpSp>
-          <p:nvGrpSpPr>
-            <p:cNvPr id="37" name="Group 36">
-              <a:extLst>
-                <a:ext uri="{FF2B5EF4-FFF2-40B4-BE49-F238E27FC236}">
-                  <a16:creationId xmlns:a16="http://schemas.microsoft.com/office/drawing/2014/main" id="{89B52564-CB00-C57B-FA65-FB393B5C5E57}"/>
-                </a:ext>
-              </a:extLst>
-            </p:cNvPr>
-            <p:cNvGrpSpPr/>
-            <p:nvPr/>
-          </p:nvGrpSpPr>
-          <p:grpSpPr>
-            <a:xfrm>
-              <a:off x="2145799" y="2684192"/>
-              <a:ext cx="4607274" cy="298861"/>
-              <a:chOff x="2145799" y="2684192"/>
-              <a:chExt cx="4607274" cy="298861"/>
-            </a:xfrm>
-          </p:grpSpPr>
-          <p:cxnSp>
-            <p:nvCxnSpPr>
-              <p:cNvPr id="41" name="Straight Connector 40">
-                <a:extLst>
-                  <a:ext uri="{FF2B5EF4-FFF2-40B4-BE49-F238E27FC236}">
-                    <a16:creationId xmlns:a16="http://schemas.microsoft.com/office/drawing/2014/main" id="{3ACBE410-1217-C1F0-0962-DA9E39547C2A}"/>
-                  </a:ext>
-                </a:extLst>
-              </p:cNvPr>
-              <p:cNvCxnSpPr>
-                <a:cxnSpLocks/>
-              </p:cNvCxnSpPr>
-              <p:nvPr/>
-            </p:nvCxnSpPr>
-            <p:spPr>
-              <a:xfrm flipH="1">
-                <a:off x="2145799" y="2934929"/>
-                <a:ext cx="4607274" cy="0"/>
-              </a:xfrm>
-              <a:prstGeom prst="line">
-                <a:avLst/>
-              </a:prstGeom>
-              <a:ln w="9525">
-                <a:solidFill>
-                  <a:srgbClr val="FF0000"/>
-                </a:solidFill>
-                <a:headEnd type="triangle"/>
-              </a:ln>
-            </p:spPr>
-            <p:style>
-              <a:lnRef idx="2">
-                <a:schemeClr val="accent1"/>
-              </a:lnRef>
-              <a:fillRef idx="0">
-                <a:schemeClr val="accent1"/>
-              </a:fillRef>
-              <a:effectRef idx="1">
-                <a:schemeClr val="accent1"/>
-              </a:effectRef>
-              <a:fontRef idx="minor">
-                <a:schemeClr val="tx1"/>
-              </a:fontRef>
-            </p:style>
-          </p:cxnSp>
-          <p:sp>
-            <p:nvSpPr>
-              <p:cNvPr id="42" name="Rectangle 41">
-                <a:extLst>
-                  <a:ext uri="{FF2B5EF4-FFF2-40B4-BE49-F238E27FC236}">
-                    <a16:creationId xmlns:a16="http://schemas.microsoft.com/office/drawing/2014/main" id="{E1884416-8714-C367-508F-11ECFA456D2B}"/>
-                  </a:ext>
-                </a:extLst>
-              </p:cNvPr>
-              <p:cNvSpPr/>
-              <p:nvPr/>
-            </p:nvSpPr>
-            <p:spPr>
-              <a:xfrm>
-                <a:off x="2145799" y="2684192"/>
-                <a:ext cx="2784678" cy="298861"/>
-              </a:xfrm>
-              <a:prstGeom prst="rect">
-                <a:avLst/>
-              </a:prstGeom>
-              <a:noFill/>
-              <a:ln w="9525">
-                <a:noFill/>
-              </a:ln>
-            </p:spPr>
-            <p:style>
-              <a:lnRef idx="2">
-                <a:schemeClr val="accent1">
-                  <a:shade val="15000"/>
-                </a:schemeClr>
-              </a:lnRef>
-              <a:fillRef idx="1">
-                <a:schemeClr val="accent1"/>
-              </a:fillRef>
-              <a:effectRef idx="0">
-                <a:schemeClr val="accent1"/>
-              </a:effectRef>
-              <a:fontRef idx="minor">
-                <a:schemeClr val="lt1"/>
-              </a:fontRef>
-            </p:style>
-            <p:txBody>
-              <a:bodyPr rtlCol="0" anchor="ctr"/>
-              <a:lstStyle/>
-              <a:p>
-                <a:r>
-                  <a:rPr lang="en-US" sz="1000">
-                    <a:solidFill>
-                      <a:srgbClr val="FF0000"/>
-                    </a:solidFill>
-                    <a:latin typeface="Avenir Book" panose="02000503020000020003" pitchFamily="2" charset="0"/>
-                  </a:rPr>
-                  <a:t>PUT registration</a:t>
-                </a:r>
-                <a:endParaRPr lang="en-US" sz="1000" dirty="0">
-                  <a:solidFill>
-                    <a:srgbClr val="FF0000"/>
-                  </a:solidFill>
-                  <a:latin typeface="Avenir Book" panose="02000503020000020003" pitchFamily="2" charset="0"/>
-                </a:endParaRPr>
-              </a:p>
-            </p:txBody>
-          </p:sp>
-        </p:grpSp>
-        <p:grpSp>
-          <p:nvGrpSpPr>
-            <p:cNvPr id="38" name="Group 37">
-              <a:extLst>
-                <a:ext uri="{FF2B5EF4-FFF2-40B4-BE49-F238E27FC236}">
-                  <a16:creationId xmlns:a16="http://schemas.microsoft.com/office/drawing/2014/main" id="{4D63BEAA-B914-5169-CBF2-E839586B288F}"/>
-                </a:ext>
-              </a:extLst>
-            </p:cNvPr>
-            <p:cNvGrpSpPr/>
-            <p:nvPr/>
-          </p:nvGrpSpPr>
-          <p:grpSpPr>
-            <a:xfrm>
-              <a:off x="2145799" y="2997369"/>
-              <a:ext cx="4607274" cy="298861"/>
-              <a:chOff x="2145799" y="2684192"/>
-              <a:chExt cx="4607274" cy="298861"/>
-            </a:xfrm>
-          </p:grpSpPr>
-          <p:cxnSp>
-            <p:nvCxnSpPr>
-              <p:cNvPr id="39" name="Straight Connector 38">
-                <a:extLst>
-                  <a:ext uri="{FF2B5EF4-FFF2-40B4-BE49-F238E27FC236}">
-                    <a16:creationId xmlns:a16="http://schemas.microsoft.com/office/drawing/2014/main" id="{CDBA45C2-048D-7835-06A7-C403393483B0}"/>
-                  </a:ext>
-                </a:extLst>
-              </p:cNvPr>
-              <p:cNvCxnSpPr>
-                <a:cxnSpLocks/>
-              </p:cNvCxnSpPr>
-              <p:nvPr/>
-            </p:nvCxnSpPr>
-            <p:spPr>
-              <a:xfrm flipH="1">
-                <a:off x="2145799" y="2934929"/>
-                <a:ext cx="4607274" cy="0"/>
-              </a:xfrm>
-              <a:prstGeom prst="line">
-                <a:avLst/>
-              </a:prstGeom>
-              <a:ln w="9525">
-                <a:solidFill>
-                  <a:srgbClr val="FF0000"/>
-                </a:solidFill>
-                <a:headEnd type="triangle"/>
-              </a:ln>
-            </p:spPr>
-            <p:style>
-              <a:lnRef idx="2">
-                <a:schemeClr val="accent1"/>
-              </a:lnRef>
-              <a:fillRef idx="0">
-                <a:schemeClr val="accent1"/>
-              </a:fillRef>
-              <a:effectRef idx="1">
-                <a:schemeClr val="accent1"/>
-              </a:effectRef>
-              <a:fontRef idx="minor">
-                <a:schemeClr val="tx1"/>
-              </a:fontRef>
-            </p:style>
-          </p:cxnSp>
-          <p:sp>
-            <p:nvSpPr>
-              <p:cNvPr id="40" name="Rectangle 39">
-                <a:extLst>
-                  <a:ext uri="{FF2B5EF4-FFF2-40B4-BE49-F238E27FC236}">
-                    <a16:creationId xmlns:a16="http://schemas.microsoft.com/office/drawing/2014/main" id="{723966DC-C1A4-88DF-7B9B-601C78B06C0F}"/>
-                  </a:ext>
-                </a:extLst>
-              </p:cNvPr>
-              <p:cNvSpPr/>
-              <p:nvPr/>
-            </p:nvSpPr>
-            <p:spPr>
-              <a:xfrm>
-                <a:off x="2145799" y="2684192"/>
-                <a:ext cx="2784678" cy="298861"/>
-              </a:xfrm>
-              <a:prstGeom prst="rect">
-                <a:avLst/>
-              </a:prstGeom>
-              <a:noFill/>
-              <a:ln w="9525">
-                <a:noFill/>
-              </a:ln>
-            </p:spPr>
-            <p:style>
-              <a:lnRef idx="2">
-                <a:schemeClr val="accent1">
-                  <a:shade val="15000"/>
-                </a:schemeClr>
-              </a:lnRef>
-              <a:fillRef idx="1">
-                <a:schemeClr val="accent1"/>
-              </a:fillRef>
-              <a:effectRef idx="0">
-                <a:schemeClr val="accent1"/>
-              </a:effectRef>
-              <a:fontRef idx="minor">
-                <a:schemeClr val="lt1"/>
-              </a:fontRef>
-            </p:style>
-            <p:txBody>
-              <a:bodyPr rtlCol="0" anchor="ctr"/>
-              <a:lstStyle/>
-              <a:p>
-                <a:r>
-                  <a:rPr lang="en-US" sz="1000" dirty="0">
-                    <a:solidFill>
-                      <a:srgbClr val="FF0000"/>
-                    </a:solidFill>
-                    <a:latin typeface="Avenir Book" panose="02000503020000020003" pitchFamily="2" charset="0"/>
-                  </a:rPr>
-                  <a:t>GET </a:t>
-                </a:r>
-                <a:r>
-                  <a:rPr lang="en-US" sz="1000" dirty="0" err="1">
-                    <a:solidFill>
-                      <a:srgbClr val="FF0000"/>
-                    </a:solidFill>
-                    <a:latin typeface="Avenir Book" panose="02000503020000020003" pitchFamily="2" charset="0"/>
-                  </a:rPr>
-                  <a:t>psrd</a:t>
-                </a:r>
-                <a:endParaRPr lang="en-US" sz="1000" dirty="0">
-                  <a:solidFill>
-                    <a:srgbClr val="FF0000"/>
-                  </a:solidFill>
-                  <a:latin typeface="Avenir Book" panose="02000503020000020003" pitchFamily="2" charset="0"/>
-                </a:endParaRPr>
-              </a:p>
-            </p:txBody>
-          </p:sp>
-        </p:grpSp>
-      </p:grpSp>
-      <p:grpSp>
-        <p:nvGrpSpPr>
-          <p:cNvPr id="45" name="Group 44">
-            <a:extLst>
-              <a:ext uri="{FF2B5EF4-FFF2-40B4-BE49-F238E27FC236}">
-                <a16:creationId xmlns:a16="http://schemas.microsoft.com/office/drawing/2014/main" id="{CF4C12BA-A173-B622-AB35-8A4667510D1A}"/>
-              </a:ext>
-            </a:extLst>
-          </p:cNvPr>
-          <p:cNvGrpSpPr/>
-          <p:nvPr/>
-        </p:nvGrpSpPr>
-        <p:grpSpPr>
-          <a:xfrm flipH="1">
-            <a:off x="6753073" y="3526779"/>
-            <a:ext cx="3195826" cy="612038"/>
-            <a:chOff x="2145799" y="2684192"/>
-            <a:chExt cx="3195826" cy="612038"/>
-          </a:xfrm>
-        </p:grpSpPr>
-        <p:grpSp>
-          <p:nvGrpSpPr>
-            <p:cNvPr id="46" name="Group 45">
-              <a:extLst>
-                <a:ext uri="{FF2B5EF4-FFF2-40B4-BE49-F238E27FC236}">
-                  <a16:creationId xmlns:a16="http://schemas.microsoft.com/office/drawing/2014/main" id="{45E8EA47-294A-E762-99AC-26233B315772}"/>
-                </a:ext>
-              </a:extLst>
-            </p:cNvPr>
-            <p:cNvGrpSpPr/>
-            <p:nvPr/>
-          </p:nvGrpSpPr>
-          <p:grpSpPr>
-            <a:xfrm>
-              <a:off x="2145799" y="2684192"/>
-              <a:ext cx="3195826" cy="298861"/>
-              <a:chOff x="2145799" y="2684192"/>
-              <a:chExt cx="3195826" cy="298861"/>
-            </a:xfrm>
-          </p:grpSpPr>
-          <p:cxnSp>
-            <p:nvCxnSpPr>
-              <p:cNvPr id="50" name="Straight Connector 49">
-                <a:extLst>
-                  <a:ext uri="{FF2B5EF4-FFF2-40B4-BE49-F238E27FC236}">
-                    <a16:creationId xmlns:a16="http://schemas.microsoft.com/office/drawing/2014/main" id="{C3B6AFCA-5CE0-C31C-CF5C-925A5B71FF90}"/>
-                  </a:ext>
-                </a:extLst>
-              </p:cNvPr>
-              <p:cNvCxnSpPr>
-                <a:cxnSpLocks/>
-              </p:cNvCxnSpPr>
-              <p:nvPr/>
-            </p:nvCxnSpPr>
-            <p:spPr>
-              <a:xfrm flipH="1">
-                <a:off x="2145799" y="2934929"/>
-                <a:ext cx="3195826" cy="0"/>
-              </a:xfrm>
-              <a:prstGeom prst="line">
-                <a:avLst/>
-              </a:prstGeom>
-              <a:ln w="9525">
-                <a:solidFill>
-                  <a:srgbClr val="FF0000"/>
-                </a:solidFill>
-                <a:headEnd type="triangle"/>
-              </a:ln>
-            </p:spPr>
-            <p:style>
-              <a:lnRef idx="2">
-                <a:schemeClr val="accent1"/>
-              </a:lnRef>
-              <a:fillRef idx="0">
-                <a:schemeClr val="accent1"/>
-              </a:fillRef>
-              <a:effectRef idx="1">
-                <a:schemeClr val="accent1"/>
-              </a:effectRef>
-              <a:fontRef idx="minor">
-                <a:schemeClr val="tx1"/>
-              </a:fontRef>
-            </p:style>
-          </p:cxnSp>
-          <p:sp>
-            <p:nvSpPr>
-              <p:cNvPr id="51" name="Rectangle 50">
-                <a:extLst>
-                  <a:ext uri="{FF2B5EF4-FFF2-40B4-BE49-F238E27FC236}">
-                    <a16:creationId xmlns:a16="http://schemas.microsoft.com/office/drawing/2014/main" id="{6551DE2D-B0FD-7650-348F-790BF15D06A7}"/>
-                  </a:ext>
-                </a:extLst>
-              </p:cNvPr>
-              <p:cNvSpPr/>
-              <p:nvPr/>
-            </p:nvSpPr>
-            <p:spPr>
-              <a:xfrm>
-                <a:off x="2145799" y="2684192"/>
-                <a:ext cx="2784678" cy="298861"/>
-              </a:xfrm>
-              <a:prstGeom prst="rect">
-                <a:avLst/>
-              </a:prstGeom>
-              <a:noFill/>
-              <a:ln w="9525">
-                <a:noFill/>
-              </a:ln>
-            </p:spPr>
-            <p:style>
-              <a:lnRef idx="2">
-                <a:schemeClr val="accent1">
-                  <a:shade val="15000"/>
-                </a:schemeClr>
-              </a:lnRef>
-              <a:fillRef idx="1">
-                <a:schemeClr val="accent1"/>
-              </a:fillRef>
-              <a:effectRef idx="0">
-                <a:schemeClr val="accent1"/>
-              </a:effectRef>
-              <a:fontRef idx="minor">
-                <a:schemeClr val="lt1"/>
-              </a:fontRef>
-            </p:style>
-            <p:txBody>
-              <a:bodyPr rtlCol="0" anchor="ctr"/>
-              <a:lstStyle/>
-              <a:p>
-                <a:r>
-                  <a:rPr lang="en-US" sz="1000" dirty="0">
-                    <a:solidFill>
-                      <a:srgbClr val="FF0000"/>
-                    </a:solidFill>
-                    <a:latin typeface="Avenir Book" panose="02000503020000020003" pitchFamily="2" charset="0"/>
-                  </a:rPr>
-                  <a:t>PUT registration</a:t>
-                </a:r>
-              </a:p>
-            </p:txBody>
-          </p:sp>
-        </p:grpSp>
-        <p:grpSp>
-          <p:nvGrpSpPr>
-            <p:cNvPr id="47" name="Group 46">
-              <a:extLst>
-                <a:ext uri="{FF2B5EF4-FFF2-40B4-BE49-F238E27FC236}">
-                  <a16:creationId xmlns:a16="http://schemas.microsoft.com/office/drawing/2014/main" id="{91C9EEE2-FD1B-09E1-3D71-B150D7C89084}"/>
-                </a:ext>
-              </a:extLst>
-            </p:cNvPr>
-            <p:cNvGrpSpPr/>
-            <p:nvPr/>
-          </p:nvGrpSpPr>
-          <p:grpSpPr>
-            <a:xfrm>
-              <a:off x="2145799" y="2997369"/>
-              <a:ext cx="3195826" cy="298861"/>
-              <a:chOff x="2145799" y="2684192"/>
-              <a:chExt cx="3195826" cy="298861"/>
-            </a:xfrm>
-          </p:grpSpPr>
-          <p:cxnSp>
-            <p:nvCxnSpPr>
-              <p:cNvPr id="48" name="Straight Connector 47">
-                <a:extLst>
-                  <a:ext uri="{FF2B5EF4-FFF2-40B4-BE49-F238E27FC236}">
-                    <a16:creationId xmlns:a16="http://schemas.microsoft.com/office/drawing/2014/main" id="{42E1CF90-8451-2888-A8D1-72959D1BF1C9}"/>
-                  </a:ext>
-                </a:extLst>
-              </p:cNvPr>
-              <p:cNvCxnSpPr>
-                <a:cxnSpLocks/>
-              </p:cNvCxnSpPr>
-              <p:nvPr/>
-            </p:nvCxnSpPr>
-            <p:spPr>
-              <a:xfrm flipH="1">
-                <a:off x="2145799" y="2934929"/>
-                <a:ext cx="3195826" cy="0"/>
-              </a:xfrm>
-              <a:prstGeom prst="line">
-                <a:avLst/>
-              </a:prstGeom>
-              <a:ln w="9525">
-                <a:solidFill>
-                  <a:srgbClr val="FF0000"/>
-                </a:solidFill>
-                <a:headEnd type="triangle"/>
-              </a:ln>
-            </p:spPr>
-            <p:style>
-              <a:lnRef idx="2">
-                <a:schemeClr val="accent1"/>
-              </a:lnRef>
-              <a:fillRef idx="0">
-                <a:schemeClr val="accent1"/>
-              </a:fillRef>
-              <a:effectRef idx="1">
-                <a:schemeClr val="accent1"/>
-              </a:effectRef>
-              <a:fontRef idx="minor">
-                <a:schemeClr val="tx1"/>
-              </a:fontRef>
-            </p:style>
-          </p:cxnSp>
-          <p:sp>
-            <p:nvSpPr>
-              <p:cNvPr id="49" name="Rectangle 48">
-                <a:extLst>
-                  <a:ext uri="{FF2B5EF4-FFF2-40B4-BE49-F238E27FC236}">
-                    <a16:creationId xmlns:a16="http://schemas.microsoft.com/office/drawing/2014/main" id="{60BF63FD-3A8E-CAC4-755E-1C25CE465046}"/>
-                  </a:ext>
-                </a:extLst>
-              </p:cNvPr>
-              <p:cNvSpPr/>
-              <p:nvPr/>
-            </p:nvSpPr>
-            <p:spPr>
-              <a:xfrm>
-                <a:off x="2145799" y="2684192"/>
-                <a:ext cx="2784678" cy="298861"/>
-              </a:xfrm>
-              <a:prstGeom prst="rect">
-                <a:avLst/>
-              </a:prstGeom>
-              <a:noFill/>
-              <a:ln w="9525">
-                <a:noFill/>
-              </a:ln>
-            </p:spPr>
-            <p:style>
-              <a:lnRef idx="2">
-                <a:schemeClr val="accent1">
-                  <a:shade val="15000"/>
-                </a:schemeClr>
-              </a:lnRef>
-              <a:fillRef idx="1">
-                <a:schemeClr val="accent1"/>
-              </a:fillRef>
-              <a:effectRef idx="0">
-                <a:schemeClr val="accent1"/>
-              </a:effectRef>
-              <a:fontRef idx="minor">
-                <a:schemeClr val="lt1"/>
-              </a:fontRef>
-            </p:style>
-            <p:txBody>
-              <a:bodyPr rtlCol="0" anchor="ctr"/>
-              <a:lstStyle/>
-              <a:p>
-                <a:r>
-                  <a:rPr lang="en-US" sz="1000" dirty="0">
-                    <a:solidFill>
-                      <a:srgbClr val="FF0000"/>
-                    </a:solidFill>
-                    <a:latin typeface="Avenir Book" panose="02000503020000020003" pitchFamily="2" charset="0"/>
-                  </a:rPr>
-                  <a:t>GET </a:t>
-                </a:r>
-                <a:r>
-                  <a:rPr lang="en-US" sz="1000" dirty="0" err="1">
-                    <a:solidFill>
-                      <a:srgbClr val="FF0000"/>
-                    </a:solidFill>
-                    <a:latin typeface="Avenir Book" panose="02000503020000020003" pitchFamily="2" charset="0"/>
-                  </a:rPr>
-                  <a:t>psrd</a:t>
-                </a:r>
-                <a:endParaRPr lang="en-US" sz="1000" dirty="0">
-                  <a:solidFill>
-                    <a:srgbClr val="FF0000"/>
-                  </a:solidFill>
-                  <a:latin typeface="Avenir Book" panose="02000503020000020003" pitchFamily="2" charset="0"/>
-                </a:endParaRPr>
-              </a:p>
-            </p:txBody>
-          </p:sp>
-        </p:grpSp>
-      </p:grpSp>
-      <p:grpSp>
-        <p:nvGrpSpPr>
-          <p:cNvPr id="52" name="Group 51">
-            <a:extLst>
-              <a:ext uri="{FF2B5EF4-FFF2-40B4-BE49-F238E27FC236}">
-                <a16:creationId xmlns:a16="http://schemas.microsoft.com/office/drawing/2014/main" id="{274C9872-2A0F-3D2E-7ABC-D2A623D5F965}"/>
-              </a:ext>
-            </a:extLst>
-          </p:cNvPr>
-          <p:cNvGrpSpPr/>
-          <p:nvPr/>
-        </p:nvGrpSpPr>
-        <p:grpSpPr>
-          <a:xfrm flipH="1">
-            <a:off x="5341625" y="4243762"/>
-            <a:ext cx="4607274" cy="612038"/>
-            <a:chOff x="2145799" y="2684192"/>
-            <a:chExt cx="4607274" cy="612038"/>
-          </a:xfrm>
-        </p:grpSpPr>
-        <p:grpSp>
-          <p:nvGrpSpPr>
-            <p:cNvPr id="53" name="Group 52">
-              <a:extLst>
-                <a:ext uri="{FF2B5EF4-FFF2-40B4-BE49-F238E27FC236}">
-                  <a16:creationId xmlns:a16="http://schemas.microsoft.com/office/drawing/2014/main" id="{511382C1-4879-95D2-F2C2-F1AD324FF722}"/>
-                </a:ext>
-              </a:extLst>
-            </p:cNvPr>
-            <p:cNvGrpSpPr/>
-            <p:nvPr/>
-          </p:nvGrpSpPr>
-          <p:grpSpPr>
-            <a:xfrm>
-              <a:off x="2145799" y="2684192"/>
-              <a:ext cx="4607274" cy="298861"/>
-              <a:chOff x="2145799" y="2684192"/>
-              <a:chExt cx="4607274" cy="298861"/>
-            </a:xfrm>
-          </p:grpSpPr>
-          <p:cxnSp>
-            <p:nvCxnSpPr>
-              <p:cNvPr id="57" name="Straight Connector 56">
-                <a:extLst>
-                  <a:ext uri="{FF2B5EF4-FFF2-40B4-BE49-F238E27FC236}">
-                    <a16:creationId xmlns:a16="http://schemas.microsoft.com/office/drawing/2014/main" id="{7EB06316-808F-603D-1386-89EA49CB6B14}"/>
-                  </a:ext>
-                </a:extLst>
-              </p:cNvPr>
-              <p:cNvCxnSpPr>
-                <a:cxnSpLocks/>
-              </p:cNvCxnSpPr>
-              <p:nvPr/>
-            </p:nvCxnSpPr>
-            <p:spPr>
-              <a:xfrm flipH="1">
-                <a:off x="2145799" y="2934929"/>
-                <a:ext cx="4607274" cy="0"/>
-              </a:xfrm>
-              <a:prstGeom prst="line">
-                <a:avLst/>
-              </a:prstGeom>
-              <a:ln w="9525">
-                <a:solidFill>
-                  <a:srgbClr val="FF0000"/>
-                </a:solidFill>
-                <a:headEnd type="triangle"/>
-              </a:ln>
-            </p:spPr>
-            <p:style>
-              <a:lnRef idx="2">
-                <a:schemeClr val="accent1"/>
-              </a:lnRef>
-              <a:fillRef idx="0">
-                <a:schemeClr val="accent1"/>
-              </a:fillRef>
-              <a:effectRef idx="1">
-                <a:schemeClr val="accent1"/>
-              </a:effectRef>
-              <a:fontRef idx="minor">
-                <a:schemeClr val="tx1"/>
-              </a:fontRef>
-            </p:style>
-          </p:cxnSp>
-          <p:sp>
-            <p:nvSpPr>
-              <p:cNvPr id="58" name="Rectangle 57">
-                <a:extLst>
-                  <a:ext uri="{FF2B5EF4-FFF2-40B4-BE49-F238E27FC236}">
-                    <a16:creationId xmlns:a16="http://schemas.microsoft.com/office/drawing/2014/main" id="{2D396F21-9B29-2E42-1089-F4B634C22103}"/>
-                  </a:ext>
-                </a:extLst>
-              </p:cNvPr>
-              <p:cNvSpPr/>
-              <p:nvPr/>
-            </p:nvSpPr>
-            <p:spPr>
-              <a:xfrm>
-                <a:off x="2145799" y="2684192"/>
-                <a:ext cx="2784678" cy="298861"/>
-              </a:xfrm>
-              <a:prstGeom prst="rect">
-                <a:avLst/>
-              </a:prstGeom>
-              <a:noFill/>
-              <a:ln w="9525">
-                <a:noFill/>
-              </a:ln>
-            </p:spPr>
-            <p:style>
-              <a:lnRef idx="2">
-                <a:schemeClr val="accent1">
-                  <a:shade val="15000"/>
-                </a:schemeClr>
-              </a:lnRef>
-              <a:fillRef idx="1">
-                <a:schemeClr val="accent1"/>
-              </a:fillRef>
-              <a:effectRef idx="0">
-                <a:schemeClr val="accent1"/>
-              </a:effectRef>
-              <a:fontRef idx="minor">
-                <a:schemeClr val="lt1"/>
-              </a:fontRef>
-            </p:style>
-            <p:txBody>
-              <a:bodyPr rtlCol="0" anchor="ctr"/>
-              <a:lstStyle/>
-              <a:p>
-                <a:r>
-                  <a:rPr lang="en-US" sz="1000" dirty="0">
-                    <a:solidFill>
-                      <a:srgbClr val="FF0000"/>
-                    </a:solidFill>
-                    <a:latin typeface="Avenir Book" panose="02000503020000020003" pitchFamily="2" charset="0"/>
-                  </a:rPr>
-                  <a:t>PUT registration</a:t>
-                </a:r>
-              </a:p>
-            </p:txBody>
-          </p:sp>
-        </p:grpSp>
-        <p:grpSp>
-          <p:nvGrpSpPr>
-            <p:cNvPr id="54" name="Group 53">
-              <a:extLst>
-                <a:ext uri="{FF2B5EF4-FFF2-40B4-BE49-F238E27FC236}">
-                  <a16:creationId xmlns:a16="http://schemas.microsoft.com/office/drawing/2014/main" id="{41A69A98-1D44-171B-BF83-373AADFBD424}"/>
-                </a:ext>
-              </a:extLst>
-            </p:cNvPr>
-            <p:cNvGrpSpPr/>
-            <p:nvPr/>
-          </p:nvGrpSpPr>
-          <p:grpSpPr>
-            <a:xfrm>
-              <a:off x="2145799" y="2997369"/>
-              <a:ext cx="4607274" cy="298861"/>
-              <a:chOff x="2145799" y="2684192"/>
-              <a:chExt cx="4607274" cy="298861"/>
-            </a:xfrm>
-          </p:grpSpPr>
-          <p:cxnSp>
-            <p:nvCxnSpPr>
-              <p:cNvPr id="55" name="Straight Connector 54">
-                <a:extLst>
-                  <a:ext uri="{FF2B5EF4-FFF2-40B4-BE49-F238E27FC236}">
-                    <a16:creationId xmlns:a16="http://schemas.microsoft.com/office/drawing/2014/main" id="{127435E4-4637-76A9-0C5F-D6C9CF13C3DA}"/>
-                  </a:ext>
-                </a:extLst>
-              </p:cNvPr>
-              <p:cNvCxnSpPr>
-                <a:cxnSpLocks/>
-              </p:cNvCxnSpPr>
-              <p:nvPr/>
-            </p:nvCxnSpPr>
-            <p:spPr>
-              <a:xfrm flipH="1">
-                <a:off x="2145799" y="2934929"/>
-                <a:ext cx="4607274" cy="0"/>
-              </a:xfrm>
-              <a:prstGeom prst="line">
-                <a:avLst/>
-              </a:prstGeom>
-              <a:ln w="9525">
-                <a:solidFill>
-                  <a:srgbClr val="FF0000"/>
-                </a:solidFill>
-                <a:headEnd type="triangle"/>
-              </a:ln>
-            </p:spPr>
-            <p:style>
-              <a:lnRef idx="2">
-                <a:schemeClr val="accent1"/>
-              </a:lnRef>
-              <a:fillRef idx="0">
-                <a:schemeClr val="accent1"/>
-              </a:fillRef>
-              <a:effectRef idx="1">
-                <a:schemeClr val="accent1"/>
-              </a:effectRef>
-              <a:fontRef idx="minor">
-                <a:schemeClr val="tx1"/>
-              </a:fontRef>
-            </p:style>
-          </p:cxnSp>
-          <p:sp>
-            <p:nvSpPr>
-              <p:cNvPr id="56" name="Rectangle 55">
-                <a:extLst>
-                  <a:ext uri="{FF2B5EF4-FFF2-40B4-BE49-F238E27FC236}">
-                    <a16:creationId xmlns:a16="http://schemas.microsoft.com/office/drawing/2014/main" id="{3928276B-7CC2-C69B-F819-F4EEF1C57120}"/>
-                  </a:ext>
-                </a:extLst>
-              </p:cNvPr>
-              <p:cNvSpPr/>
-              <p:nvPr/>
-            </p:nvSpPr>
-            <p:spPr>
-              <a:xfrm>
-                <a:off x="2145799" y="2684192"/>
-                <a:ext cx="2784678" cy="298861"/>
-              </a:xfrm>
-              <a:prstGeom prst="rect">
-                <a:avLst/>
-              </a:prstGeom>
-              <a:noFill/>
-              <a:ln w="9525">
-                <a:noFill/>
-              </a:ln>
-            </p:spPr>
-            <p:style>
-              <a:lnRef idx="2">
-                <a:schemeClr val="accent1">
-                  <a:shade val="15000"/>
-                </a:schemeClr>
-              </a:lnRef>
-              <a:fillRef idx="1">
-                <a:schemeClr val="accent1"/>
-              </a:fillRef>
-              <a:effectRef idx="0">
-                <a:schemeClr val="accent1"/>
-              </a:effectRef>
-              <a:fontRef idx="minor">
-                <a:schemeClr val="lt1"/>
-              </a:fontRef>
-            </p:style>
-            <p:txBody>
-              <a:bodyPr rtlCol="0" anchor="ctr"/>
-              <a:lstStyle/>
-              <a:p>
-                <a:r>
-                  <a:rPr lang="en-US" sz="1000" dirty="0">
-                    <a:solidFill>
-                      <a:srgbClr val="FF0000"/>
-                    </a:solidFill>
-                    <a:latin typeface="Avenir Book" panose="02000503020000020003" pitchFamily="2" charset="0"/>
-                  </a:rPr>
-                  <a:t>GET </a:t>
-                </a:r>
-                <a:r>
-                  <a:rPr lang="en-US" sz="1000" dirty="0" err="1">
-                    <a:solidFill>
-                      <a:srgbClr val="FF0000"/>
-                    </a:solidFill>
-                    <a:latin typeface="Avenir Book" panose="02000503020000020003" pitchFamily="2" charset="0"/>
-                  </a:rPr>
-                  <a:t>psrd</a:t>
-                </a:r>
-                <a:endParaRPr lang="en-US" sz="1000" dirty="0">
-                  <a:solidFill>
-                    <a:srgbClr val="FF0000"/>
-                  </a:solidFill>
-                  <a:latin typeface="Avenir Book" panose="02000503020000020003" pitchFamily="2" charset="0"/>
-                </a:endParaRPr>
-              </a:p>
-            </p:txBody>
-          </p:sp>
-        </p:grpSp>
-      </p:grpSp>
-    </p:spTree>
-    <p:extLst>
-      <p:ext uri="{BB962C8B-B14F-4D97-AF65-F5344CB8AC3E}">
-        <p14:creationId xmlns:p14="http://schemas.microsoft.com/office/powerpoint/2010/main" val="2243908987"/>
       </p:ext>
     </p:extLst>
   </p:cSld>

</xml_diff>

<commit_message>
Introduce real SAE IDs
</commit_message>
<xml_diff>
--- a/docs/figures/figures.pptx
+++ b/docs/figures/figures.pptx
@@ -208,7 +208,7 @@
           <a:p>
             <a:fld id="{66C4A6C0-F2EC-FC45-B98B-ED31D507F3F3}" type="datetimeFigureOut">
               <a:rPr lang="en-US" smtClean="0"/>
-              <a:t>10/31/25</a:t>
+              <a:t>11/1/25</a:t>
             </a:fld>
             <a:endParaRPr lang="en-US"/>
           </a:p>
@@ -503,6 +503,13 @@
           </p:nvPr>
         </p:nvSpPr>
         <p:spPr/>
+        <p:txBody>
+          <a:bodyPr/>
+          <a:lstStyle/>
+          <a:p>
+            <a:endParaRPr lang="en-US"/>
+          </a:p>
+        </p:txBody>
       </p:sp>
       <p:sp>
         <p:nvSpPr>
@@ -587,6 +594,13 @@
           </p:nvPr>
         </p:nvSpPr>
         <p:spPr/>
+        <p:txBody>
+          <a:bodyPr/>
+          <a:lstStyle/>
+          <a:p>
+            <a:endParaRPr lang="en-US"/>
+          </a:p>
+        </p:txBody>
       </p:sp>
       <p:sp>
         <p:nvSpPr>
@@ -790,7 +804,7 @@
           <a:p>
             <a:fld id="{6E32B2FD-E7C2-BB4E-8CD5-3A0929CC3D5F}" type="datetimeFigureOut">
               <a:rPr lang="en-US" smtClean="0"/>
-              <a:t>10/31/25</a:t>
+              <a:t>11/1/25</a:t>
             </a:fld>
             <a:endParaRPr lang="en-US"/>
           </a:p>
@@ -988,7 +1002,7 @@
           <a:p>
             <a:fld id="{6E32B2FD-E7C2-BB4E-8CD5-3A0929CC3D5F}" type="datetimeFigureOut">
               <a:rPr lang="en-US" smtClean="0"/>
-              <a:t>10/31/25</a:t>
+              <a:t>11/1/25</a:t>
             </a:fld>
             <a:endParaRPr lang="en-US"/>
           </a:p>
@@ -1196,7 +1210,7 @@
           <a:p>
             <a:fld id="{6E32B2FD-E7C2-BB4E-8CD5-3A0929CC3D5F}" type="datetimeFigureOut">
               <a:rPr lang="en-US" smtClean="0"/>
-              <a:t>10/31/25</a:t>
+              <a:t>11/1/25</a:t>
             </a:fld>
             <a:endParaRPr lang="en-US"/>
           </a:p>
@@ -1394,7 +1408,7 @@
           <a:p>
             <a:fld id="{6E32B2FD-E7C2-BB4E-8CD5-3A0929CC3D5F}" type="datetimeFigureOut">
               <a:rPr lang="en-US" smtClean="0"/>
-              <a:t>10/31/25</a:t>
+              <a:t>11/1/25</a:t>
             </a:fld>
             <a:endParaRPr lang="en-US"/>
           </a:p>
@@ -1669,7 +1683,7 @@
           <a:p>
             <a:fld id="{6E32B2FD-E7C2-BB4E-8CD5-3A0929CC3D5F}" type="datetimeFigureOut">
               <a:rPr lang="en-US" smtClean="0"/>
-              <a:t>10/31/25</a:t>
+              <a:t>11/1/25</a:t>
             </a:fld>
             <a:endParaRPr lang="en-US"/>
           </a:p>
@@ -1934,7 +1948,7 @@
           <a:p>
             <a:fld id="{6E32B2FD-E7C2-BB4E-8CD5-3A0929CC3D5F}" type="datetimeFigureOut">
               <a:rPr lang="en-US" smtClean="0"/>
-              <a:t>10/31/25</a:t>
+              <a:t>11/1/25</a:t>
             </a:fld>
             <a:endParaRPr lang="en-US"/>
           </a:p>
@@ -2346,7 +2360,7 @@
           <a:p>
             <a:fld id="{6E32B2FD-E7C2-BB4E-8CD5-3A0929CC3D5F}" type="datetimeFigureOut">
               <a:rPr lang="en-US" smtClean="0"/>
-              <a:t>10/31/25</a:t>
+              <a:t>11/1/25</a:t>
             </a:fld>
             <a:endParaRPr lang="en-US"/>
           </a:p>
@@ -2487,7 +2501,7 @@
           <a:p>
             <a:fld id="{6E32B2FD-E7C2-BB4E-8CD5-3A0929CC3D5F}" type="datetimeFigureOut">
               <a:rPr lang="en-US" smtClean="0"/>
-              <a:t>10/31/25</a:t>
+              <a:t>11/1/25</a:t>
             </a:fld>
             <a:endParaRPr lang="en-US"/>
           </a:p>
@@ -2600,7 +2614,7 @@
           <a:p>
             <a:fld id="{6E32B2FD-E7C2-BB4E-8CD5-3A0929CC3D5F}" type="datetimeFigureOut">
               <a:rPr lang="en-US" smtClean="0"/>
-              <a:t>10/31/25</a:t>
+              <a:t>11/1/25</a:t>
             </a:fld>
             <a:endParaRPr lang="en-US"/>
           </a:p>
@@ -2911,7 +2925,7 @@
           <a:p>
             <a:fld id="{6E32B2FD-E7C2-BB4E-8CD5-3A0929CC3D5F}" type="datetimeFigureOut">
               <a:rPr lang="en-US" smtClean="0"/>
-              <a:t>10/31/25</a:t>
+              <a:t>11/1/25</a:t>
             </a:fld>
             <a:endParaRPr lang="en-US"/>
           </a:p>
@@ -3199,7 +3213,7 @@
           <a:p>
             <a:fld id="{6E32B2FD-E7C2-BB4E-8CD5-3A0929CC3D5F}" type="datetimeFigureOut">
               <a:rPr lang="en-US" smtClean="0"/>
-              <a:t>10/31/25</a:t>
+              <a:t>11/1/25</a:t>
             </a:fld>
             <a:endParaRPr lang="en-US"/>
           </a:p>
@@ -3440,7 +3454,7 @@
           <a:p>
             <a:fld id="{6E32B2FD-E7C2-BB4E-8CD5-3A0929CC3D5F}" type="datetimeFigureOut">
               <a:rPr lang="en-US" smtClean="0"/>
-              <a:t>10/31/25</a:t>
+              <a:t>11/1/25</a:t>
             </a:fld>
             <a:endParaRPr lang="en-US"/>
           </a:p>
@@ -16428,8 +16442,8 @@
         </p:nvSpPr>
         <p:spPr>
           <a:xfrm>
-            <a:off x="575426" y="1027238"/>
-            <a:ext cx="11045074" cy="4078162"/>
+            <a:off x="573463" y="1260613"/>
+            <a:ext cx="11045074" cy="4336774"/>
           </a:xfrm>
           <a:prstGeom prst="rect">
             <a:avLst/>
@@ -16491,7 +16505,7 @@
         </p:nvCxnSpPr>
         <p:spPr>
           <a:xfrm flipH="1">
-            <a:off x="4505683" y="3339574"/>
+            <a:off x="4503720" y="3831561"/>
             <a:ext cx="4348200" cy="752141"/>
           </a:xfrm>
           <a:prstGeom prst="line">
@@ -16538,7 +16552,7 @@
         </p:nvCxnSpPr>
         <p:spPr>
           <a:xfrm flipH="1">
-            <a:off x="5592733" y="3339574"/>
+            <a:off x="5590770" y="3831561"/>
             <a:ext cx="3261150" cy="752141"/>
           </a:xfrm>
           <a:prstGeom prst="line">
@@ -16585,7 +16599,7 @@
         </p:nvCxnSpPr>
         <p:spPr>
           <a:xfrm flipH="1">
-            <a:off x="6679783" y="3339574"/>
+            <a:off x="6677820" y="3831561"/>
             <a:ext cx="2174100" cy="752141"/>
           </a:xfrm>
           <a:prstGeom prst="line">
@@ -16631,7 +16645,7 @@
         </p:nvCxnSpPr>
         <p:spPr>
           <a:xfrm flipH="1">
-            <a:off x="7766833" y="3339574"/>
+            <a:off x="7764870" y="3831561"/>
             <a:ext cx="1087049" cy="752141"/>
           </a:xfrm>
           <a:prstGeom prst="line">
@@ -16678,7 +16692,7 @@
         </p:nvCxnSpPr>
         <p:spPr>
           <a:xfrm>
-            <a:off x="8853883" y="3339574"/>
+            <a:off x="8851920" y="3831561"/>
             <a:ext cx="0" cy="752141"/>
           </a:xfrm>
           <a:prstGeom prst="line">
@@ -16725,7 +16739,7 @@
         </p:nvCxnSpPr>
         <p:spPr>
           <a:xfrm flipH="1">
-            <a:off x="4505683" y="3339574"/>
+            <a:off x="4503720" y="3831561"/>
             <a:ext cx="2174100" cy="752141"/>
           </a:xfrm>
           <a:prstGeom prst="line">
@@ -16772,7 +16786,7 @@
         </p:nvCxnSpPr>
         <p:spPr>
           <a:xfrm flipH="1">
-            <a:off x="5592733" y="3339574"/>
+            <a:off x="5590770" y="3831561"/>
             <a:ext cx="1087050" cy="752141"/>
           </a:xfrm>
           <a:prstGeom prst="line">
@@ -16819,7 +16833,7 @@
         </p:nvCxnSpPr>
         <p:spPr>
           <a:xfrm>
-            <a:off x="6679783" y="3339574"/>
+            <a:off x="6677820" y="3831561"/>
             <a:ext cx="0" cy="752141"/>
           </a:xfrm>
           <a:prstGeom prst="line">
@@ -16866,7 +16880,7 @@
         </p:nvCxnSpPr>
         <p:spPr>
           <a:xfrm>
-            <a:off x="6679783" y="3339574"/>
+            <a:off x="6677820" y="3831561"/>
             <a:ext cx="1087050" cy="752141"/>
           </a:xfrm>
           <a:prstGeom prst="line">
@@ -16913,7 +16927,7 @@
         </p:nvCxnSpPr>
         <p:spPr>
           <a:xfrm>
-            <a:off x="6679783" y="3339574"/>
+            <a:off x="6677820" y="3831561"/>
             <a:ext cx="2174100" cy="752141"/>
           </a:xfrm>
           <a:prstGeom prst="line">
@@ -16956,7 +16970,7 @@
         </p:nvSpPr>
         <p:spPr>
           <a:xfrm>
-            <a:off x="4193644" y="4091715"/>
+            <a:off x="4191681" y="4583702"/>
             <a:ext cx="624078" cy="624078"/>
           </a:xfrm>
           <a:prstGeom prst="ellipse">
@@ -16998,7 +17012,7 @@
                 </a:solidFill>
                 <a:latin typeface="AVENIR LIGHT OBLIQUE" panose="020B0402020203090204" pitchFamily="34" charset="77"/>
               </a:rPr>
-              <a:t>Hank</a:t>
+              <a:t>hank</a:t>
             </a:r>
           </a:p>
         </p:txBody>
@@ -17017,7 +17031,7 @@
         </p:nvSpPr>
         <p:spPr>
           <a:xfrm>
-            <a:off x="5280694" y="4091715"/>
+            <a:off x="5278731" y="4583702"/>
             <a:ext cx="624078" cy="624078"/>
           </a:xfrm>
           <a:prstGeom prst="ellipse">
@@ -17059,7 +17073,7 @@
                 </a:solidFill>
                 <a:latin typeface="AVENIR LIGHT OBLIQUE" panose="020B0402020203090204" pitchFamily="34" charset="77"/>
               </a:rPr>
-              <a:t>Helen</a:t>
+              <a:t>helen</a:t>
             </a:r>
           </a:p>
         </p:txBody>
@@ -17078,7 +17092,7 @@
         </p:nvSpPr>
         <p:spPr>
           <a:xfrm>
-            <a:off x="6367744" y="4091715"/>
+            <a:off x="6365781" y="4583702"/>
             <a:ext cx="624078" cy="624078"/>
           </a:xfrm>
           <a:prstGeom prst="ellipse">
@@ -17120,7 +17134,7 @@
                 </a:solidFill>
                 <a:latin typeface="AVENIR LIGHT OBLIQUE" panose="020B0402020203090204" pitchFamily="34" charset="77"/>
               </a:rPr>
-              <a:t>Hilary</a:t>
+              <a:t>hilary</a:t>
             </a:r>
           </a:p>
         </p:txBody>
@@ -17139,7 +17153,7 @@
         </p:nvSpPr>
         <p:spPr>
           <a:xfrm>
-            <a:off x="7454794" y="4091715"/>
+            <a:off x="7452831" y="4583702"/>
             <a:ext cx="624078" cy="624078"/>
           </a:xfrm>
           <a:prstGeom prst="ellipse">
@@ -17181,7 +17195,7 @@
                 </a:solidFill>
                 <a:latin typeface="AVENIR LIGHT OBLIQUE" panose="020B0402020203090204" pitchFamily="34" charset="77"/>
               </a:rPr>
-              <a:t>Holly</a:t>
+              <a:t>holly</a:t>
             </a:r>
           </a:p>
         </p:txBody>
@@ -17200,7 +17214,7 @@
         </p:nvSpPr>
         <p:spPr>
           <a:xfrm>
-            <a:off x="8541844" y="4091715"/>
+            <a:off x="8539881" y="4583702"/>
             <a:ext cx="624078" cy="624078"/>
           </a:xfrm>
           <a:prstGeom prst="ellipse">
@@ -17242,7 +17256,7 @@
                 </a:solidFill>
                 <a:latin typeface="AVENIR LIGHT OBLIQUE" panose="020B0402020203090204" pitchFamily="34" charset="77"/>
               </a:rPr>
-              <a:t>Hugo</a:t>
+              <a:t>hugo</a:t>
             </a:r>
           </a:p>
         </p:txBody>
@@ -17261,7 +17275,7 @@
         </p:nvSpPr>
         <p:spPr>
           <a:xfrm>
-            <a:off x="4193644" y="2715496"/>
+            <a:off x="4191681" y="3207483"/>
             <a:ext cx="624078" cy="624078"/>
           </a:xfrm>
           <a:prstGeom prst="rect">
@@ -17303,7 +17317,7 @@
                 </a:solidFill>
                 <a:latin typeface="Avenir Book" panose="02000503020000020003" pitchFamily="2" charset="0"/>
               </a:rPr>
-              <a:t>Carol</a:t>
+              <a:t>carol</a:t>
             </a:r>
           </a:p>
         </p:txBody>
@@ -17322,7 +17336,7 @@
         </p:nvSpPr>
         <p:spPr>
           <a:xfrm>
-            <a:off x="5280694" y="2715496"/>
+            <a:off x="5278731" y="3207483"/>
             <a:ext cx="624078" cy="624078"/>
           </a:xfrm>
           <a:prstGeom prst="rect">
@@ -17392,7 +17406,7 @@
         </p:nvSpPr>
         <p:spPr>
           <a:xfrm>
-            <a:off x="6367744" y="2715496"/>
+            <a:off x="6365781" y="3207483"/>
             <a:ext cx="624078" cy="624078"/>
           </a:xfrm>
           <a:prstGeom prst="rect">
@@ -17462,7 +17476,7 @@
         </p:nvSpPr>
         <p:spPr>
           <a:xfrm>
-            <a:off x="7454794" y="2715496"/>
+            <a:off x="7452831" y="3207483"/>
             <a:ext cx="624078" cy="624078"/>
           </a:xfrm>
           <a:prstGeom prst="rect">
@@ -17504,7 +17518,7 @@
                 </a:solidFill>
                 <a:latin typeface="Avenir Book" panose="02000503020000020003" pitchFamily="2" charset="0"/>
               </a:rPr>
-              <a:t>Conny</a:t>
+              <a:t>conny</a:t>
             </a:r>
           </a:p>
         </p:txBody>
@@ -17523,7 +17537,7 @@
         </p:nvSpPr>
         <p:spPr>
           <a:xfrm>
-            <a:off x="8541844" y="2715496"/>
+            <a:off x="8539881" y="3207483"/>
             <a:ext cx="624078" cy="624078"/>
           </a:xfrm>
           <a:prstGeom prst="rect">
@@ -17597,7 +17611,7 @@
         </p:nvCxnSpPr>
         <p:spPr>
           <a:xfrm flipH="1">
-            <a:off x="4505683" y="3339574"/>
+            <a:off x="4503720" y="3831561"/>
             <a:ext cx="1087050" cy="752141"/>
           </a:xfrm>
           <a:prstGeom prst="line">
@@ -17644,7 +17658,7 @@
         </p:nvCxnSpPr>
         <p:spPr>
           <a:xfrm>
-            <a:off x="5592733" y="3339574"/>
+            <a:off x="5590770" y="3831561"/>
             <a:ext cx="0" cy="752141"/>
           </a:xfrm>
           <a:prstGeom prst="line">
@@ -17691,7 +17705,7 @@
         </p:nvCxnSpPr>
         <p:spPr>
           <a:xfrm>
-            <a:off x="5592733" y="3339574"/>
+            <a:off x="5590770" y="3831561"/>
             <a:ext cx="1087050" cy="752141"/>
           </a:xfrm>
           <a:prstGeom prst="line">
@@ -17738,7 +17752,7 @@
         </p:nvCxnSpPr>
         <p:spPr>
           <a:xfrm>
-            <a:off x="5592733" y="3339574"/>
+            <a:off x="5590770" y="3831561"/>
             <a:ext cx="2174100" cy="752141"/>
           </a:xfrm>
           <a:prstGeom prst="line">
@@ -17785,7 +17799,7 @@
         </p:nvCxnSpPr>
         <p:spPr>
           <a:xfrm>
-            <a:off x="5592733" y="3339574"/>
+            <a:off x="5590770" y="3831561"/>
             <a:ext cx="3261150" cy="752141"/>
           </a:xfrm>
           <a:prstGeom prst="line">
@@ -17832,7 +17846,7 @@
         </p:nvCxnSpPr>
         <p:spPr>
           <a:xfrm flipH="1">
-            <a:off x="6679783" y="3339574"/>
+            <a:off x="6677820" y="3831561"/>
             <a:ext cx="1087050" cy="752141"/>
           </a:xfrm>
           <a:prstGeom prst="line">
@@ -17877,7 +17891,7 @@
         </p:nvCxnSpPr>
         <p:spPr>
           <a:xfrm flipH="1">
-            <a:off x="5592733" y="3339574"/>
+            <a:off x="5590770" y="3831561"/>
             <a:ext cx="2174100" cy="752141"/>
           </a:xfrm>
           <a:prstGeom prst="line">
@@ -17922,7 +17936,7 @@
         </p:nvCxnSpPr>
         <p:spPr>
           <a:xfrm flipH="1">
-            <a:off x="4505683" y="3339574"/>
+            <a:off x="4503720" y="3831561"/>
             <a:ext cx="3261150" cy="752141"/>
           </a:xfrm>
           <a:prstGeom prst="line">
@@ -17967,7 +17981,7 @@
         </p:nvCxnSpPr>
         <p:spPr>
           <a:xfrm>
-            <a:off x="7766833" y="3339574"/>
+            <a:off x="7764870" y="3831561"/>
             <a:ext cx="0" cy="752141"/>
           </a:xfrm>
           <a:prstGeom prst="line">
@@ -18012,7 +18026,7 @@
         </p:nvCxnSpPr>
         <p:spPr>
           <a:xfrm>
-            <a:off x="7766833" y="3339574"/>
+            <a:off x="7764870" y="3831561"/>
             <a:ext cx="1087050" cy="752141"/>
           </a:xfrm>
           <a:prstGeom prst="line">
@@ -18056,7 +18070,7 @@
         </p:nvCxnSpPr>
         <p:spPr>
           <a:xfrm>
-            <a:off x="4505683" y="3339574"/>
+            <a:off x="4503720" y="3831561"/>
             <a:ext cx="0" cy="752141"/>
           </a:xfrm>
           <a:prstGeom prst="line">
@@ -18101,7 +18115,7 @@
         </p:nvCxnSpPr>
         <p:spPr>
           <a:xfrm>
-            <a:off x="4505683" y="3339574"/>
+            <a:off x="4503720" y="3831561"/>
             <a:ext cx="2174100" cy="752141"/>
           </a:xfrm>
           <a:prstGeom prst="line">
@@ -18146,7 +18160,7 @@
         </p:nvCxnSpPr>
         <p:spPr>
           <a:xfrm>
-            <a:off x="4505683" y="3339574"/>
+            <a:off x="4503720" y="3831561"/>
             <a:ext cx="3261150" cy="752141"/>
           </a:xfrm>
           <a:prstGeom prst="line">
@@ -18191,7 +18205,7 @@
         </p:nvCxnSpPr>
         <p:spPr>
           <a:xfrm>
-            <a:off x="4505683" y="3339574"/>
+            <a:off x="4503720" y="3831561"/>
             <a:ext cx="4348200" cy="752141"/>
           </a:xfrm>
           <a:prstGeom prst="line">
@@ -18236,7 +18250,7 @@
         </p:nvCxnSpPr>
         <p:spPr>
           <a:xfrm>
-            <a:off x="4505683" y="3339574"/>
+            <a:off x="4503720" y="3831561"/>
             <a:ext cx="1087050" cy="752141"/>
           </a:xfrm>
           <a:prstGeom prst="line">
@@ -18281,7 +18295,7 @@
         </p:nvCxnSpPr>
         <p:spPr>
           <a:xfrm flipH="1">
-            <a:off x="4505683" y="1976086"/>
+            <a:off x="4503720" y="2468073"/>
             <a:ext cx="4896" cy="739410"/>
           </a:xfrm>
           <a:prstGeom prst="line">
@@ -18326,7 +18340,7 @@
         </p:nvCxnSpPr>
         <p:spPr>
           <a:xfrm>
-            <a:off x="7761937" y="1976090"/>
+            <a:off x="7759974" y="2468077"/>
             <a:ext cx="4896" cy="739406"/>
           </a:xfrm>
           <a:prstGeom prst="line">
@@ -18364,20 +18378,18 @@
           </p:cNvPr>
           <p:cNvCxnSpPr>
             <a:cxnSpLocks/>
-            <a:stCxn id="110" idx="5"/>
-            <a:endCxn id="113" idx="1"/>
           </p:cNvCxnSpPr>
           <p:nvPr/>
         </p:nvCxnSpPr>
         <p:spPr>
           <a:xfrm>
-            <a:off x="4822616" y="1590384"/>
-            <a:ext cx="2627284" cy="4"/>
+            <a:off x="4503720" y="1575317"/>
+            <a:ext cx="3256254" cy="0"/>
           </a:xfrm>
           <a:prstGeom prst="line">
             <a:avLst/>
           </a:prstGeom>
-          <a:ln w="9525">
+          <a:ln w="9525" cap="rnd">
             <a:solidFill>
               <a:schemeClr val="tx1"/>
             </a:solidFill>
@@ -18412,7 +18424,7 @@
         </p:nvSpPr>
         <p:spPr>
           <a:xfrm>
-            <a:off x="2714002" y="2715496"/>
+            <a:off x="2712039" y="3207483"/>
             <a:ext cx="1016669" cy="624078"/>
           </a:xfrm>
           <a:prstGeom prst="rect">
@@ -18453,6 +18465,17 @@
               <a:t>Clients</a:t>
             </a:r>
           </a:p>
+          <a:p>
+            <a:r>
+              <a:rPr lang="en-US" sz="1000" dirty="0">
+                <a:solidFill>
+                  <a:schemeClr val="tx1"/>
+                </a:solidFill>
+                <a:latin typeface="Avenir Book" panose="02000503020000020003" pitchFamily="2" charset="0"/>
+              </a:rPr>
+              <a:t>(KMEs)</a:t>
+            </a:r>
+          </a:p>
         </p:txBody>
       </p:sp>
       <p:sp>
@@ -18469,7 +18492,7 @@
         </p:nvSpPr>
         <p:spPr>
           <a:xfrm>
-            <a:off x="2714002" y="4091715"/>
+            <a:off x="2712039" y="4583702"/>
             <a:ext cx="1016669" cy="624078"/>
           </a:xfrm>
           <a:prstGeom prst="rect">
@@ -18526,7 +18549,7 @@
         </p:nvSpPr>
         <p:spPr>
           <a:xfrm>
-            <a:off x="2714001" y="1339277"/>
+            <a:off x="2712038" y="1831264"/>
             <a:ext cx="1016669" cy="624078"/>
           </a:xfrm>
           <a:prstGeom prst="rect">
@@ -18567,6 +18590,17 @@
               <a:t>Encryptors</a:t>
             </a:r>
           </a:p>
+          <a:p>
+            <a:r>
+              <a:rPr lang="en-US" sz="1000" dirty="0">
+                <a:solidFill>
+                  <a:schemeClr val="tx1"/>
+                </a:solidFill>
+                <a:latin typeface="Avenir Book" panose="02000503020000020003" pitchFamily="2" charset="0"/>
+              </a:rPr>
+              <a:t>(SAEs)</a:t>
+            </a:r>
+          </a:p>
         </p:txBody>
       </p:sp>
       <p:sp>
@@ -18583,7 +18617,7 @@
         </p:nvSpPr>
         <p:spPr>
           <a:xfrm>
-            <a:off x="3404832" y="2013850"/>
+            <a:off x="3402869" y="2505837"/>
             <a:ext cx="1016669" cy="624078"/>
           </a:xfrm>
           <a:prstGeom prst="rect">
@@ -18658,7 +18692,7 @@
         </p:nvSpPr>
         <p:spPr>
           <a:xfrm>
-            <a:off x="3398262" y="3390069"/>
+            <a:off x="3396299" y="3882056"/>
             <a:ext cx="1016669" cy="624078"/>
           </a:xfrm>
           <a:prstGeom prst="rect">
@@ -18716,8 +18750,8 @@
         </p:nvSpPr>
         <p:spPr>
           <a:xfrm>
-            <a:off x="5328949" y="1403309"/>
-            <a:ext cx="1534102" cy="624078"/>
+            <a:off x="5483977" y="1362697"/>
+            <a:ext cx="1534102" cy="262505"/>
           </a:xfrm>
           <a:prstGeom prst="rect">
             <a:avLst/>
@@ -18774,7 +18808,7 @@
         </p:nvSpPr>
         <p:spPr>
           <a:xfrm>
-            <a:off x="4198541" y="1352008"/>
+            <a:off x="4196578" y="1843995"/>
             <a:ext cx="624076" cy="624078"/>
           </a:xfrm>
           <a:prstGeom prst="pentagon">
@@ -18820,7 +18854,7 @@
                 </a:solidFill>
                 <a:latin typeface="Avenir Book" panose="02000503020000020003" pitchFamily="2" charset="0"/>
               </a:rPr>
-              <a:t>Patrick</a:t>
+              <a:t>sam</a:t>
             </a:r>
           </a:p>
         </p:txBody>
@@ -18839,7 +18873,7 @@
         </p:nvSpPr>
         <p:spPr>
           <a:xfrm>
-            <a:off x="7449899" y="1352012"/>
+            <a:off x="7447936" y="1843999"/>
             <a:ext cx="624076" cy="624078"/>
           </a:xfrm>
           <a:prstGeom prst="pentagon">
@@ -18885,7 +18919,443 @@
                 </a:solidFill>
                 <a:latin typeface="Avenir Book" panose="02000503020000020003" pitchFamily="2" charset="0"/>
               </a:rPr>
-              <a:t>Porter</a:t>
+              <a:t>sofia</a:t>
+            </a:r>
+          </a:p>
+        </p:txBody>
+      </p:sp>
+      <p:cxnSp>
+        <p:nvCxnSpPr>
+          <p:cNvPr id="2" name="Straight Connector 1">
+            <a:extLst>
+              <a:ext uri="{FF2B5EF4-FFF2-40B4-BE49-F238E27FC236}">
+                <a16:creationId xmlns:a16="http://schemas.microsoft.com/office/drawing/2014/main" id="{3097EC8A-A20C-8760-2C44-25CE9CC96309}"/>
+              </a:ext>
+            </a:extLst>
+          </p:cNvPr>
+          <p:cNvCxnSpPr>
+            <a:cxnSpLocks/>
+          </p:cNvCxnSpPr>
+          <p:nvPr/>
+        </p:nvCxnSpPr>
+        <p:spPr>
+          <a:xfrm>
+            <a:off x="4503720" y="1569673"/>
+            <a:ext cx="0" cy="274322"/>
+          </a:xfrm>
+          <a:prstGeom prst="line">
+            <a:avLst/>
+          </a:prstGeom>
+          <a:ln w="9525" cap="rnd">
+            <a:solidFill>
+              <a:schemeClr val="tx1"/>
+            </a:solidFill>
+          </a:ln>
+        </p:spPr>
+        <p:style>
+          <a:lnRef idx="2">
+            <a:schemeClr val="accent1"/>
+          </a:lnRef>
+          <a:fillRef idx="0">
+            <a:schemeClr val="accent1"/>
+          </a:fillRef>
+          <a:effectRef idx="1">
+            <a:schemeClr val="accent1"/>
+          </a:effectRef>
+          <a:fontRef idx="minor">
+            <a:schemeClr val="tx1"/>
+          </a:fontRef>
+        </p:style>
+      </p:cxnSp>
+      <p:cxnSp>
+        <p:nvCxnSpPr>
+          <p:cNvPr id="14" name="Straight Connector 13">
+            <a:extLst>
+              <a:ext uri="{FF2B5EF4-FFF2-40B4-BE49-F238E27FC236}">
+                <a16:creationId xmlns:a16="http://schemas.microsoft.com/office/drawing/2014/main" id="{9587CB9D-147E-CB9E-6DF4-659D9BE7D242}"/>
+              </a:ext>
+            </a:extLst>
+          </p:cNvPr>
+          <p:cNvCxnSpPr>
+            <a:cxnSpLocks/>
+          </p:cNvCxnSpPr>
+          <p:nvPr/>
+        </p:nvCxnSpPr>
+        <p:spPr>
+          <a:xfrm>
+            <a:off x="7759974" y="1575317"/>
+            <a:ext cx="0" cy="274322"/>
+          </a:xfrm>
+          <a:prstGeom prst="line">
+            <a:avLst/>
+          </a:prstGeom>
+          <a:ln w="9525" cap="rnd">
+            <a:solidFill>
+              <a:schemeClr val="tx1"/>
+            </a:solidFill>
+          </a:ln>
+        </p:spPr>
+        <p:style>
+          <a:lnRef idx="2">
+            <a:schemeClr val="accent1"/>
+          </a:lnRef>
+          <a:fillRef idx="0">
+            <a:schemeClr val="accent1"/>
+          </a:fillRef>
+          <a:effectRef idx="1">
+            <a:schemeClr val="accent1"/>
+          </a:effectRef>
+          <a:fontRef idx="minor">
+            <a:schemeClr val="tx1"/>
+          </a:fontRef>
+        </p:style>
+      </p:cxnSp>
+      <p:cxnSp>
+        <p:nvCxnSpPr>
+          <p:cNvPr id="16" name="Straight Connector 15">
+            <a:extLst>
+              <a:ext uri="{FF2B5EF4-FFF2-40B4-BE49-F238E27FC236}">
+                <a16:creationId xmlns:a16="http://schemas.microsoft.com/office/drawing/2014/main" id="{69922FB3-D647-9FE1-FDD1-6DDBE82B2DF6}"/>
+              </a:ext>
+            </a:extLst>
+          </p:cNvPr>
+          <p:cNvCxnSpPr>
+            <a:cxnSpLocks/>
+            <a:stCxn id="19" idx="3"/>
+          </p:cNvCxnSpPr>
+          <p:nvPr/>
+        </p:nvCxnSpPr>
+        <p:spPr>
+          <a:xfrm flipH="1">
+            <a:off x="5580978" y="2468073"/>
+            <a:ext cx="4896" cy="739410"/>
+          </a:xfrm>
+          <a:prstGeom prst="line">
+            <a:avLst/>
+          </a:prstGeom>
+          <a:ln w="9525">
+            <a:solidFill>
+              <a:schemeClr val="bg1">
+                <a:lumMod val="85000"/>
+              </a:schemeClr>
+            </a:solidFill>
+          </a:ln>
+        </p:spPr>
+        <p:style>
+          <a:lnRef idx="2">
+            <a:schemeClr val="accent1"/>
+          </a:lnRef>
+          <a:fillRef idx="0">
+            <a:schemeClr val="accent1"/>
+          </a:fillRef>
+          <a:effectRef idx="1">
+            <a:schemeClr val="accent1"/>
+          </a:effectRef>
+          <a:fontRef idx="minor">
+            <a:schemeClr val="tx1"/>
+          </a:fontRef>
+        </p:style>
+      </p:cxnSp>
+      <p:sp>
+        <p:nvSpPr>
+          <p:cNvPr id="19" name="Regular Pentagon 18">
+            <a:extLst>
+              <a:ext uri="{FF2B5EF4-FFF2-40B4-BE49-F238E27FC236}">
+                <a16:creationId xmlns:a16="http://schemas.microsoft.com/office/drawing/2014/main" id="{96DB188F-FDBA-ED49-3A18-E709E422EA9B}"/>
+              </a:ext>
+            </a:extLst>
+          </p:cNvPr>
+          <p:cNvSpPr/>
+          <p:nvPr/>
+        </p:nvSpPr>
+        <p:spPr>
+          <a:xfrm>
+            <a:off x="5273836" y="1843995"/>
+            <a:ext cx="624076" cy="624078"/>
+          </a:xfrm>
+          <a:prstGeom prst="pentagon">
+            <a:avLst/>
+          </a:prstGeom>
+          <a:solidFill>
+            <a:schemeClr val="tx2">
+              <a:lumMod val="10000"/>
+              <a:lumOff val="90000"/>
+              <a:alpha val="19903"/>
+            </a:schemeClr>
+          </a:solidFill>
+          <a:ln w="9525">
+            <a:solidFill>
+              <a:schemeClr val="bg1">
+                <a:lumMod val="85000"/>
+              </a:schemeClr>
+            </a:solidFill>
+          </a:ln>
+        </p:spPr>
+        <p:style>
+          <a:lnRef idx="2">
+            <a:schemeClr val="accent1">
+              <a:shade val="15000"/>
+            </a:schemeClr>
+          </a:lnRef>
+          <a:fillRef idx="1">
+            <a:schemeClr val="accent1"/>
+          </a:fillRef>
+          <a:effectRef idx="0">
+            <a:schemeClr val="accent1"/>
+          </a:effectRef>
+          <a:fontRef idx="minor">
+            <a:schemeClr val="lt1"/>
+          </a:fontRef>
+        </p:style>
+        <p:txBody>
+          <a:bodyPr lIns="0" rIns="0" rtlCol="0" anchor="ctr"/>
+          <a:lstStyle/>
+          <a:p>
+            <a:pPr algn="ctr"/>
+            <a:r>
+              <a:rPr lang="en-US" sz="1000" dirty="0">
+                <a:solidFill>
+                  <a:schemeClr val="bg1">
+                    <a:lumMod val="85000"/>
+                  </a:schemeClr>
+                </a:solidFill>
+                <a:latin typeface="Avenir Book" panose="02000503020000020003" pitchFamily="2" charset="0"/>
+              </a:rPr>
+              <a:t>serena</a:t>
+            </a:r>
+          </a:p>
+        </p:txBody>
+      </p:sp>
+      <p:cxnSp>
+        <p:nvCxnSpPr>
+          <p:cNvPr id="20" name="Straight Connector 19">
+            <a:extLst>
+              <a:ext uri="{FF2B5EF4-FFF2-40B4-BE49-F238E27FC236}">
+                <a16:creationId xmlns:a16="http://schemas.microsoft.com/office/drawing/2014/main" id="{F374C326-0638-1513-4A9B-79E9CF2D0942}"/>
+              </a:ext>
+            </a:extLst>
+          </p:cNvPr>
+          <p:cNvCxnSpPr>
+            <a:cxnSpLocks/>
+            <a:stCxn id="22" idx="3"/>
+            <a:endCxn id="13" idx="0"/>
+          </p:cNvCxnSpPr>
+          <p:nvPr/>
+        </p:nvCxnSpPr>
+        <p:spPr>
+          <a:xfrm>
+            <a:off x="8516559" y="2468073"/>
+            <a:ext cx="335361" cy="739410"/>
+          </a:xfrm>
+          <a:prstGeom prst="line">
+            <a:avLst/>
+          </a:prstGeom>
+          <a:ln w="9525">
+            <a:solidFill>
+              <a:schemeClr val="bg1">
+                <a:lumMod val="85000"/>
+              </a:schemeClr>
+            </a:solidFill>
+          </a:ln>
+        </p:spPr>
+        <p:style>
+          <a:lnRef idx="2">
+            <a:schemeClr val="accent1"/>
+          </a:lnRef>
+          <a:fillRef idx="0">
+            <a:schemeClr val="accent1"/>
+          </a:fillRef>
+          <a:effectRef idx="1">
+            <a:schemeClr val="accent1"/>
+          </a:effectRef>
+          <a:fontRef idx="minor">
+            <a:schemeClr val="tx1"/>
+          </a:fontRef>
+        </p:style>
+      </p:cxnSp>
+      <p:sp>
+        <p:nvSpPr>
+          <p:cNvPr id="22" name="Regular Pentagon 21">
+            <a:extLst>
+              <a:ext uri="{FF2B5EF4-FFF2-40B4-BE49-F238E27FC236}">
+                <a16:creationId xmlns:a16="http://schemas.microsoft.com/office/drawing/2014/main" id="{F084301F-EEA3-A4FE-F6C2-7E6DAC02B356}"/>
+              </a:ext>
+            </a:extLst>
+          </p:cNvPr>
+          <p:cNvSpPr/>
+          <p:nvPr/>
+        </p:nvSpPr>
+        <p:spPr>
+          <a:xfrm>
+            <a:off x="8204521" y="1843995"/>
+            <a:ext cx="624076" cy="624078"/>
+          </a:xfrm>
+          <a:prstGeom prst="pentagon">
+            <a:avLst/>
+          </a:prstGeom>
+          <a:solidFill>
+            <a:schemeClr val="tx2">
+              <a:lumMod val="10000"/>
+              <a:lumOff val="90000"/>
+              <a:alpha val="19903"/>
+            </a:schemeClr>
+          </a:solidFill>
+          <a:ln w="9525">
+            <a:solidFill>
+              <a:schemeClr val="bg1">
+                <a:lumMod val="85000"/>
+              </a:schemeClr>
+            </a:solidFill>
+          </a:ln>
+        </p:spPr>
+        <p:style>
+          <a:lnRef idx="2">
+            <a:schemeClr val="accent1">
+              <a:shade val="15000"/>
+            </a:schemeClr>
+          </a:lnRef>
+          <a:fillRef idx="1">
+            <a:schemeClr val="accent1"/>
+          </a:fillRef>
+          <a:effectRef idx="0">
+            <a:schemeClr val="accent1"/>
+          </a:effectRef>
+          <a:fontRef idx="minor">
+            <a:schemeClr val="lt1"/>
+          </a:fontRef>
+        </p:style>
+        <p:txBody>
+          <a:bodyPr lIns="0" rIns="0" rtlCol="0" anchor="ctr"/>
+          <a:lstStyle/>
+          <a:p>
+            <a:pPr algn="ctr"/>
+            <a:r>
+              <a:rPr lang="en-US" sz="1000" dirty="0">
+                <a:solidFill>
+                  <a:schemeClr val="bg1">
+                    <a:lumMod val="85000"/>
+                  </a:schemeClr>
+                </a:solidFill>
+                <a:latin typeface="Avenir Book" panose="02000503020000020003" pitchFamily="2" charset="0"/>
+              </a:rPr>
+              <a:t>sunny</a:t>
+            </a:r>
+          </a:p>
+        </p:txBody>
+      </p:sp>
+      <p:cxnSp>
+        <p:nvCxnSpPr>
+          <p:cNvPr id="23" name="Straight Connector 22">
+            <a:extLst>
+              <a:ext uri="{FF2B5EF4-FFF2-40B4-BE49-F238E27FC236}">
+                <a16:creationId xmlns:a16="http://schemas.microsoft.com/office/drawing/2014/main" id="{42DA6DF2-F958-AD28-CE06-46B3CD265B22}"/>
+              </a:ext>
+            </a:extLst>
+          </p:cNvPr>
+          <p:cNvCxnSpPr>
+            <a:cxnSpLocks/>
+            <a:stCxn id="25" idx="3"/>
+            <a:endCxn id="13" idx="0"/>
+          </p:cNvCxnSpPr>
+          <p:nvPr/>
+        </p:nvCxnSpPr>
+        <p:spPr>
+          <a:xfrm flipH="1">
+            <a:off x="8851920" y="2471364"/>
+            <a:ext cx="340259" cy="736119"/>
+          </a:xfrm>
+          <a:prstGeom prst="line">
+            <a:avLst/>
+          </a:prstGeom>
+          <a:ln w="9525">
+            <a:solidFill>
+              <a:schemeClr val="bg1">
+                <a:lumMod val="85000"/>
+              </a:schemeClr>
+            </a:solidFill>
+          </a:ln>
+        </p:spPr>
+        <p:style>
+          <a:lnRef idx="2">
+            <a:schemeClr val="accent1"/>
+          </a:lnRef>
+          <a:fillRef idx="0">
+            <a:schemeClr val="accent1"/>
+          </a:fillRef>
+          <a:effectRef idx="1">
+            <a:schemeClr val="accent1"/>
+          </a:effectRef>
+          <a:fontRef idx="minor">
+            <a:schemeClr val="tx1"/>
+          </a:fontRef>
+        </p:style>
+      </p:cxnSp>
+      <p:sp>
+        <p:nvSpPr>
+          <p:cNvPr id="25" name="Regular Pentagon 24">
+            <a:extLst>
+              <a:ext uri="{FF2B5EF4-FFF2-40B4-BE49-F238E27FC236}">
+                <a16:creationId xmlns:a16="http://schemas.microsoft.com/office/drawing/2014/main" id="{98E41C2E-A0F7-7BFE-BC2A-1DA7BB38B9B2}"/>
+              </a:ext>
+            </a:extLst>
+          </p:cNvPr>
+          <p:cNvSpPr/>
+          <p:nvPr/>
+        </p:nvSpPr>
+        <p:spPr>
+          <a:xfrm>
+            <a:off x="8880141" y="1847286"/>
+            <a:ext cx="624076" cy="624078"/>
+          </a:xfrm>
+          <a:prstGeom prst="pentagon">
+            <a:avLst/>
+          </a:prstGeom>
+          <a:solidFill>
+            <a:schemeClr val="tx2">
+              <a:lumMod val="10000"/>
+              <a:lumOff val="90000"/>
+              <a:alpha val="19903"/>
+            </a:schemeClr>
+          </a:solidFill>
+          <a:ln w="9525">
+            <a:solidFill>
+              <a:schemeClr val="bg1">
+                <a:lumMod val="85000"/>
+              </a:schemeClr>
+            </a:solidFill>
+          </a:ln>
+        </p:spPr>
+        <p:style>
+          <a:lnRef idx="2">
+            <a:schemeClr val="accent1">
+              <a:shade val="15000"/>
+            </a:schemeClr>
+          </a:lnRef>
+          <a:fillRef idx="1">
+            <a:schemeClr val="accent1"/>
+          </a:fillRef>
+          <a:effectRef idx="0">
+            <a:schemeClr val="accent1"/>
+          </a:effectRef>
+          <a:fontRef idx="minor">
+            <a:schemeClr val="lt1"/>
+          </a:fontRef>
+        </p:style>
+        <p:txBody>
+          <a:bodyPr lIns="0" rIns="0" rtlCol="0" anchor="ctr"/>
+          <a:lstStyle/>
+          <a:p>
+            <a:pPr algn="ctr"/>
+            <a:r>
+              <a:rPr lang="en-US" sz="1000" dirty="0">
+                <a:solidFill>
+                  <a:schemeClr val="bg1">
+                    <a:lumMod val="85000"/>
+                  </a:schemeClr>
+                </a:solidFill>
+                <a:latin typeface="Avenir Book" panose="02000503020000020003" pitchFamily="2" charset="0"/>
+              </a:rPr>
+              <a:t>susan</a:t>
             </a:r>
           </a:p>
         </p:txBody>

</xml_diff>

<commit_message>
Update getting started guid
</commit_message>
<xml_diff>
--- a/docs/figures/figures.pptx
+++ b/docs/figures/figures.pptx
@@ -16310,10 +16310,10 @@
       </p:grpSpPr>
       <p:pic>
         <p:nvPicPr>
-          <p:cNvPr id="2" name="Picture 1">
+          <p:cNvPr id="3" name="Picture 2">
             <a:extLst>
               <a:ext uri="{FF2B5EF4-FFF2-40B4-BE49-F238E27FC236}">
-                <a16:creationId xmlns:a16="http://schemas.microsoft.com/office/drawing/2014/main" id="{06C64E02-6747-0671-6A48-B4D91245E5F0}"/>
+                <a16:creationId xmlns:a16="http://schemas.microsoft.com/office/drawing/2014/main" id="{5562332C-AC04-D7C7-08AC-BE365D14451B}"/>
               </a:ext>
             </a:extLst>
           </p:cNvPr>

</xml_diff>